<commit_message>
Minor changes and additions
- Changed graphics
- Added bibliography
- Added sources-slide
- Changed dot product write style
</commit_message>
<xml_diff>
--- a/slides/PowerPoint/Abbildungen.pptx
+++ b/slides/PowerPoint/Abbildungen.pptx
@@ -129,61 +129,12 @@
   <pc:docChgLst>
     <pc:chgData name="Tim Schlottmann" userId="470020b021055e8f" providerId="LiveId" clId="{C000F36B-97BE-443D-8CFF-87B9779942D7}"/>
     <pc:docChg chg="undo redo custSel addSld delSld modSld sldOrd">
-      <pc:chgData name="Tim Schlottmann" userId="470020b021055e8f" providerId="LiveId" clId="{C000F36B-97BE-443D-8CFF-87B9779942D7}" dt="2018-01-22T10:21:51.366" v="2105" actId="1076"/>
+      <pc:chgData name="Tim Schlottmann" userId="470020b021055e8f" providerId="LiveId" clId="{C000F36B-97BE-443D-8CFF-87B9779942D7}" dt="2018-01-25T08:15:00.662" v="2405" actId="1037"/>
       <pc:docMkLst>
         <pc:docMk/>
       </pc:docMkLst>
-      <pc:sldChg chg="del">
-        <pc:chgData name="Tim Schlottmann" userId="470020b021055e8f" providerId="LiveId" clId="{C000F36B-97BE-443D-8CFF-87B9779942D7}" dt="2018-01-21T15:21:48.149" v="145" actId="2696"/>
-        <pc:sldMkLst>
-          <pc:docMk/>
-          <pc:sldMk cId="929987578" sldId="256"/>
-        </pc:sldMkLst>
-      </pc:sldChg>
-      <pc:sldChg chg="del">
-        <pc:chgData name="Tim Schlottmann" userId="470020b021055e8f" providerId="LiveId" clId="{C000F36B-97BE-443D-8CFF-87B9779942D7}" dt="2018-01-21T15:21:48.183" v="146" actId="2696"/>
-        <pc:sldMkLst>
-          <pc:docMk/>
-          <pc:sldMk cId="1717076495" sldId="257"/>
-        </pc:sldMkLst>
-      </pc:sldChg>
-      <pc:sldChg chg="del">
-        <pc:chgData name="Tim Schlottmann" userId="470020b021055e8f" providerId="LiveId" clId="{C000F36B-97BE-443D-8CFF-87B9779942D7}" dt="2018-01-21T15:21:48.222" v="148" actId="2696"/>
-        <pc:sldMkLst>
-          <pc:docMk/>
-          <pc:sldMk cId="91226831" sldId="258"/>
-        </pc:sldMkLst>
-      </pc:sldChg>
-      <pc:sldChg chg="del">
-        <pc:chgData name="Tim Schlottmann" userId="470020b021055e8f" providerId="LiveId" clId="{C000F36B-97BE-443D-8CFF-87B9779942D7}" dt="2018-01-21T15:21:48.252" v="149" actId="2696"/>
-        <pc:sldMkLst>
-          <pc:docMk/>
-          <pc:sldMk cId="2532720434" sldId="259"/>
-        </pc:sldMkLst>
-      </pc:sldChg>
-      <pc:sldChg chg="del">
-        <pc:chgData name="Tim Schlottmann" userId="470020b021055e8f" providerId="LiveId" clId="{C000F36B-97BE-443D-8CFF-87B9779942D7}" dt="2018-01-21T15:21:48.272" v="150" actId="2696"/>
-        <pc:sldMkLst>
-          <pc:docMk/>
-          <pc:sldMk cId="1353351014" sldId="261"/>
-        </pc:sldMkLst>
-      </pc:sldChg>
-      <pc:sldChg chg="del">
-        <pc:chgData name="Tim Schlottmann" userId="470020b021055e8f" providerId="LiveId" clId="{C000F36B-97BE-443D-8CFF-87B9779942D7}" dt="2018-01-21T15:21:48.288" v="151" actId="2696"/>
-        <pc:sldMkLst>
-          <pc:docMk/>
-          <pc:sldMk cId="500818585" sldId="262"/>
-        </pc:sldMkLst>
-      </pc:sldChg>
-      <pc:sldChg chg="del">
-        <pc:chgData name="Tim Schlottmann" userId="470020b021055e8f" providerId="LiveId" clId="{C000F36B-97BE-443D-8CFF-87B9779942D7}" dt="2018-01-21T15:21:48.309" v="152" actId="2696"/>
-        <pc:sldMkLst>
-          <pc:docMk/>
-          <pc:sldMk cId="3520447096" sldId="263"/>
-        </pc:sldMkLst>
-      </pc:sldChg>
       <pc:sldChg chg="addSp delSp modSp add ord">
-        <pc:chgData name="Tim Schlottmann" userId="470020b021055e8f" providerId="LiveId" clId="{C000F36B-97BE-443D-8CFF-87B9779942D7}" dt="2018-01-22T10:21:51.366" v="2105" actId="1076"/>
+        <pc:chgData name="Tim Schlottmann" userId="470020b021055e8f" providerId="LiveId" clId="{C000F36B-97BE-443D-8CFF-87B9779942D7}" dt="2018-01-25T08:13:09.766" v="2293"/>
         <pc:sldMkLst>
           <pc:docMk/>
           <pc:sldMk cId="2850723065" sldId="264"/>
@@ -196,12 +147,44 @@
             <ac:spMk id="12" creationId="{2EE90663-8BBF-4E20-8D4D-5E34828DC3AB}"/>
           </ac:spMkLst>
         </pc:spChg>
+        <pc:spChg chg="add del">
+          <ac:chgData name="Tim Schlottmann" userId="470020b021055e8f" providerId="LiveId" clId="{C000F36B-97BE-443D-8CFF-87B9779942D7}" dt="2018-01-25T08:13:09.594" v="2292" actId="478"/>
+          <ac:spMkLst>
+            <pc:docMk/>
+            <pc:sldMk cId="2850723065" sldId="264"/>
+            <ac:spMk id="13" creationId="{5D585B66-671F-4AF0-A51E-B6227ED9C280}"/>
+          </ac:spMkLst>
+        </pc:spChg>
+        <pc:spChg chg="del">
+          <ac:chgData name="Tim Schlottmann" userId="470020b021055e8f" providerId="LiveId" clId="{C000F36B-97BE-443D-8CFF-87B9779942D7}" dt="2018-01-20T17:34:31.648" v="1" actId="478"/>
+          <ac:spMkLst>
+            <pc:docMk/>
+            <pc:sldMk cId="2850723065" sldId="264"/>
+            <ac:spMk id="13" creationId="{3A6807A8-088E-4629-9CD7-3EE9039DC8B0}"/>
+          </ac:spMkLst>
+        </pc:spChg>
+        <pc:spChg chg="del">
+          <ac:chgData name="Tim Schlottmann" userId="470020b021055e8f" providerId="LiveId" clId="{C000F36B-97BE-443D-8CFF-87B9779942D7}" dt="2018-01-20T17:34:31.648" v="1" actId="478"/>
+          <ac:spMkLst>
+            <pc:docMk/>
+            <pc:sldMk cId="2850723065" sldId="264"/>
+            <ac:spMk id="14" creationId="{1AEBA045-35E8-416D-8878-15D71323ACAC}"/>
+          </ac:spMkLst>
+        </pc:spChg>
         <pc:spChg chg="add">
           <ac:chgData name="Tim Schlottmann" userId="470020b021055e8f" providerId="LiveId" clId="{C000F36B-97BE-443D-8CFF-87B9779942D7}" dt="2018-01-22T08:35:30.892" v="1546" actId="1076"/>
           <ac:spMkLst>
             <pc:docMk/>
             <pc:sldMk cId="2850723065" sldId="264"/>
-            <ac:spMk id="13" creationId="{5D585B66-671F-4AF0-A51E-B6227ED9C280}"/>
+            <ac:spMk id="14" creationId="{D114CC2A-A2DE-4E2A-9328-33766C37D7BC}"/>
+          </ac:spMkLst>
+        </pc:spChg>
+        <pc:spChg chg="add">
+          <ac:chgData name="Tim Schlottmann" userId="470020b021055e8f" providerId="LiveId" clId="{C000F36B-97BE-443D-8CFF-87B9779942D7}" dt="2018-01-22T08:35:30.892" v="1546" actId="1076"/>
+          <ac:spMkLst>
+            <pc:docMk/>
+            <pc:sldMk cId="2850723065" sldId="264"/>
+            <ac:spMk id="15" creationId="{CBEDD73D-F94C-452D-B6D0-55E749364718}"/>
           </ac:spMkLst>
         </pc:spChg>
         <pc:spChg chg="del">
@@ -209,7 +192,7 @@
           <ac:spMkLst>
             <pc:docMk/>
             <pc:sldMk cId="2850723065" sldId="264"/>
-            <ac:spMk id="13" creationId="{3A6807A8-088E-4629-9CD7-3EE9039DC8B0}"/>
+            <ac:spMk id="15" creationId="{D2A0BA77-E037-42FE-B45C-B006B2420AFC}"/>
           </ac:spMkLst>
         </pc:spChg>
         <pc:spChg chg="add">
@@ -217,7 +200,7 @@
           <ac:spMkLst>
             <pc:docMk/>
             <pc:sldMk cId="2850723065" sldId="264"/>
-            <ac:spMk id="14" creationId="{D114CC2A-A2DE-4E2A-9328-33766C37D7BC}"/>
+            <ac:spMk id="16" creationId="{21A0CFA6-BBCD-4EAA-8B5E-327978472EBB}"/>
           </ac:spMkLst>
         </pc:spChg>
         <pc:spChg chg="del">
@@ -225,7 +208,15 @@
           <ac:spMkLst>
             <pc:docMk/>
             <pc:sldMk cId="2850723065" sldId="264"/>
-            <ac:spMk id="14" creationId="{1AEBA045-35E8-416D-8878-15D71323ACAC}"/>
+            <ac:spMk id="16" creationId="{C17E02A7-AB5B-4802-83D5-B1E5525D6AA3}"/>
+          </ac:spMkLst>
+        </pc:spChg>
+        <pc:spChg chg="add">
+          <ac:chgData name="Tim Schlottmann" userId="470020b021055e8f" providerId="LiveId" clId="{C000F36B-97BE-443D-8CFF-87B9779942D7}" dt="2018-01-22T08:35:30.892" v="1546" actId="1076"/>
+          <ac:spMkLst>
+            <pc:docMk/>
+            <pc:sldMk cId="2850723065" sldId="264"/>
+            <ac:spMk id="17" creationId="{1176BB00-DE90-4A47-B1FA-A43673C58DE9}"/>
           </ac:spMkLst>
         </pc:spChg>
         <pc:spChg chg="del">
@@ -233,7 +224,7 @@
           <ac:spMkLst>
             <pc:docMk/>
             <pc:sldMk cId="2850723065" sldId="264"/>
-            <ac:spMk id="15" creationId="{D2A0BA77-E037-42FE-B45C-B006B2420AFC}"/>
+            <ac:spMk id="17" creationId="{F1BC9338-AB6C-4DBA-B575-549FB3E49A42}"/>
           </ac:spMkLst>
         </pc:spChg>
         <pc:spChg chg="add">
@@ -241,15 +232,7 @@
           <ac:spMkLst>
             <pc:docMk/>
             <pc:sldMk cId="2850723065" sldId="264"/>
-            <ac:spMk id="15" creationId="{CBEDD73D-F94C-452D-B6D0-55E749364718}"/>
-          </ac:spMkLst>
-        </pc:spChg>
-        <pc:spChg chg="add">
-          <ac:chgData name="Tim Schlottmann" userId="470020b021055e8f" providerId="LiveId" clId="{C000F36B-97BE-443D-8CFF-87B9779942D7}" dt="2018-01-22T08:35:30.892" v="1546" actId="1076"/>
-          <ac:spMkLst>
-            <pc:docMk/>
-            <pc:sldMk cId="2850723065" sldId="264"/>
-            <ac:spMk id="16" creationId="{21A0CFA6-BBCD-4EAA-8B5E-327978472EBB}"/>
+            <ac:spMk id="18" creationId="{19570096-28FB-429D-A87E-27E6DB5B6083}"/>
           </ac:spMkLst>
         </pc:spChg>
         <pc:spChg chg="del">
@@ -257,7 +240,7 @@
           <ac:spMkLst>
             <pc:docMk/>
             <pc:sldMk cId="2850723065" sldId="264"/>
-            <ac:spMk id="16" creationId="{C17E02A7-AB5B-4802-83D5-B1E5525D6AA3}"/>
+            <ac:spMk id="18" creationId="{6D70E087-5F71-432C-B416-47A61E935250}"/>
           </ac:spMkLst>
         </pc:spChg>
         <pc:spChg chg="del">
@@ -265,15 +248,7 @@
           <ac:spMkLst>
             <pc:docMk/>
             <pc:sldMk cId="2850723065" sldId="264"/>
-            <ac:spMk id="17" creationId="{F1BC9338-AB6C-4DBA-B575-549FB3E49A42}"/>
-          </ac:spMkLst>
-        </pc:spChg>
-        <pc:spChg chg="add">
-          <ac:chgData name="Tim Schlottmann" userId="470020b021055e8f" providerId="LiveId" clId="{C000F36B-97BE-443D-8CFF-87B9779942D7}" dt="2018-01-22T08:35:30.892" v="1546" actId="1076"/>
-          <ac:spMkLst>
-            <pc:docMk/>
-            <pc:sldMk cId="2850723065" sldId="264"/>
-            <ac:spMk id="17" creationId="{1176BB00-DE90-4A47-B1FA-A43673C58DE9}"/>
+            <ac:spMk id="19" creationId="{4BFF4D9F-1B99-4975-B2A7-D671C1F8F7EB}"/>
           </ac:spMkLst>
         </pc:spChg>
         <pc:spChg chg="del">
@@ -281,15 +256,7 @@
           <ac:spMkLst>
             <pc:docMk/>
             <pc:sldMk cId="2850723065" sldId="264"/>
-            <ac:spMk id="18" creationId="{6D70E087-5F71-432C-B416-47A61E935250}"/>
-          </ac:spMkLst>
-        </pc:spChg>
-        <pc:spChg chg="add">
-          <ac:chgData name="Tim Schlottmann" userId="470020b021055e8f" providerId="LiveId" clId="{C000F36B-97BE-443D-8CFF-87B9779942D7}" dt="2018-01-22T08:35:30.892" v="1546" actId="1076"/>
-          <ac:spMkLst>
-            <pc:docMk/>
-            <pc:sldMk cId="2850723065" sldId="264"/>
-            <ac:spMk id="18" creationId="{19570096-28FB-429D-A87E-27E6DB5B6083}"/>
+            <ac:spMk id="20" creationId="{FA7EB042-6614-4F4E-A306-D6385DD4E801}"/>
           </ac:spMkLst>
         </pc:spChg>
         <pc:spChg chg="del">
@@ -297,7 +264,7 @@
           <ac:spMkLst>
             <pc:docMk/>
             <pc:sldMk cId="2850723065" sldId="264"/>
-            <ac:spMk id="19" creationId="{4BFF4D9F-1B99-4975-B2A7-D671C1F8F7EB}"/>
+            <ac:spMk id="21" creationId="{71858A8A-172A-4F03-9852-828BE1B9E3CA}"/>
           </ac:spMkLst>
         </pc:spChg>
         <pc:spChg chg="del">
@@ -305,7 +272,7 @@
           <ac:spMkLst>
             <pc:docMk/>
             <pc:sldMk cId="2850723065" sldId="264"/>
-            <ac:spMk id="20" creationId="{FA7EB042-6614-4F4E-A306-D6385DD4E801}"/>
+            <ac:spMk id="22" creationId="{C19C9749-1696-48F4-8357-B4B9FD7112DE}"/>
           </ac:spMkLst>
         </pc:spChg>
         <pc:spChg chg="del">
@@ -313,7 +280,247 @@
           <ac:spMkLst>
             <pc:docMk/>
             <pc:sldMk cId="2850723065" sldId="264"/>
-            <ac:spMk id="21" creationId="{71858A8A-172A-4F03-9852-828BE1B9E3CA}"/>
+            <ac:spMk id="23" creationId="{CAF208DC-F00C-4EB1-A372-051BF9436BF2}"/>
+          </ac:spMkLst>
+        </pc:spChg>
+        <pc:spChg chg="del">
+          <ac:chgData name="Tim Schlottmann" userId="470020b021055e8f" providerId="LiveId" clId="{C000F36B-97BE-443D-8CFF-87B9779942D7}" dt="2018-01-20T17:34:35.775" v="2" actId="478"/>
+          <ac:spMkLst>
+            <pc:docMk/>
+            <pc:sldMk cId="2850723065" sldId="264"/>
+            <ac:spMk id="24" creationId="{FAE8700C-5A9E-4149-83EF-966EB7DFEAE0}"/>
+          </ac:spMkLst>
+        </pc:spChg>
+        <pc:spChg chg="del">
+          <ac:chgData name="Tim Schlottmann" userId="470020b021055e8f" providerId="LiveId" clId="{C000F36B-97BE-443D-8CFF-87B9779942D7}" dt="2018-01-20T17:34:35.775" v="2" actId="478"/>
+          <ac:spMkLst>
+            <pc:docMk/>
+            <pc:sldMk cId="2850723065" sldId="264"/>
+            <ac:spMk id="25" creationId="{A3080797-13B8-4CD2-A0B1-D4272619B1A3}"/>
+          </ac:spMkLst>
+        </pc:spChg>
+        <pc:spChg chg="del">
+          <ac:chgData name="Tim Schlottmann" userId="470020b021055e8f" providerId="LiveId" clId="{C000F36B-97BE-443D-8CFF-87B9779942D7}" dt="2018-01-20T17:34:35.775" v="2" actId="478"/>
+          <ac:spMkLst>
+            <pc:docMk/>
+            <pc:sldMk cId="2850723065" sldId="264"/>
+            <ac:spMk id="26" creationId="{A6C58BAC-10CB-4AA3-9136-5174442E07E8}"/>
+          </ac:spMkLst>
+        </pc:spChg>
+        <pc:spChg chg="add del">
+          <ac:chgData name="Tim Schlottmann" userId="470020b021055e8f" providerId="LiveId" clId="{C000F36B-97BE-443D-8CFF-87B9779942D7}" dt="2018-01-22T08:36:01.606" v="1548" actId="478"/>
+          <ac:spMkLst>
+            <pc:docMk/>
+            <pc:sldMk cId="2850723065" sldId="264"/>
+            <ac:spMk id="27" creationId="{0A455EC5-8179-43D3-8007-13E0CFB59EA6}"/>
+          </ac:spMkLst>
+        </pc:spChg>
+        <pc:spChg chg="del">
+          <ac:chgData name="Tim Schlottmann" userId="470020b021055e8f" providerId="LiveId" clId="{C000F36B-97BE-443D-8CFF-87B9779942D7}" dt="2018-01-20T17:34:35.775" v="2" actId="478"/>
+          <ac:spMkLst>
+            <pc:docMk/>
+            <pc:sldMk cId="2850723065" sldId="264"/>
+            <ac:spMk id="27" creationId="{18B5A266-5410-4E5F-B595-E806859FEE12}"/>
+          </ac:spMkLst>
+        </pc:spChg>
+        <pc:spChg chg="add del">
+          <ac:chgData name="Tim Schlottmann" userId="470020b021055e8f" providerId="LiveId" clId="{C000F36B-97BE-443D-8CFF-87B9779942D7}" dt="2018-01-22T08:36:01.606" v="1548" actId="478"/>
+          <ac:spMkLst>
+            <pc:docMk/>
+            <pc:sldMk cId="2850723065" sldId="264"/>
+            <ac:spMk id="28" creationId="{A7ED6184-9EBF-4961-BCD7-D4C36977F8D4}"/>
+          </ac:spMkLst>
+        </pc:spChg>
+        <pc:spChg chg="add del mod">
+          <ac:chgData name="Tim Schlottmann" userId="470020b021055e8f" providerId="LiveId" clId="{C000F36B-97BE-443D-8CFF-87B9779942D7}" dt="2018-01-25T08:13:09.594" v="2292" actId="478"/>
+          <ac:spMkLst>
+            <pc:docMk/>
+            <pc:sldMk cId="2850723065" sldId="264"/>
+            <ac:spMk id="28" creationId="{2F6B4A67-BC54-4FBA-B950-923D26EA6E06}"/>
+          </ac:spMkLst>
+        </pc:spChg>
+        <pc:spChg chg="del">
+          <ac:chgData name="Tim Schlottmann" userId="470020b021055e8f" providerId="LiveId" clId="{C000F36B-97BE-443D-8CFF-87B9779942D7}" dt="2018-01-20T17:34:35.775" v="2" actId="478"/>
+          <ac:spMkLst>
+            <pc:docMk/>
+            <pc:sldMk cId="2850723065" sldId="264"/>
+            <ac:spMk id="28" creationId="{7C50640C-0E5C-4185-B0AA-A0658AC3B429}"/>
+          </ac:spMkLst>
+        </pc:spChg>
+        <pc:spChg chg="add">
+          <ac:chgData name="Tim Schlottmann" userId="470020b021055e8f" providerId="LiveId" clId="{C000F36B-97BE-443D-8CFF-87B9779942D7}" dt="2018-01-25T08:13:09.766" v="2293"/>
+          <ac:spMkLst>
+            <pc:docMk/>
+            <pc:sldMk cId="2850723065" sldId="264"/>
+            <ac:spMk id="29" creationId="{456AA7FB-2F10-403C-AAB5-D978F4B24149}"/>
+          </ac:spMkLst>
+        </pc:spChg>
+        <pc:spChg chg="del">
+          <ac:chgData name="Tim Schlottmann" userId="470020b021055e8f" providerId="LiveId" clId="{C000F36B-97BE-443D-8CFF-87B9779942D7}" dt="2018-01-20T17:34:35.775" v="2" actId="478"/>
+          <ac:spMkLst>
+            <pc:docMk/>
+            <pc:sldMk cId="2850723065" sldId="264"/>
+            <ac:spMk id="29" creationId="{9C431FE6-F847-4019-9F4A-DC14785EF475}"/>
+          </ac:spMkLst>
+        </pc:spChg>
+        <pc:spChg chg="add del">
+          <ac:chgData name="Tim Schlottmann" userId="470020b021055e8f" providerId="LiveId" clId="{C000F36B-97BE-443D-8CFF-87B9779942D7}" dt="2018-01-22T08:36:01.606" v="1548" actId="478"/>
+          <ac:spMkLst>
+            <pc:docMk/>
+            <pc:sldMk cId="2850723065" sldId="264"/>
+            <ac:spMk id="29" creationId="{5F9D8527-9ED5-4D5E-8FBC-82ED7559A39A}"/>
+          </ac:spMkLst>
+        </pc:spChg>
+        <pc:spChg chg="add">
+          <ac:chgData name="Tim Schlottmann" userId="470020b021055e8f" providerId="LiveId" clId="{C000F36B-97BE-443D-8CFF-87B9779942D7}" dt="2018-01-25T08:13:09.766" v="2293"/>
+          <ac:spMkLst>
+            <pc:docMk/>
+            <pc:sldMk cId="2850723065" sldId="264"/>
+            <ac:spMk id="30" creationId="{035508A1-6BC0-4F7F-B982-BB62A74E9661}"/>
+          </ac:spMkLst>
+        </pc:spChg>
+        <pc:spChg chg="add del">
+          <ac:chgData name="Tim Schlottmann" userId="470020b021055e8f" providerId="LiveId" clId="{C000F36B-97BE-443D-8CFF-87B9779942D7}" dt="2018-01-22T08:36:01.606" v="1548" actId="478"/>
+          <ac:spMkLst>
+            <pc:docMk/>
+            <pc:sldMk cId="2850723065" sldId="264"/>
+            <ac:spMk id="30" creationId="{236FC083-BD28-431B-8B34-697AB61EB15C}"/>
+          </ac:spMkLst>
+        </pc:spChg>
+        <pc:spChg chg="del">
+          <ac:chgData name="Tim Schlottmann" userId="470020b021055e8f" providerId="LiveId" clId="{C000F36B-97BE-443D-8CFF-87B9779942D7}" dt="2018-01-20T17:34:35.775" v="2" actId="478"/>
+          <ac:spMkLst>
+            <pc:docMk/>
+            <pc:sldMk cId="2850723065" sldId="264"/>
+            <ac:spMk id="30" creationId="{FA7FF531-E7A8-497E-BF7B-6BC4546D35C8}"/>
+          </ac:spMkLst>
+        </pc:spChg>
+        <pc:spChg chg="add del">
+          <ac:chgData name="Tim Schlottmann" userId="470020b021055e8f" providerId="LiveId" clId="{C000F36B-97BE-443D-8CFF-87B9779942D7}" dt="2018-01-22T08:35:54.179" v="1547" actId="478"/>
+          <ac:spMkLst>
+            <pc:docMk/>
+            <pc:sldMk cId="2850723065" sldId="264"/>
+            <ac:spMk id="31" creationId="{00E7BF90-9C05-4FFF-9C00-F0DC1AB07495}"/>
+          </ac:spMkLst>
+        </pc:spChg>
+        <pc:spChg chg="add del">
+          <ac:chgData name="Tim Schlottmann" userId="470020b021055e8f" providerId="LiveId" clId="{C000F36B-97BE-443D-8CFF-87B9779942D7}" dt="2018-01-22T08:35:54.179" v="1547" actId="478"/>
+          <ac:spMkLst>
+            <pc:docMk/>
+            <pc:sldMk cId="2850723065" sldId="264"/>
+            <ac:spMk id="32" creationId="{66E63AE4-57E1-42F7-B946-452BA7DE67D6}"/>
+          </ac:spMkLst>
+        </pc:spChg>
+        <pc:spChg chg="del">
+          <ac:chgData name="Tim Schlottmann" userId="470020b021055e8f" providerId="LiveId" clId="{C000F36B-97BE-443D-8CFF-87B9779942D7}" dt="2018-01-20T17:34:35.775" v="2" actId="478"/>
+          <ac:spMkLst>
+            <pc:docMk/>
+            <pc:sldMk cId="2850723065" sldId="264"/>
+            <ac:spMk id="32" creationId="{A3EB680D-F33E-45C7-9259-C7CACCA4D535}"/>
+          </ac:spMkLst>
+        </pc:spChg>
+        <pc:spChg chg="add del">
+          <ac:chgData name="Tim Schlottmann" userId="470020b021055e8f" providerId="LiveId" clId="{C000F36B-97BE-443D-8CFF-87B9779942D7}" dt="2018-01-22T08:35:54.179" v="1547" actId="478"/>
+          <ac:spMkLst>
+            <pc:docMk/>
+            <pc:sldMk cId="2850723065" sldId="264"/>
+            <ac:spMk id="33" creationId="{656B8F8C-1016-4823-88FC-A1F13051A95E}"/>
+          </ac:spMkLst>
+        </pc:spChg>
+        <pc:spChg chg="del">
+          <ac:chgData name="Tim Schlottmann" userId="470020b021055e8f" providerId="LiveId" clId="{C000F36B-97BE-443D-8CFF-87B9779942D7}" dt="2018-01-20T17:34:35.775" v="2" actId="478"/>
+          <ac:spMkLst>
+            <pc:docMk/>
+            <pc:sldMk cId="2850723065" sldId="264"/>
+            <ac:spMk id="33" creationId="{705F4FD8-B8E5-426E-B0DB-D0CA67B90095}"/>
+          </ac:spMkLst>
+        </pc:spChg>
+        <pc:spChg chg="del">
+          <ac:chgData name="Tim Schlottmann" userId="470020b021055e8f" providerId="LiveId" clId="{C000F36B-97BE-443D-8CFF-87B9779942D7}" dt="2018-01-20T17:34:35.775" v="2" actId="478"/>
+          <ac:spMkLst>
+            <pc:docMk/>
+            <pc:sldMk cId="2850723065" sldId="264"/>
+            <ac:spMk id="34" creationId="{A198DFF1-2CC2-41CB-8CBD-B56CF494816E}"/>
+          </ac:spMkLst>
+        </pc:spChg>
+        <pc:spChg chg="add del">
+          <ac:chgData name="Tim Schlottmann" userId="470020b021055e8f" providerId="LiveId" clId="{C000F36B-97BE-443D-8CFF-87B9779942D7}" dt="2018-01-22T08:35:54.179" v="1547" actId="478"/>
+          <ac:spMkLst>
+            <pc:docMk/>
+            <pc:sldMk cId="2850723065" sldId="264"/>
+            <ac:spMk id="34" creationId="{7A139566-0494-499B-A05C-17A70D96A3E0}"/>
+          </ac:spMkLst>
+        </pc:spChg>
+        <pc:spChg chg="del">
+          <ac:chgData name="Tim Schlottmann" userId="470020b021055e8f" providerId="LiveId" clId="{C000F36B-97BE-443D-8CFF-87B9779942D7}" dt="2018-01-20T17:34:35.775" v="2" actId="478"/>
+          <ac:spMkLst>
+            <pc:docMk/>
+            <pc:sldMk cId="2850723065" sldId="264"/>
+            <ac:spMk id="35" creationId="{157B382F-221F-4D16-BAB7-5E9FD658795A}"/>
+          </ac:spMkLst>
+        </pc:spChg>
+        <pc:spChg chg="add del">
+          <ac:chgData name="Tim Schlottmann" userId="470020b021055e8f" providerId="LiveId" clId="{C000F36B-97BE-443D-8CFF-87B9779942D7}" dt="2018-01-22T08:35:54.179" v="1547" actId="478"/>
+          <ac:spMkLst>
+            <pc:docMk/>
+            <pc:sldMk cId="2850723065" sldId="264"/>
+            <ac:spMk id="35" creationId="{CF861807-FFD6-4D9F-A39C-943D066334EC}"/>
+          </ac:spMkLst>
+        </pc:spChg>
+        <pc:spChg chg="add del">
+          <ac:chgData name="Tim Schlottmann" userId="470020b021055e8f" providerId="LiveId" clId="{C000F36B-97BE-443D-8CFF-87B9779942D7}" dt="2018-01-22T08:35:54.179" v="1547" actId="478"/>
+          <ac:spMkLst>
+            <pc:docMk/>
+            <pc:sldMk cId="2850723065" sldId="264"/>
+            <ac:spMk id="36" creationId="{7F35D771-84D4-4A42-A3D3-E6C2FE274DA7}"/>
+          </ac:spMkLst>
+        </pc:spChg>
+        <pc:spChg chg="add del">
+          <ac:chgData name="Tim Schlottmann" userId="470020b021055e8f" providerId="LiveId" clId="{C000F36B-97BE-443D-8CFF-87B9779942D7}" dt="2018-01-22T08:35:54.179" v="1547" actId="478"/>
+          <ac:spMkLst>
+            <pc:docMk/>
+            <pc:sldMk cId="2850723065" sldId="264"/>
+            <ac:spMk id="37" creationId="{EE77FDD6-5EE9-4972-88BD-D8A6BDAE1D2B}"/>
+          </ac:spMkLst>
+        </pc:spChg>
+        <pc:spChg chg="add del">
+          <ac:chgData name="Tim Schlottmann" userId="470020b021055e8f" providerId="LiveId" clId="{C000F36B-97BE-443D-8CFF-87B9779942D7}" dt="2018-01-22T08:36:01.606" v="1548" actId="478"/>
+          <ac:spMkLst>
+            <pc:docMk/>
+            <pc:sldMk cId="2850723065" sldId="264"/>
+            <ac:spMk id="38" creationId="{CEF8CAA0-2EE9-41B3-B808-C61B66A3A508}"/>
+          </ac:spMkLst>
+        </pc:spChg>
+        <pc:spChg chg="add mod ord">
+          <ac:chgData name="Tim Schlottmann" userId="470020b021055e8f" providerId="LiveId" clId="{C000F36B-97BE-443D-8CFF-87B9779942D7}" dt="2018-01-22T08:42:28.705" v="2048" actId="167"/>
+          <ac:spMkLst>
+            <pc:docMk/>
+            <pc:sldMk cId="2850723065" sldId="264"/>
+            <ac:spMk id="39" creationId="{8814A5B4-EBC3-44B6-87C5-1CADD728C9F0}"/>
+          </ac:spMkLst>
+        </pc:spChg>
+        <pc:spChg chg="add mod ord">
+          <ac:chgData name="Tim Schlottmann" userId="470020b021055e8f" providerId="LiveId" clId="{C000F36B-97BE-443D-8CFF-87B9779942D7}" dt="2018-01-22T08:42:28.705" v="2048" actId="167"/>
+          <ac:spMkLst>
+            <pc:docMk/>
+            <pc:sldMk cId="2850723065" sldId="264"/>
+            <ac:spMk id="40" creationId="{02A3CF32-B82A-4B2E-ADA7-22A39825BE7B}"/>
+          </ac:spMkLst>
+        </pc:spChg>
+        <pc:spChg chg="add mod ord">
+          <ac:chgData name="Tim Schlottmann" userId="470020b021055e8f" providerId="LiveId" clId="{C000F36B-97BE-443D-8CFF-87B9779942D7}" dt="2018-01-22T08:42:28.705" v="2048" actId="167"/>
+          <ac:spMkLst>
+            <pc:docMk/>
+            <pc:sldMk cId="2850723065" sldId="264"/>
+            <ac:spMk id="42" creationId="{C8C9D8EC-931A-49BB-806D-FB1E3D8B8C29}"/>
+          </ac:spMkLst>
+        </pc:spChg>
+        <pc:spChg chg="add mod ord">
+          <ac:chgData name="Tim Schlottmann" userId="470020b021055e8f" providerId="LiveId" clId="{C000F36B-97BE-443D-8CFF-87B9779942D7}" dt="2018-01-22T08:42:28.705" v="2048" actId="167"/>
+          <ac:spMkLst>
+            <pc:docMk/>
+            <pc:sldMk cId="2850723065" sldId="264"/>
+            <ac:spMk id="43" creationId="{2D252C2B-B329-4311-B1C0-736DCC124CAE}"/>
           </ac:spMkLst>
         </pc:spChg>
         <pc:spChg chg="del">
@@ -321,15 +528,7 @@
           <ac:spMkLst>
             <pc:docMk/>
             <pc:sldMk cId="2850723065" sldId="264"/>
-            <ac:spMk id="22" creationId="{C19C9749-1696-48F4-8357-B4B9FD7112DE}"/>
-          </ac:spMkLst>
-        </pc:spChg>
-        <pc:spChg chg="del">
-          <ac:chgData name="Tim Schlottmann" userId="470020b021055e8f" providerId="LiveId" clId="{C000F36B-97BE-443D-8CFF-87B9779942D7}" dt="2018-01-20T17:34:31.648" v="1" actId="478"/>
-          <ac:spMkLst>
-            <pc:docMk/>
-            <pc:sldMk cId="2850723065" sldId="264"/>
-            <ac:spMk id="23" creationId="{CAF208DC-F00C-4EB1-A372-051BF9436BF2}"/>
+            <ac:spMk id="44" creationId="{F85B0C1B-3C32-4292-BB39-ED1D8AF89B49}"/>
           </ac:spMkLst>
         </pc:spChg>
         <pc:spChg chg="del">
@@ -337,7 +536,23 @@
           <ac:spMkLst>
             <pc:docMk/>
             <pc:sldMk cId="2850723065" sldId="264"/>
-            <ac:spMk id="24" creationId="{FAE8700C-5A9E-4149-83EF-966EB7DFEAE0}"/>
+            <ac:spMk id="45" creationId="{84727141-D111-4B46-A7C7-84D1CE6EF995}"/>
+          </ac:spMkLst>
+        </pc:spChg>
+        <pc:spChg chg="add del mod">
+          <ac:chgData name="Tim Schlottmann" userId="470020b021055e8f" providerId="LiveId" clId="{C000F36B-97BE-443D-8CFF-87B9779942D7}" dt="2018-01-22T08:35:02.231" v="1545" actId="478"/>
+          <ac:spMkLst>
+            <pc:docMk/>
+            <pc:sldMk cId="2850723065" sldId="264"/>
+            <ac:spMk id="47" creationId="{43553256-C4D5-494A-8EC7-D858A5B1158E}"/>
+          </ac:spMkLst>
+        </pc:spChg>
+        <pc:spChg chg="add del mod">
+          <ac:chgData name="Tim Schlottmann" userId="470020b021055e8f" providerId="LiveId" clId="{C000F36B-97BE-443D-8CFF-87B9779942D7}" dt="2018-01-22T08:35:02.231" v="1545" actId="478"/>
+          <ac:spMkLst>
+            <pc:docMk/>
+            <pc:sldMk cId="2850723065" sldId="264"/>
+            <ac:spMk id="48" creationId="{BE3CA54F-D8F2-4BA2-99D7-04385D5715C0}"/>
           </ac:spMkLst>
         </pc:spChg>
         <pc:spChg chg="del">
@@ -345,7 +560,7 @@
           <ac:spMkLst>
             <pc:docMk/>
             <pc:sldMk cId="2850723065" sldId="264"/>
-            <ac:spMk id="25" creationId="{A3080797-13B8-4CD2-A0B1-D4272619B1A3}"/>
+            <ac:spMk id="51" creationId="{07BCEE0B-2544-4A44-88DA-82D9E067FA49}"/>
           </ac:spMkLst>
         </pc:spChg>
         <pc:spChg chg="del">
@@ -353,7 +568,7 @@
           <ac:spMkLst>
             <pc:docMk/>
             <pc:sldMk cId="2850723065" sldId="264"/>
-            <ac:spMk id="26" creationId="{A6C58BAC-10CB-4AA3-9136-5174442E07E8}"/>
+            <ac:spMk id="52" creationId="{1AF2E22B-59A2-43F1-B4C5-9487BD71672E}"/>
           </ac:spMkLst>
         </pc:spChg>
         <pc:spChg chg="del">
@@ -361,167 +576,15 @@
           <ac:spMkLst>
             <pc:docMk/>
             <pc:sldMk cId="2850723065" sldId="264"/>
-            <ac:spMk id="27" creationId="{18B5A266-5410-4E5F-B595-E806859FEE12}"/>
-          </ac:spMkLst>
-        </pc:spChg>
-        <pc:spChg chg="add del">
-          <ac:chgData name="Tim Schlottmann" userId="470020b021055e8f" providerId="LiveId" clId="{C000F36B-97BE-443D-8CFF-87B9779942D7}" dt="2018-01-22T08:36:01.606" v="1548" actId="478"/>
+            <ac:spMk id="53" creationId="{B4CA39D5-4892-4955-9C1B-0E55B2DE827C}"/>
+          </ac:spMkLst>
+        </pc:spChg>
+        <pc:spChg chg="del mod">
+          <ac:chgData name="Tim Schlottmann" userId="470020b021055e8f" providerId="LiveId" clId="{C000F36B-97BE-443D-8CFF-87B9779942D7}" dt="2018-01-20T17:39:23.931" v="71" actId="478"/>
           <ac:spMkLst>
             <pc:docMk/>
             <pc:sldMk cId="2850723065" sldId="264"/>
-            <ac:spMk id="27" creationId="{0A455EC5-8179-43D3-8007-13E0CFB59EA6}"/>
-          </ac:spMkLst>
-        </pc:spChg>
-        <pc:spChg chg="add del">
-          <ac:chgData name="Tim Schlottmann" userId="470020b021055e8f" providerId="LiveId" clId="{C000F36B-97BE-443D-8CFF-87B9779942D7}" dt="2018-01-22T08:36:01.606" v="1548" actId="478"/>
-          <ac:spMkLst>
-            <pc:docMk/>
-            <pc:sldMk cId="2850723065" sldId="264"/>
-            <ac:spMk id="28" creationId="{A7ED6184-9EBF-4961-BCD7-D4C36977F8D4}"/>
-          </ac:spMkLst>
-        </pc:spChg>
-        <pc:spChg chg="del">
-          <ac:chgData name="Tim Schlottmann" userId="470020b021055e8f" providerId="LiveId" clId="{C000F36B-97BE-443D-8CFF-87B9779942D7}" dt="2018-01-20T17:34:35.775" v="2" actId="478"/>
-          <ac:spMkLst>
-            <pc:docMk/>
-            <pc:sldMk cId="2850723065" sldId="264"/>
-            <ac:spMk id="28" creationId="{7C50640C-0E5C-4185-B0AA-A0658AC3B429}"/>
-          </ac:spMkLst>
-        </pc:spChg>
-        <pc:spChg chg="add mod">
-          <ac:chgData name="Tim Schlottmann" userId="470020b021055e8f" providerId="LiveId" clId="{C000F36B-97BE-443D-8CFF-87B9779942D7}" dt="2018-01-22T10:21:51.366" v="2105" actId="1076"/>
-          <ac:spMkLst>
-            <pc:docMk/>
-            <pc:sldMk cId="2850723065" sldId="264"/>
-            <ac:spMk id="28" creationId="{2F6B4A67-BC54-4FBA-B950-923D26EA6E06}"/>
-          </ac:spMkLst>
-        </pc:spChg>
-        <pc:spChg chg="del">
-          <ac:chgData name="Tim Schlottmann" userId="470020b021055e8f" providerId="LiveId" clId="{C000F36B-97BE-443D-8CFF-87B9779942D7}" dt="2018-01-20T17:34:35.775" v="2" actId="478"/>
-          <ac:spMkLst>
-            <pc:docMk/>
-            <pc:sldMk cId="2850723065" sldId="264"/>
-            <ac:spMk id="29" creationId="{9C431FE6-F847-4019-9F4A-DC14785EF475}"/>
-          </ac:spMkLst>
-        </pc:spChg>
-        <pc:spChg chg="add del">
-          <ac:chgData name="Tim Schlottmann" userId="470020b021055e8f" providerId="LiveId" clId="{C000F36B-97BE-443D-8CFF-87B9779942D7}" dt="2018-01-22T08:36:01.606" v="1548" actId="478"/>
-          <ac:spMkLst>
-            <pc:docMk/>
-            <pc:sldMk cId="2850723065" sldId="264"/>
-            <ac:spMk id="29" creationId="{5F9D8527-9ED5-4D5E-8FBC-82ED7559A39A}"/>
-          </ac:spMkLst>
-        </pc:spChg>
-        <pc:spChg chg="add del">
-          <ac:chgData name="Tim Schlottmann" userId="470020b021055e8f" providerId="LiveId" clId="{C000F36B-97BE-443D-8CFF-87B9779942D7}" dt="2018-01-22T08:36:01.606" v="1548" actId="478"/>
-          <ac:spMkLst>
-            <pc:docMk/>
-            <pc:sldMk cId="2850723065" sldId="264"/>
-            <ac:spMk id="30" creationId="{236FC083-BD28-431B-8B34-697AB61EB15C}"/>
-          </ac:spMkLst>
-        </pc:spChg>
-        <pc:spChg chg="del">
-          <ac:chgData name="Tim Schlottmann" userId="470020b021055e8f" providerId="LiveId" clId="{C000F36B-97BE-443D-8CFF-87B9779942D7}" dt="2018-01-20T17:34:35.775" v="2" actId="478"/>
-          <ac:spMkLst>
-            <pc:docMk/>
-            <pc:sldMk cId="2850723065" sldId="264"/>
-            <ac:spMk id="30" creationId="{FA7FF531-E7A8-497E-BF7B-6BC4546D35C8}"/>
-          </ac:spMkLst>
-        </pc:spChg>
-        <pc:spChg chg="add del">
-          <ac:chgData name="Tim Schlottmann" userId="470020b021055e8f" providerId="LiveId" clId="{C000F36B-97BE-443D-8CFF-87B9779942D7}" dt="2018-01-22T08:35:54.179" v="1547" actId="478"/>
-          <ac:spMkLst>
-            <pc:docMk/>
-            <pc:sldMk cId="2850723065" sldId="264"/>
-            <ac:spMk id="31" creationId="{00E7BF90-9C05-4FFF-9C00-F0DC1AB07495}"/>
-          </ac:spMkLst>
-        </pc:spChg>
-        <pc:spChg chg="del">
-          <ac:chgData name="Tim Schlottmann" userId="470020b021055e8f" providerId="LiveId" clId="{C000F36B-97BE-443D-8CFF-87B9779942D7}" dt="2018-01-20T17:34:35.775" v="2" actId="478"/>
-          <ac:spMkLst>
-            <pc:docMk/>
-            <pc:sldMk cId="2850723065" sldId="264"/>
-            <ac:spMk id="32" creationId="{A3EB680D-F33E-45C7-9259-C7CACCA4D535}"/>
-          </ac:spMkLst>
-        </pc:spChg>
-        <pc:spChg chg="add del">
-          <ac:chgData name="Tim Schlottmann" userId="470020b021055e8f" providerId="LiveId" clId="{C000F36B-97BE-443D-8CFF-87B9779942D7}" dt="2018-01-22T08:35:54.179" v="1547" actId="478"/>
-          <ac:spMkLst>
-            <pc:docMk/>
-            <pc:sldMk cId="2850723065" sldId="264"/>
-            <ac:spMk id="32" creationId="{66E63AE4-57E1-42F7-B946-452BA7DE67D6}"/>
-          </ac:spMkLst>
-        </pc:spChg>
-        <pc:spChg chg="del">
-          <ac:chgData name="Tim Schlottmann" userId="470020b021055e8f" providerId="LiveId" clId="{C000F36B-97BE-443D-8CFF-87B9779942D7}" dt="2018-01-20T17:34:35.775" v="2" actId="478"/>
-          <ac:spMkLst>
-            <pc:docMk/>
-            <pc:sldMk cId="2850723065" sldId="264"/>
-            <ac:spMk id="33" creationId="{705F4FD8-B8E5-426E-B0DB-D0CA67B90095}"/>
-          </ac:spMkLst>
-        </pc:spChg>
-        <pc:spChg chg="add del">
-          <ac:chgData name="Tim Schlottmann" userId="470020b021055e8f" providerId="LiveId" clId="{C000F36B-97BE-443D-8CFF-87B9779942D7}" dt="2018-01-22T08:35:54.179" v="1547" actId="478"/>
-          <ac:spMkLst>
-            <pc:docMk/>
-            <pc:sldMk cId="2850723065" sldId="264"/>
-            <ac:spMk id="33" creationId="{656B8F8C-1016-4823-88FC-A1F13051A95E}"/>
-          </ac:spMkLst>
-        </pc:spChg>
-        <pc:spChg chg="add del">
-          <ac:chgData name="Tim Schlottmann" userId="470020b021055e8f" providerId="LiveId" clId="{C000F36B-97BE-443D-8CFF-87B9779942D7}" dt="2018-01-22T08:35:54.179" v="1547" actId="478"/>
-          <ac:spMkLst>
-            <pc:docMk/>
-            <pc:sldMk cId="2850723065" sldId="264"/>
-            <ac:spMk id="34" creationId="{7A139566-0494-499B-A05C-17A70D96A3E0}"/>
-          </ac:spMkLst>
-        </pc:spChg>
-        <pc:spChg chg="del">
-          <ac:chgData name="Tim Schlottmann" userId="470020b021055e8f" providerId="LiveId" clId="{C000F36B-97BE-443D-8CFF-87B9779942D7}" dt="2018-01-20T17:34:35.775" v="2" actId="478"/>
-          <ac:spMkLst>
-            <pc:docMk/>
-            <pc:sldMk cId="2850723065" sldId="264"/>
-            <ac:spMk id="34" creationId="{A198DFF1-2CC2-41CB-8CBD-B56CF494816E}"/>
-          </ac:spMkLst>
-        </pc:spChg>
-        <pc:spChg chg="del">
-          <ac:chgData name="Tim Schlottmann" userId="470020b021055e8f" providerId="LiveId" clId="{C000F36B-97BE-443D-8CFF-87B9779942D7}" dt="2018-01-20T17:34:35.775" v="2" actId="478"/>
-          <ac:spMkLst>
-            <pc:docMk/>
-            <pc:sldMk cId="2850723065" sldId="264"/>
-            <ac:spMk id="35" creationId="{157B382F-221F-4D16-BAB7-5E9FD658795A}"/>
-          </ac:spMkLst>
-        </pc:spChg>
-        <pc:spChg chg="add del">
-          <ac:chgData name="Tim Schlottmann" userId="470020b021055e8f" providerId="LiveId" clId="{C000F36B-97BE-443D-8CFF-87B9779942D7}" dt="2018-01-22T08:35:54.179" v="1547" actId="478"/>
-          <ac:spMkLst>
-            <pc:docMk/>
-            <pc:sldMk cId="2850723065" sldId="264"/>
-            <ac:spMk id="35" creationId="{CF861807-FFD6-4D9F-A39C-943D066334EC}"/>
-          </ac:spMkLst>
-        </pc:spChg>
-        <pc:spChg chg="add del">
-          <ac:chgData name="Tim Schlottmann" userId="470020b021055e8f" providerId="LiveId" clId="{C000F36B-97BE-443D-8CFF-87B9779942D7}" dt="2018-01-22T08:35:54.179" v="1547" actId="478"/>
-          <ac:spMkLst>
-            <pc:docMk/>
-            <pc:sldMk cId="2850723065" sldId="264"/>
-            <ac:spMk id="36" creationId="{7F35D771-84D4-4A42-A3D3-E6C2FE274DA7}"/>
-          </ac:spMkLst>
-        </pc:spChg>
-        <pc:spChg chg="add del">
-          <ac:chgData name="Tim Schlottmann" userId="470020b021055e8f" providerId="LiveId" clId="{C000F36B-97BE-443D-8CFF-87B9779942D7}" dt="2018-01-22T08:35:54.179" v="1547" actId="478"/>
-          <ac:spMkLst>
-            <pc:docMk/>
-            <pc:sldMk cId="2850723065" sldId="264"/>
-            <ac:spMk id="37" creationId="{EE77FDD6-5EE9-4972-88BD-D8A6BDAE1D2B}"/>
-          </ac:spMkLst>
-        </pc:spChg>
-        <pc:spChg chg="add del">
-          <ac:chgData name="Tim Schlottmann" userId="470020b021055e8f" providerId="LiveId" clId="{C000F36B-97BE-443D-8CFF-87B9779942D7}" dt="2018-01-22T08:36:01.606" v="1548" actId="478"/>
-          <ac:spMkLst>
-            <pc:docMk/>
-            <pc:sldMk cId="2850723065" sldId="264"/>
-            <ac:spMk id="38" creationId="{CEF8CAA0-2EE9-41B3-B808-C61B66A3A508}"/>
+            <ac:spMk id="54" creationId="{FCB11FF0-7AAF-4B51-88B0-6F5538788E7F}"/>
           </ac:spMkLst>
         </pc:spChg>
         <pc:spChg chg="add mod ord">
@@ -529,7 +592,7 @@
           <ac:spMkLst>
             <pc:docMk/>
             <pc:sldMk cId="2850723065" sldId="264"/>
-            <ac:spMk id="39" creationId="{8814A5B4-EBC3-44B6-87C5-1CADD728C9F0}"/>
+            <ac:spMk id="54" creationId="{0AAC540F-0D4F-416A-9E39-19EA0195098B}"/>
           </ac:spMkLst>
         </pc:spChg>
         <pc:spChg chg="add mod ord">
@@ -537,87 +600,7 @@
           <ac:spMkLst>
             <pc:docMk/>
             <pc:sldMk cId="2850723065" sldId="264"/>
-            <ac:spMk id="40" creationId="{02A3CF32-B82A-4B2E-ADA7-22A39825BE7B}"/>
-          </ac:spMkLst>
-        </pc:spChg>
-        <pc:spChg chg="add mod ord">
-          <ac:chgData name="Tim Schlottmann" userId="470020b021055e8f" providerId="LiveId" clId="{C000F36B-97BE-443D-8CFF-87B9779942D7}" dt="2018-01-22T08:42:28.705" v="2048" actId="167"/>
-          <ac:spMkLst>
-            <pc:docMk/>
-            <pc:sldMk cId="2850723065" sldId="264"/>
-            <ac:spMk id="42" creationId="{C8C9D8EC-931A-49BB-806D-FB1E3D8B8C29}"/>
-          </ac:spMkLst>
-        </pc:spChg>
-        <pc:spChg chg="add mod ord">
-          <ac:chgData name="Tim Schlottmann" userId="470020b021055e8f" providerId="LiveId" clId="{C000F36B-97BE-443D-8CFF-87B9779942D7}" dt="2018-01-22T08:42:28.705" v="2048" actId="167"/>
-          <ac:spMkLst>
-            <pc:docMk/>
-            <pc:sldMk cId="2850723065" sldId="264"/>
-            <ac:spMk id="43" creationId="{2D252C2B-B329-4311-B1C0-736DCC124CAE}"/>
-          </ac:spMkLst>
-        </pc:spChg>
-        <pc:spChg chg="del">
-          <ac:chgData name="Tim Schlottmann" userId="470020b021055e8f" providerId="LiveId" clId="{C000F36B-97BE-443D-8CFF-87B9779942D7}" dt="2018-01-20T17:34:31.648" v="1" actId="478"/>
-          <ac:spMkLst>
-            <pc:docMk/>
-            <pc:sldMk cId="2850723065" sldId="264"/>
-            <ac:spMk id="44" creationId="{F85B0C1B-3C32-4292-BB39-ED1D8AF89B49}"/>
-          </ac:spMkLst>
-        </pc:spChg>
-        <pc:spChg chg="del">
-          <ac:chgData name="Tim Schlottmann" userId="470020b021055e8f" providerId="LiveId" clId="{C000F36B-97BE-443D-8CFF-87B9779942D7}" dt="2018-01-20T17:34:35.775" v="2" actId="478"/>
-          <ac:spMkLst>
-            <pc:docMk/>
-            <pc:sldMk cId="2850723065" sldId="264"/>
-            <ac:spMk id="45" creationId="{84727141-D111-4B46-A7C7-84D1CE6EF995}"/>
-          </ac:spMkLst>
-        </pc:spChg>
-        <pc:spChg chg="add del mod">
-          <ac:chgData name="Tim Schlottmann" userId="470020b021055e8f" providerId="LiveId" clId="{C000F36B-97BE-443D-8CFF-87B9779942D7}" dt="2018-01-22T08:35:02.231" v="1545" actId="478"/>
-          <ac:spMkLst>
-            <pc:docMk/>
-            <pc:sldMk cId="2850723065" sldId="264"/>
-            <ac:spMk id="47" creationId="{43553256-C4D5-494A-8EC7-D858A5B1158E}"/>
-          </ac:spMkLst>
-        </pc:spChg>
-        <pc:spChg chg="add del mod">
-          <ac:chgData name="Tim Schlottmann" userId="470020b021055e8f" providerId="LiveId" clId="{C000F36B-97BE-443D-8CFF-87B9779942D7}" dt="2018-01-22T08:35:02.231" v="1545" actId="478"/>
-          <ac:spMkLst>
-            <pc:docMk/>
-            <pc:sldMk cId="2850723065" sldId="264"/>
-            <ac:spMk id="48" creationId="{BE3CA54F-D8F2-4BA2-99D7-04385D5715C0}"/>
-          </ac:spMkLst>
-        </pc:spChg>
-        <pc:spChg chg="del">
-          <ac:chgData name="Tim Schlottmann" userId="470020b021055e8f" providerId="LiveId" clId="{C000F36B-97BE-443D-8CFF-87B9779942D7}" dt="2018-01-20T17:34:35.775" v="2" actId="478"/>
-          <ac:spMkLst>
-            <pc:docMk/>
-            <pc:sldMk cId="2850723065" sldId="264"/>
-            <ac:spMk id="51" creationId="{07BCEE0B-2544-4A44-88DA-82D9E067FA49}"/>
-          </ac:spMkLst>
-        </pc:spChg>
-        <pc:spChg chg="del">
-          <ac:chgData name="Tim Schlottmann" userId="470020b021055e8f" providerId="LiveId" clId="{C000F36B-97BE-443D-8CFF-87B9779942D7}" dt="2018-01-20T17:34:35.775" v="2" actId="478"/>
-          <ac:spMkLst>
-            <pc:docMk/>
-            <pc:sldMk cId="2850723065" sldId="264"/>
-            <ac:spMk id="52" creationId="{1AF2E22B-59A2-43F1-B4C5-9487BD71672E}"/>
-          </ac:spMkLst>
-        </pc:spChg>
-        <pc:spChg chg="del">
-          <ac:chgData name="Tim Schlottmann" userId="470020b021055e8f" providerId="LiveId" clId="{C000F36B-97BE-443D-8CFF-87B9779942D7}" dt="2018-01-20T17:34:35.775" v="2" actId="478"/>
-          <ac:spMkLst>
-            <pc:docMk/>
-            <pc:sldMk cId="2850723065" sldId="264"/>
-            <ac:spMk id="53" creationId="{B4CA39D5-4892-4955-9C1B-0E55B2DE827C}"/>
-          </ac:spMkLst>
-        </pc:spChg>
-        <pc:spChg chg="add mod ord">
-          <ac:chgData name="Tim Schlottmann" userId="470020b021055e8f" providerId="LiveId" clId="{C000F36B-97BE-443D-8CFF-87B9779942D7}" dt="2018-01-22T08:42:28.705" v="2048" actId="167"/>
-          <ac:spMkLst>
-            <pc:docMk/>
-            <pc:sldMk cId="2850723065" sldId="264"/>
-            <ac:spMk id="54" creationId="{0AAC540F-0D4F-416A-9E39-19EA0195098B}"/>
+            <ac:spMk id="55" creationId="{FE712AE9-8335-414C-9303-EEEF344FFE8D}"/>
           </ac:spMkLst>
         </pc:spChg>
         <pc:spChg chg="del mod">
@@ -625,27 +608,11 @@
           <ac:spMkLst>
             <pc:docMk/>
             <pc:sldMk cId="2850723065" sldId="264"/>
-            <ac:spMk id="54" creationId="{FCB11FF0-7AAF-4B51-88B0-6F5538788E7F}"/>
-          </ac:spMkLst>
-        </pc:spChg>
-        <pc:spChg chg="del mod">
-          <ac:chgData name="Tim Schlottmann" userId="470020b021055e8f" providerId="LiveId" clId="{C000F36B-97BE-443D-8CFF-87B9779942D7}" dt="2018-01-20T17:39:23.931" v="71" actId="478"/>
-          <ac:spMkLst>
-            <pc:docMk/>
-            <pc:sldMk cId="2850723065" sldId="264"/>
             <ac:spMk id="55" creationId="{B2D910E1-DA0C-46B6-94FD-7FD5DD83EC6E}"/>
           </ac:spMkLst>
         </pc:spChg>
-        <pc:spChg chg="add mod ord">
-          <ac:chgData name="Tim Schlottmann" userId="470020b021055e8f" providerId="LiveId" clId="{C000F36B-97BE-443D-8CFF-87B9779942D7}" dt="2018-01-22T08:42:28.705" v="2048" actId="167"/>
-          <ac:spMkLst>
-            <pc:docMk/>
-            <pc:sldMk cId="2850723065" sldId="264"/>
-            <ac:spMk id="55" creationId="{FE712AE9-8335-414C-9303-EEEF344FFE8D}"/>
-          </ac:spMkLst>
-        </pc:spChg>
         <pc:spChg chg="add mod">
-          <ac:chgData name="Tim Schlottmann" userId="470020b021055e8f" providerId="LiveId" clId="{C000F36B-97BE-443D-8CFF-87B9779942D7}" dt="2018-01-22T08:44:56.263" v="2067" actId="1076"/>
+          <ac:chgData name="Tim Schlottmann" userId="470020b021055e8f" providerId="LiveId" clId="{C000F36B-97BE-443D-8CFF-87B9779942D7}" dt="2018-01-25T08:11:12.820" v="2263"/>
           <ac:spMkLst>
             <pc:docMk/>
             <pc:sldMk cId="2850723065" sldId="264"/>
@@ -653,7 +620,7 @@
           </ac:spMkLst>
         </pc:spChg>
         <pc:spChg chg="add mod">
-          <ac:chgData name="Tim Schlottmann" userId="470020b021055e8f" providerId="LiveId" clId="{C000F36B-97BE-443D-8CFF-87B9779942D7}" dt="2018-01-22T08:45:01.742" v="2071" actId="20577"/>
+          <ac:chgData name="Tim Schlottmann" userId="470020b021055e8f" providerId="LiveId" clId="{C000F36B-97BE-443D-8CFF-87B9779942D7}" dt="2018-01-25T08:11:12.820" v="2263"/>
           <ac:spMkLst>
             <pc:docMk/>
             <pc:sldMk cId="2850723065" sldId="264"/>
@@ -909,86 +876,8 @@
           </ac:cxnSpMkLst>
         </pc:cxnChg>
       </pc:sldChg>
-      <pc:sldChg chg="addSp modSp add del">
-        <pc:chgData name="Tim Schlottmann" userId="470020b021055e8f" providerId="LiveId" clId="{C000F36B-97BE-443D-8CFF-87B9779942D7}" dt="2018-01-21T15:21:48.205" v="147" actId="2696"/>
-        <pc:sldMkLst>
-          <pc:docMk/>
-          <pc:sldMk cId="816035855" sldId="265"/>
-        </pc:sldMkLst>
-        <pc:spChg chg="add mod">
-          <ac:chgData name="Tim Schlottmann" userId="470020b021055e8f" providerId="LiveId" clId="{C000F36B-97BE-443D-8CFF-87B9779942D7}" dt="2018-01-21T10:15:24.011" v="76" actId="20577"/>
-          <ac:spMkLst>
-            <pc:docMk/>
-            <pc:sldMk cId="816035855" sldId="265"/>
-            <ac:spMk id="39" creationId="{CC0A9E54-7505-4BA4-B88B-4DBF17D5D21A}"/>
-          </ac:spMkLst>
-        </pc:spChg>
-        <pc:spChg chg="add mod">
-          <ac:chgData name="Tim Schlottmann" userId="470020b021055e8f" providerId="LiveId" clId="{C000F36B-97BE-443D-8CFF-87B9779942D7}" dt="2018-01-21T10:15:31.894" v="80" actId="20577"/>
-          <ac:spMkLst>
-            <pc:docMk/>
-            <pc:sldMk cId="816035855" sldId="265"/>
-            <ac:spMk id="40" creationId="{6B67CD5D-BADD-4360-8B80-B55C1624C01E}"/>
-          </ac:spMkLst>
-        </pc:spChg>
-        <pc:spChg chg="add mod">
-          <ac:chgData name="Tim Schlottmann" userId="470020b021055e8f" providerId="LiveId" clId="{C000F36B-97BE-443D-8CFF-87B9779942D7}" dt="2018-01-21T10:15:42.154" v="85" actId="1076"/>
-          <ac:spMkLst>
-            <pc:docMk/>
-            <pc:sldMk cId="816035855" sldId="265"/>
-            <ac:spMk id="42" creationId="{DE4700D5-A6FF-4043-BDB9-19698B96C9F0}"/>
-          </ac:spMkLst>
-        </pc:spChg>
-        <pc:spChg chg="add mod">
-          <ac:chgData name="Tim Schlottmann" userId="470020b021055e8f" providerId="LiveId" clId="{C000F36B-97BE-443D-8CFF-87B9779942D7}" dt="2018-01-21T10:15:49.381" v="89" actId="20577"/>
-          <ac:spMkLst>
-            <pc:docMk/>
-            <pc:sldMk cId="816035855" sldId="265"/>
-            <ac:spMk id="50" creationId="{CE987F7D-3613-4649-B105-ABC132A9B8EB}"/>
-          </ac:spMkLst>
-        </pc:spChg>
-        <pc:spChg chg="add mod">
-          <ac:chgData name="Tim Schlottmann" userId="470020b021055e8f" providerId="LiveId" clId="{C000F36B-97BE-443D-8CFF-87B9779942D7}" dt="2018-01-21T10:15:56.614" v="93" actId="20577"/>
-          <ac:spMkLst>
-            <pc:docMk/>
-            <pc:sldMk cId="816035855" sldId="265"/>
-            <ac:spMk id="51" creationId="{2BF2FCAF-2895-43DB-832E-AB0996EE19BF}"/>
-          </ac:spMkLst>
-        </pc:spChg>
-      </pc:sldChg>
-      <pc:sldChg chg="addSp modSp add del">
-        <pc:chgData name="Tim Schlottmann" userId="470020b021055e8f" providerId="LiveId" clId="{C000F36B-97BE-443D-8CFF-87B9779942D7}" dt="2018-01-21T15:21:48.321" v="153" actId="2696"/>
-        <pc:sldMkLst>
-          <pc:docMk/>
-          <pc:sldMk cId="1494145219" sldId="266"/>
-        </pc:sldMkLst>
-        <pc:spChg chg="add mod">
-          <ac:chgData name="Tim Schlottmann" userId="470020b021055e8f" providerId="LiveId" clId="{C000F36B-97BE-443D-8CFF-87B9779942D7}" dt="2018-01-21T13:49:07.231" v="111" actId="255"/>
-          <ac:spMkLst>
-            <pc:docMk/>
-            <pc:sldMk cId="1494145219" sldId="266"/>
-            <ac:spMk id="2" creationId="{9AEF42CA-CFC5-4348-91D4-D1685B0F626A}"/>
-          </ac:spMkLst>
-        </pc:spChg>
-        <pc:spChg chg="add mod">
-          <ac:chgData name="Tim Schlottmann" userId="470020b021055e8f" providerId="LiveId" clId="{C000F36B-97BE-443D-8CFF-87B9779942D7}" dt="2018-01-21T13:49:19.617" v="115" actId="1076"/>
-          <ac:spMkLst>
-            <pc:docMk/>
-            <pc:sldMk cId="1494145219" sldId="266"/>
-            <ac:spMk id="41" creationId="{1F3ACC50-D4E4-4157-888B-B90C2CB1E0A2}"/>
-          </ac:spMkLst>
-        </pc:spChg>
-        <pc:spChg chg="add mod">
-          <ac:chgData name="Tim Schlottmann" userId="470020b021055e8f" providerId="LiveId" clId="{C000F36B-97BE-443D-8CFF-87B9779942D7}" dt="2018-01-21T13:49:35.288" v="121" actId="1076"/>
-          <ac:spMkLst>
-            <pc:docMk/>
-            <pc:sldMk cId="1494145219" sldId="266"/>
-            <ac:spMk id="46" creationId="{4EDCE384-DE7F-4C4E-AE1E-F0B83D5477D1}"/>
-          </ac:spMkLst>
-        </pc:spChg>
-      </pc:sldChg>
       <pc:sldChg chg="addSp delSp modSp add">
-        <pc:chgData name="Tim Schlottmann" userId="470020b021055e8f" providerId="LiveId" clId="{C000F36B-97BE-443D-8CFF-87B9779942D7}" dt="2018-01-21T16:16:29.413" v="831" actId="167"/>
+        <pc:chgData name="Tim Schlottmann" userId="470020b021055e8f" providerId="LiveId" clId="{C000F36B-97BE-443D-8CFF-87B9779942D7}" dt="2018-01-25T08:12:15.431" v="2278"/>
         <pc:sldMkLst>
           <pc:docMk/>
           <pc:sldMk cId="3022030190" sldId="267"/>
@@ -1041,16 +930,32 @@
             <ac:spMk id="14" creationId="{BBC06CCD-1614-43B7-81DB-DE657B391DC0}"/>
           </ac:spMkLst>
         </pc:spChg>
-        <pc:spChg chg="add mod">
-          <ac:chgData name="Tim Schlottmann" userId="470020b021055e8f" providerId="LiveId" clId="{C000F36B-97BE-443D-8CFF-87B9779942D7}" dt="2018-01-21T16:16:24.573" v="830" actId="1076"/>
+        <pc:spChg chg="add">
+          <ac:chgData name="Tim Schlottmann" userId="470020b021055e8f" providerId="LiveId" clId="{C000F36B-97BE-443D-8CFF-87B9779942D7}" dt="2018-01-25T08:12:15.431" v="2278"/>
+          <ac:spMkLst>
+            <pc:docMk/>
+            <pc:sldMk cId="3022030190" sldId="267"/>
+            <ac:spMk id="20" creationId="{B345AF0E-FE28-463B-B02B-B8D5E82CECC4}"/>
+          </ac:spMkLst>
+        </pc:spChg>
+        <pc:spChg chg="add">
+          <ac:chgData name="Tim Schlottmann" userId="470020b021055e8f" providerId="LiveId" clId="{C000F36B-97BE-443D-8CFF-87B9779942D7}" dt="2018-01-25T08:12:15.431" v="2278"/>
+          <ac:spMkLst>
+            <pc:docMk/>
+            <pc:sldMk cId="3022030190" sldId="267"/>
+            <ac:spMk id="21" creationId="{A6360DD5-5EC1-4BB5-A977-F8CFF0D8FDD0}"/>
+          </ac:spMkLst>
+        </pc:spChg>
+        <pc:spChg chg="add del mod">
+          <ac:chgData name="Tim Schlottmann" userId="470020b021055e8f" providerId="LiveId" clId="{C000F36B-97BE-443D-8CFF-87B9779942D7}" dt="2018-01-25T08:12:15.238" v="2277" actId="478"/>
           <ac:spMkLst>
             <pc:docMk/>
             <pc:sldMk cId="3022030190" sldId="267"/>
             <ac:spMk id="38" creationId="{7740FBD9-AA17-45D5-95D5-33EB8A0DFF38}"/>
           </ac:spMkLst>
         </pc:spChg>
-        <pc:spChg chg="add mod">
-          <ac:chgData name="Tim Schlottmann" userId="470020b021055e8f" providerId="LiveId" clId="{C000F36B-97BE-443D-8CFF-87B9779942D7}" dt="2018-01-21T16:16:24.573" v="830" actId="1076"/>
+        <pc:spChg chg="add del mod">
+          <ac:chgData name="Tim Schlottmann" userId="470020b021055e8f" providerId="LiveId" clId="{C000F36B-97BE-443D-8CFF-87B9779942D7}" dt="2018-01-25T08:12:15.238" v="2277" actId="478"/>
           <ac:spMkLst>
             <pc:docMk/>
             <pc:sldMk cId="3022030190" sldId="267"/>
@@ -1203,7 +1108,7 @@
         </pc:cxnChg>
       </pc:sldChg>
       <pc:sldChg chg="addSp delSp modSp add ord">
-        <pc:chgData name="Tim Schlottmann" userId="470020b021055e8f" providerId="LiveId" clId="{C000F36B-97BE-443D-8CFF-87B9779942D7}" dt="2018-01-21T16:16:10.221" v="829" actId="1076"/>
+        <pc:chgData name="Tim Schlottmann" userId="470020b021055e8f" providerId="LiveId" clId="{C000F36B-97BE-443D-8CFF-87B9779942D7}" dt="2018-01-25T08:12:04.291" v="2274" actId="1076"/>
         <pc:sldMkLst>
           <pc:docMk/>
           <pc:sldMk cId="133058693" sldId="268"/>
@@ -1249,7 +1154,7 @@
           </ac:spMkLst>
         </pc:spChg>
         <pc:spChg chg="add mod">
-          <ac:chgData name="Tim Schlottmann" userId="470020b021055e8f" providerId="LiveId" clId="{C000F36B-97BE-443D-8CFF-87B9779942D7}" dt="2018-01-21T16:16:10.221" v="829" actId="1076"/>
+          <ac:chgData name="Tim Schlottmann" userId="470020b021055e8f" providerId="LiveId" clId="{C000F36B-97BE-443D-8CFF-87B9779942D7}" dt="2018-01-25T08:12:04.291" v="2274" actId="1076"/>
           <ac:spMkLst>
             <pc:docMk/>
             <pc:sldMk cId="133058693" sldId="268"/>
@@ -1257,7 +1162,7 @@
           </ac:spMkLst>
         </pc:spChg>
         <pc:spChg chg="add mod">
-          <ac:chgData name="Tim Schlottmann" userId="470020b021055e8f" providerId="LiveId" clId="{C000F36B-97BE-443D-8CFF-87B9779942D7}" dt="2018-01-21T16:16:10.221" v="829" actId="1076"/>
+          <ac:chgData name="Tim Schlottmann" userId="470020b021055e8f" providerId="LiveId" clId="{C000F36B-97BE-443D-8CFF-87B9779942D7}" dt="2018-01-25T08:11:51.123" v="2270" actId="1076"/>
           <ac:spMkLst>
             <pc:docMk/>
             <pc:sldMk cId="133058693" sldId="268"/>
@@ -1393,7 +1298,7 @@
           </ac:cxnSpMkLst>
         </pc:cxnChg>
         <pc:cxnChg chg="mod">
-          <ac:chgData name="Tim Schlottmann" userId="470020b021055e8f" providerId="LiveId" clId="{C000F36B-97BE-443D-8CFF-87B9779942D7}" dt="2018-01-21T16:16:10.221" v="829" actId="1076"/>
+          <ac:chgData name="Tim Schlottmann" userId="470020b021055e8f" providerId="LiveId" clId="{C000F36B-97BE-443D-8CFF-87B9779942D7}" dt="2018-01-25T08:11:56.720" v="2273" actId="1076"/>
           <ac:cxnSpMkLst>
             <pc:docMk/>
             <pc:sldMk cId="133058693" sldId="268"/>
@@ -1401,175 +1306,8 @@
           </ac:cxnSpMkLst>
         </pc:cxnChg>
       </pc:sldChg>
-      <pc:sldChg chg="addSp modSp add del">
-        <pc:chgData name="Tim Schlottmann" userId="470020b021055e8f" providerId="LiveId" clId="{C000F36B-97BE-443D-8CFF-87B9779942D7}" dt="2018-01-21T16:17:29.826" v="838" actId="2696"/>
-        <pc:sldMkLst>
-          <pc:docMk/>
-          <pc:sldMk cId="3606153008" sldId="269"/>
-        </pc:sldMkLst>
-        <pc:spChg chg="mod">
-          <ac:chgData name="Tim Schlottmann" userId="470020b021055e8f" providerId="LiveId" clId="{C000F36B-97BE-443D-8CFF-87B9779942D7}" dt="2018-01-21T16:17:09.683" v="836" actId="1076"/>
-          <ac:spMkLst>
-            <pc:docMk/>
-            <pc:sldMk cId="3606153008" sldId="269"/>
-            <ac:spMk id="10" creationId="{F004686E-ACC2-42E2-86F0-87E0FF525FFC}"/>
-          </ac:spMkLst>
-        </pc:spChg>
-        <pc:spChg chg="mod">
-          <ac:chgData name="Tim Schlottmann" userId="470020b021055e8f" providerId="LiveId" clId="{C000F36B-97BE-443D-8CFF-87B9779942D7}" dt="2018-01-21T16:17:09.683" v="836" actId="1076"/>
-          <ac:spMkLst>
-            <pc:docMk/>
-            <pc:sldMk cId="3606153008" sldId="269"/>
-            <ac:spMk id="11" creationId="{8B5BF29F-EA77-4B39-BA95-2E02113F8375}"/>
-          </ac:spMkLst>
-        </pc:spChg>
-        <pc:spChg chg="mod">
-          <ac:chgData name="Tim Schlottmann" userId="470020b021055e8f" providerId="LiveId" clId="{C000F36B-97BE-443D-8CFF-87B9779942D7}" dt="2018-01-21T16:17:09.683" v="836" actId="1076"/>
-          <ac:spMkLst>
-            <pc:docMk/>
-            <pc:sldMk cId="3606153008" sldId="269"/>
-            <ac:spMk id="12" creationId="{64566904-73CD-4DEB-BFE2-7A706AE94C60}"/>
-          </ac:spMkLst>
-        </pc:spChg>
-        <pc:spChg chg="mod">
-          <ac:chgData name="Tim Schlottmann" userId="470020b021055e8f" providerId="LiveId" clId="{C000F36B-97BE-443D-8CFF-87B9779942D7}" dt="2018-01-21T16:17:09.683" v="836" actId="1076"/>
-          <ac:spMkLst>
-            <pc:docMk/>
-            <pc:sldMk cId="3606153008" sldId="269"/>
-            <ac:spMk id="13" creationId="{60A85083-7920-436B-883D-325FFCF262D9}"/>
-          </ac:spMkLst>
-        </pc:spChg>
-        <pc:spChg chg="mod">
-          <ac:chgData name="Tim Schlottmann" userId="470020b021055e8f" providerId="LiveId" clId="{C000F36B-97BE-443D-8CFF-87B9779942D7}" dt="2018-01-21T16:17:09.683" v="836" actId="1076"/>
-          <ac:spMkLst>
-            <pc:docMk/>
-            <pc:sldMk cId="3606153008" sldId="269"/>
-            <ac:spMk id="14" creationId="{BBC06CCD-1614-43B7-81DB-DE657B391DC0}"/>
-          </ac:spMkLst>
-        </pc:spChg>
-        <pc:spChg chg="add mod">
-          <ac:chgData name="Tim Schlottmann" userId="470020b021055e8f" providerId="LiveId" clId="{C000F36B-97BE-443D-8CFF-87B9779942D7}" dt="2018-01-21T16:17:09.683" v="836" actId="1076"/>
-          <ac:spMkLst>
-            <pc:docMk/>
-            <pc:sldMk cId="3606153008" sldId="269"/>
-            <ac:spMk id="16" creationId="{4C333446-BF75-438A-B4A4-81D9E74F6813}"/>
-          </ac:spMkLst>
-        </pc:spChg>
-        <pc:spChg chg="add mod">
-          <ac:chgData name="Tim Schlottmann" userId="470020b021055e8f" providerId="LiveId" clId="{C000F36B-97BE-443D-8CFF-87B9779942D7}" dt="2018-01-21T16:17:09.683" v="836" actId="1076"/>
-          <ac:spMkLst>
-            <pc:docMk/>
-            <pc:sldMk cId="3606153008" sldId="269"/>
-            <ac:spMk id="17" creationId="{5F5C8FCD-2E8D-412E-B9F4-8A0825C45D62}"/>
-          </ac:spMkLst>
-        </pc:spChg>
-        <pc:spChg chg="add">
-          <ac:chgData name="Tim Schlottmann" userId="470020b021055e8f" providerId="LiveId" clId="{C000F36B-97BE-443D-8CFF-87B9779942D7}" dt="2018-01-21T16:17:27.173" v="837" actId="2696"/>
-          <ac:spMkLst>
-            <pc:docMk/>
-            <pc:sldMk cId="3606153008" sldId="269"/>
-            <ac:spMk id="20" creationId="{C0A77345-92D6-4027-871C-47E9A37FE617}"/>
-          </ac:spMkLst>
-        </pc:spChg>
-        <pc:spChg chg="add">
-          <ac:chgData name="Tim Schlottmann" userId="470020b021055e8f" providerId="LiveId" clId="{C000F36B-97BE-443D-8CFF-87B9779942D7}" dt="2018-01-21T16:17:27.173" v="837" actId="2696"/>
-          <ac:spMkLst>
-            <pc:docMk/>
-            <pc:sldMk cId="3606153008" sldId="269"/>
-            <ac:spMk id="21" creationId="{B1971937-1CD0-4C0E-93E2-001EAEB022BD}"/>
-          </ac:spMkLst>
-        </pc:spChg>
-        <pc:spChg chg="add">
-          <ac:chgData name="Tim Schlottmann" userId="470020b021055e8f" providerId="LiveId" clId="{C000F36B-97BE-443D-8CFF-87B9779942D7}" dt="2018-01-21T16:17:27.173" v="837" actId="2696"/>
-          <ac:spMkLst>
-            <pc:docMk/>
-            <pc:sldMk cId="3606153008" sldId="269"/>
-            <ac:spMk id="22" creationId="{ECD2019B-BE04-4E71-B34D-83D988966841}"/>
-          </ac:spMkLst>
-        </pc:spChg>
-        <pc:spChg chg="add">
-          <ac:chgData name="Tim Schlottmann" userId="470020b021055e8f" providerId="LiveId" clId="{C000F36B-97BE-443D-8CFF-87B9779942D7}" dt="2018-01-21T16:17:27.173" v="837" actId="2696"/>
-          <ac:spMkLst>
-            <pc:docMk/>
-            <pc:sldMk cId="3606153008" sldId="269"/>
-            <ac:spMk id="23" creationId="{3BCA17E7-DF7D-496E-B47F-C4EB516F8B99}"/>
-          </ac:spMkLst>
-        </pc:spChg>
-        <pc:spChg chg="add">
-          <ac:chgData name="Tim Schlottmann" userId="470020b021055e8f" providerId="LiveId" clId="{C000F36B-97BE-443D-8CFF-87B9779942D7}" dt="2018-01-21T16:17:27.173" v="837" actId="2696"/>
-          <ac:spMkLst>
-            <pc:docMk/>
-            <pc:sldMk cId="3606153008" sldId="269"/>
-            <ac:spMk id="24" creationId="{952F3BEB-ABB4-414D-8371-C751FED85536}"/>
-          </ac:spMkLst>
-        </pc:spChg>
-        <pc:cxnChg chg="mod">
-          <ac:chgData name="Tim Schlottmann" userId="470020b021055e8f" providerId="LiveId" clId="{C000F36B-97BE-443D-8CFF-87B9779942D7}" dt="2018-01-21T16:17:09.683" v="836" actId="1076"/>
-          <ac:cxnSpMkLst>
-            <pc:docMk/>
-            <pc:sldMk cId="3606153008" sldId="269"/>
-            <ac:cxnSpMk id="7" creationId="{516B28A6-9051-45BA-894E-0E9071D263B4}"/>
-          </ac:cxnSpMkLst>
-        </pc:cxnChg>
-        <pc:cxnChg chg="mod">
-          <ac:chgData name="Tim Schlottmann" userId="470020b021055e8f" providerId="LiveId" clId="{C000F36B-97BE-443D-8CFF-87B9779942D7}" dt="2018-01-21T16:17:09.683" v="836" actId="1076"/>
-          <ac:cxnSpMkLst>
-            <pc:docMk/>
-            <pc:sldMk cId="3606153008" sldId="269"/>
-            <ac:cxnSpMk id="9" creationId="{4009F518-7733-4AF3-BCE2-3A7836A6EECF}"/>
-          </ac:cxnSpMkLst>
-        </pc:cxnChg>
-        <pc:cxnChg chg="mod">
-          <ac:chgData name="Tim Schlottmann" userId="470020b021055e8f" providerId="LiveId" clId="{C000F36B-97BE-443D-8CFF-87B9779942D7}" dt="2018-01-21T16:17:09.683" v="836" actId="1076"/>
-          <ac:cxnSpMkLst>
-            <pc:docMk/>
-            <pc:sldMk cId="3606153008" sldId="269"/>
-            <ac:cxnSpMk id="15" creationId="{A73814A9-BC19-4FC4-A847-85A02F89036A}"/>
-          </ac:cxnSpMkLst>
-        </pc:cxnChg>
-        <pc:cxnChg chg="mod">
-          <ac:chgData name="Tim Schlottmann" userId="470020b021055e8f" providerId="LiveId" clId="{C000F36B-97BE-443D-8CFF-87B9779942D7}" dt="2018-01-21T16:17:09.683" v="836" actId="1076"/>
-          <ac:cxnSpMkLst>
-            <pc:docMk/>
-            <pc:sldMk cId="3606153008" sldId="269"/>
-            <ac:cxnSpMk id="18" creationId="{94A878C1-5D6B-41BF-A54B-42641340A33A}"/>
-          </ac:cxnSpMkLst>
-        </pc:cxnChg>
-        <pc:cxnChg chg="mod">
-          <ac:chgData name="Tim Schlottmann" userId="470020b021055e8f" providerId="LiveId" clId="{C000F36B-97BE-443D-8CFF-87B9779942D7}" dt="2018-01-21T16:17:09.683" v="836" actId="1076"/>
-          <ac:cxnSpMkLst>
-            <pc:docMk/>
-            <pc:sldMk cId="3606153008" sldId="269"/>
-            <ac:cxnSpMk id="19" creationId="{B7AF5DDF-0DE2-43BC-953B-F2BE3F78A3E3}"/>
-          </ac:cxnSpMkLst>
-        </pc:cxnChg>
-        <pc:cxnChg chg="mod">
-          <ac:chgData name="Tim Schlottmann" userId="470020b021055e8f" providerId="LiveId" clId="{C000F36B-97BE-443D-8CFF-87B9779942D7}" dt="2018-01-21T16:17:09.683" v="836" actId="1076"/>
-          <ac:cxnSpMkLst>
-            <pc:docMk/>
-            <pc:sldMk cId="3606153008" sldId="269"/>
-            <ac:cxnSpMk id="26" creationId="{894338E8-CBC0-4752-98E7-8D713BE84578}"/>
-          </ac:cxnSpMkLst>
-        </pc:cxnChg>
-        <pc:cxnChg chg="mod">
-          <ac:chgData name="Tim Schlottmann" userId="470020b021055e8f" providerId="LiveId" clId="{C000F36B-97BE-443D-8CFF-87B9779942D7}" dt="2018-01-21T16:17:09.683" v="836" actId="1076"/>
-          <ac:cxnSpMkLst>
-            <pc:docMk/>
-            <pc:sldMk cId="3606153008" sldId="269"/>
-            <ac:cxnSpMk id="29" creationId="{3B71BDD6-B1AA-42F7-8996-3B84004A3D1F}"/>
-          </ac:cxnSpMkLst>
-        </pc:cxnChg>
-        <pc:cxnChg chg="mod">
-          <ac:chgData name="Tim Schlottmann" userId="470020b021055e8f" providerId="LiveId" clId="{C000F36B-97BE-443D-8CFF-87B9779942D7}" dt="2018-01-21T16:17:09.683" v="836" actId="1076"/>
-          <ac:cxnSpMkLst>
-            <pc:docMk/>
-            <pc:sldMk cId="3606153008" sldId="269"/>
-            <ac:cxnSpMk id="31" creationId="{610A9F57-90A2-4EB2-9EF5-B9179A246745}"/>
-          </ac:cxnSpMkLst>
-        </pc:cxnChg>
-      </pc:sldChg>
-      <pc:sldChg chg="addSp modSp add">
-        <pc:chgData name="Tim Schlottmann" userId="470020b021055e8f" providerId="LiveId" clId="{C000F36B-97BE-443D-8CFF-87B9779942D7}" dt="2018-01-21T16:16:57.935" v="835" actId="167"/>
+      <pc:sldChg chg="addSp delSp modSp add">
+        <pc:chgData name="Tim Schlottmann" userId="470020b021055e8f" providerId="LiveId" clId="{C000F36B-97BE-443D-8CFF-87B9779942D7}" dt="2018-01-25T08:12:21.274" v="2280"/>
         <pc:sldMkLst>
           <pc:docMk/>
           <pc:sldMk cId="896929574" sldId="270"/>
@@ -1614,16 +1352,16 @@
             <ac:spMk id="14" creationId="{BBC06CCD-1614-43B7-81DB-DE657B391DC0}"/>
           </ac:spMkLst>
         </pc:spChg>
-        <pc:spChg chg="add mod">
-          <ac:chgData name="Tim Schlottmann" userId="470020b021055e8f" providerId="LiveId" clId="{C000F36B-97BE-443D-8CFF-87B9779942D7}" dt="2018-01-21T16:16:53.730" v="834" actId="1076"/>
+        <pc:spChg chg="add del mod">
+          <ac:chgData name="Tim Schlottmann" userId="470020b021055e8f" providerId="LiveId" clId="{C000F36B-97BE-443D-8CFF-87B9779942D7}" dt="2018-01-25T08:12:20.887" v="2279" actId="478"/>
           <ac:spMkLst>
             <pc:docMk/>
             <pc:sldMk cId="896929574" sldId="270"/>
             <ac:spMk id="16" creationId="{BFE505F7-E10A-4C0D-AC13-4F7CE5447A9D}"/>
           </ac:spMkLst>
         </pc:spChg>
-        <pc:spChg chg="add mod">
-          <ac:chgData name="Tim Schlottmann" userId="470020b021055e8f" providerId="LiveId" clId="{C000F36B-97BE-443D-8CFF-87B9779942D7}" dt="2018-01-21T16:16:53.730" v="834" actId="1076"/>
+        <pc:spChg chg="add del mod">
+          <ac:chgData name="Tim Schlottmann" userId="470020b021055e8f" providerId="LiveId" clId="{C000F36B-97BE-443D-8CFF-87B9779942D7}" dt="2018-01-25T08:12:20.887" v="2279" actId="478"/>
           <ac:spMkLst>
             <pc:docMk/>
             <pc:sldMk cId="896929574" sldId="270"/>
@@ -1668,6 +1406,22 @@
             <pc:docMk/>
             <pc:sldMk cId="896929574" sldId="270"/>
             <ac:spMk id="24" creationId="{0FF1D9F2-E187-40BB-97CB-6D562B7F7E70}"/>
+          </ac:spMkLst>
+        </pc:spChg>
+        <pc:spChg chg="add">
+          <ac:chgData name="Tim Schlottmann" userId="470020b021055e8f" providerId="LiveId" clId="{C000F36B-97BE-443D-8CFF-87B9779942D7}" dt="2018-01-25T08:12:21.274" v="2280"/>
+          <ac:spMkLst>
+            <pc:docMk/>
+            <pc:sldMk cId="896929574" sldId="270"/>
+            <ac:spMk id="25" creationId="{66F890CD-7371-41C8-AB4D-B351B1EC5E95}"/>
+          </ac:spMkLst>
+        </pc:spChg>
+        <pc:spChg chg="add">
+          <ac:chgData name="Tim Schlottmann" userId="470020b021055e8f" providerId="LiveId" clId="{C000F36B-97BE-443D-8CFF-87B9779942D7}" dt="2018-01-25T08:12:21.274" v="2280"/>
+          <ac:spMkLst>
+            <pc:docMk/>
+            <pc:sldMk cId="896929574" sldId="270"/>
+            <ac:spMk id="27" creationId="{BE272226-C424-43F4-A041-FA275B8ECAD3}"/>
           </ac:spMkLst>
         </pc:spChg>
         <pc:cxnChg chg="mod">
@@ -1736,7 +1490,7 @@
         </pc:cxnChg>
       </pc:sldChg>
       <pc:sldChg chg="addSp delSp modSp add">
-        <pc:chgData name="Tim Schlottmann" userId="470020b021055e8f" providerId="LiveId" clId="{C000F36B-97BE-443D-8CFF-87B9779942D7}" dt="2018-01-21T16:18:24.465" v="851" actId="1076"/>
+        <pc:chgData name="Tim Schlottmann" userId="470020b021055e8f" providerId="LiveId" clId="{C000F36B-97BE-443D-8CFF-87B9779942D7}" dt="2018-01-25T08:12:26.563" v="2282"/>
         <pc:sldMkLst>
           <pc:docMk/>
           <pc:sldMk cId="869318158" sldId="271"/>
@@ -1789,16 +1543,16 @@
             <ac:spMk id="14" creationId="{BBC06CCD-1614-43B7-81DB-DE657B391DC0}"/>
           </ac:spMkLst>
         </pc:spChg>
-        <pc:spChg chg="mod">
-          <ac:chgData name="Tim Schlottmann" userId="470020b021055e8f" providerId="LiveId" clId="{C000F36B-97BE-443D-8CFF-87B9779942D7}" dt="2018-01-21T16:17:42.630" v="840" actId="1076"/>
+        <pc:spChg chg="del mod">
+          <ac:chgData name="Tim Schlottmann" userId="470020b021055e8f" providerId="LiveId" clId="{C000F36B-97BE-443D-8CFF-87B9779942D7}" dt="2018-01-25T08:12:26.337" v="2281" actId="478"/>
           <ac:spMkLst>
             <pc:docMk/>
             <pc:sldMk cId="869318158" sldId="271"/>
             <ac:spMk id="16" creationId="{4C333446-BF75-438A-B4A4-81D9E74F6813}"/>
           </ac:spMkLst>
         </pc:spChg>
-        <pc:spChg chg="mod">
-          <ac:chgData name="Tim Schlottmann" userId="470020b021055e8f" providerId="LiveId" clId="{C000F36B-97BE-443D-8CFF-87B9779942D7}" dt="2018-01-21T16:17:42.630" v="840" actId="1076"/>
+        <pc:spChg chg="del mod">
+          <ac:chgData name="Tim Schlottmann" userId="470020b021055e8f" providerId="LiveId" clId="{C000F36B-97BE-443D-8CFF-87B9779942D7}" dt="2018-01-25T08:12:26.337" v="2281" actId="478"/>
           <ac:spMkLst>
             <pc:docMk/>
             <pc:sldMk cId="869318158" sldId="271"/>
@@ -1854,6 +1608,14 @@
           </ac:spMkLst>
         </pc:spChg>
         <pc:spChg chg="add">
+          <ac:chgData name="Tim Schlottmann" userId="470020b021055e8f" providerId="LiveId" clId="{C000F36B-97BE-443D-8CFF-87B9779942D7}" dt="2018-01-25T08:12:26.563" v="2282"/>
+          <ac:spMkLst>
+            <pc:docMk/>
+            <pc:sldMk cId="869318158" sldId="271"/>
+            <ac:spMk id="26" creationId="{7ACD210F-1B97-455F-BAD5-3EF23BEA9DF9}"/>
+          </ac:spMkLst>
+        </pc:spChg>
+        <pc:spChg chg="add">
           <ac:chgData name="Tim Schlottmann" userId="470020b021055e8f" providerId="LiveId" clId="{C000F36B-97BE-443D-8CFF-87B9779942D7}" dt="2018-01-21T16:17:47.481" v="841" actId="1076"/>
           <ac:spMkLst>
             <pc:docMk/>
@@ -1875,6 +1637,14 @@
             <pc:docMk/>
             <pc:sldMk cId="869318158" sldId="271"/>
             <ac:spMk id="30" creationId="{99DEB6C7-3249-4F43-A93D-094831A2E85A}"/>
+          </ac:spMkLst>
+        </pc:spChg>
+        <pc:spChg chg="add">
+          <ac:chgData name="Tim Schlottmann" userId="470020b021055e8f" providerId="LiveId" clId="{C000F36B-97BE-443D-8CFF-87B9779942D7}" dt="2018-01-25T08:12:26.563" v="2282"/>
+          <ac:spMkLst>
+            <pc:docMk/>
+            <pc:sldMk cId="869318158" sldId="271"/>
+            <ac:spMk id="32" creationId="{304D4291-ABB8-432F-A91E-BF13A422BFF6}"/>
           </ac:spMkLst>
         </pc:spChg>
         <pc:cxnChg chg="mod">
@@ -1943,7 +1713,7 @@
         </pc:cxnChg>
       </pc:sldChg>
       <pc:sldChg chg="addSp delSp modSp add">
-        <pc:chgData name="Tim Schlottmann" userId="470020b021055e8f" providerId="LiveId" clId="{C000F36B-97BE-443D-8CFF-87B9779942D7}" dt="2018-01-21T17:29:12.194" v="897" actId="1076"/>
+        <pc:chgData name="Tim Schlottmann" userId="470020b021055e8f" providerId="LiveId" clId="{C000F36B-97BE-443D-8CFF-87B9779942D7}" dt="2018-01-25T08:12:31.993" v="2284"/>
         <pc:sldMkLst>
           <pc:docMk/>
           <pc:sldMk cId="2180419348" sldId="272"/>
@@ -1996,16 +1766,16 @@
             <ac:spMk id="14" creationId="{BBC06CCD-1614-43B7-81DB-DE657B391DC0}"/>
           </ac:spMkLst>
         </pc:spChg>
-        <pc:spChg chg="mod">
-          <ac:chgData name="Tim Schlottmann" userId="470020b021055e8f" providerId="LiveId" clId="{C000F36B-97BE-443D-8CFF-87B9779942D7}" dt="2018-01-21T16:19:00.701" v="853" actId="1076"/>
+        <pc:spChg chg="del mod">
+          <ac:chgData name="Tim Schlottmann" userId="470020b021055e8f" providerId="LiveId" clId="{C000F36B-97BE-443D-8CFF-87B9779942D7}" dt="2018-01-25T08:12:31.176" v="2283" actId="478"/>
           <ac:spMkLst>
             <pc:docMk/>
             <pc:sldMk cId="2180419348" sldId="272"/>
             <ac:spMk id="16" creationId="{4C333446-BF75-438A-B4A4-81D9E74F6813}"/>
           </ac:spMkLst>
         </pc:spChg>
-        <pc:spChg chg="mod">
-          <ac:chgData name="Tim Schlottmann" userId="470020b021055e8f" providerId="LiveId" clId="{C000F36B-97BE-443D-8CFF-87B9779942D7}" dt="2018-01-21T16:19:00.701" v="853" actId="1076"/>
+        <pc:spChg chg="del mod">
+          <ac:chgData name="Tim Schlottmann" userId="470020b021055e8f" providerId="LiveId" clId="{C000F36B-97BE-443D-8CFF-87B9779942D7}" dt="2018-01-25T08:12:31.176" v="2283" actId="478"/>
           <ac:spMkLst>
             <pc:docMk/>
             <pc:sldMk cId="2180419348" sldId="272"/>
@@ -2026,6 +1796,22 @@
             <pc:docMk/>
             <pc:sldMk cId="2180419348" sldId="272"/>
             <ac:spMk id="21" creationId="{E36CE769-4AC7-4AE9-8A7E-762DDD0E59A8}"/>
+          </ac:spMkLst>
+        </pc:spChg>
+        <pc:spChg chg="add">
+          <ac:chgData name="Tim Schlottmann" userId="470020b021055e8f" providerId="LiveId" clId="{C000F36B-97BE-443D-8CFF-87B9779942D7}" dt="2018-01-25T08:12:31.993" v="2284"/>
+          <ac:spMkLst>
+            <pc:docMk/>
+            <pc:sldMk cId="2180419348" sldId="272"/>
+            <ac:spMk id="32" creationId="{33DED094-8829-4C4C-A0A0-7BBE04371214}"/>
+          </ac:spMkLst>
+        </pc:spChg>
+        <pc:spChg chg="add">
+          <ac:chgData name="Tim Schlottmann" userId="470020b021055e8f" providerId="LiveId" clId="{C000F36B-97BE-443D-8CFF-87B9779942D7}" dt="2018-01-25T08:12:31.993" v="2284"/>
+          <ac:spMkLst>
+            <pc:docMk/>
+            <pc:sldMk cId="2180419348" sldId="272"/>
+            <ac:spMk id="33" creationId="{5581BCD7-9B7A-4C8C-9568-1E177C793FE3}"/>
           </ac:spMkLst>
         </pc:spChg>
         <pc:spChg chg="add del mod">
@@ -2180,6 +1966,14 @@
             <ac:cxnSpMk id="29" creationId="{3B71BDD6-B1AA-42F7-8996-3B84004A3D1F}"/>
           </ac:cxnSpMkLst>
         </pc:cxnChg>
+        <pc:cxnChg chg="add mod">
+          <ac:chgData name="Tim Schlottmann" userId="470020b021055e8f" providerId="LiveId" clId="{C000F36B-97BE-443D-8CFF-87B9779942D7}" dt="2018-01-25T08:09:32.223" v="2262" actId="1035"/>
+          <ac:cxnSpMkLst>
+            <pc:docMk/>
+            <pc:sldMk cId="2180419348" sldId="272"/>
+            <ac:cxnSpMk id="30" creationId="{F48553EA-6180-46E2-BF87-B00BA1523545}"/>
+          </ac:cxnSpMkLst>
+        </pc:cxnChg>
         <pc:cxnChg chg="mod">
           <ac:chgData name="Tim Schlottmann" userId="470020b021055e8f" providerId="LiveId" clId="{C000F36B-97BE-443D-8CFF-87B9779942D7}" dt="2018-01-21T16:19:00.701" v="853" actId="1076"/>
           <ac:cxnSpMkLst>
@@ -2206,7 +2000,7 @@
         </pc:cxnChg>
       </pc:sldChg>
       <pc:sldChg chg="addSp modSp add">
-        <pc:chgData name="Tim Schlottmann" userId="470020b021055e8f" providerId="LiveId" clId="{C000F36B-97BE-443D-8CFF-87B9779942D7}" dt="2018-01-21T20:46:05.177" v="1544" actId="1076"/>
+        <pc:chgData name="Tim Schlottmann" userId="470020b021055e8f" providerId="LiveId" clId="{C000F36B-97BE-443D-8CFF-87B9779942D7}" dt="2018-01-25T08:13:04.441" v="2291" actId="947"/>
         <pc:sldMkLst>
           <pc:docMk/>
           <pc:sldMk cId="2746408360" sldId="273"/>
@@ -2260,7 +2054,7 @@
           </ac:spMkLst>
         </pc:spChg>
         <pc:spChg chg="mod">
-          <ac:chgData name="Tim Schlottmann" userId="470020b021055e8f" providerId="LiveId" clId="{C000F36B-97BE-443D-8CFF-87B9779942D7}" dt="2018-01-21T20:45:48.485" v="1541" actId="1076"/>
+          <ac:chgData name="Tim Schlottmann" userId="470020b021055e8f" providerId="LiveId" clId="{C000F36B-97BE-443D-8CFF-87B9779942D7}" dt="2018-01-25T08:13:04.441" v="2291" actId="947"/>
           <ac:spMkLst>
             <pc:docMk/>
             <pc:sldMk cId="2746408360" sldId="273"/>
@@ -2268,7 +2062,7 @@
           </ac:spMkLst>
         </pc:spChg>
         <pc:spChg chg="mod">
-          <ac:chgData name="Tim Schlottmann" userId="470020b021055e8f" providerId="LiveId" clId="{C000F36B-97BE-443D-8CFF-87B9779942D7}" dt="2018-01-21T20:45:52.415" v="1542" actId="1076"/>
+          <ac:chgData name="Tim Schlottmann" userId="470020b021055e8f" providerId="LiveId" clId="{C000F36B-97BE-443D-8CFF-87B9779942D7}" dt="2018-01-25T08:12:54.459" v="2289" actId="1076"/>
           <ac:spMkLst>
             <pc:docMk/>
             <pc:sldMk cId="2746408360" sldId="273"/>
@@ -2452,8 +2246,8 @@
           </ac:cxnSpMkLst>
         </pc:cxnChg>
       </pc:sldChg>
-      <pc:sldChg chg="addSp modSp add">
-        <pc:chgData name="Tim Schlottmann" userId="470020b021055e8f" providerId="LiveId" clId="{C000F36B-97BE-443D-8CFF-87B9779942D7}" dt="2018-01-21T16:15:30.960" v="827" actId="1076"/>
+      <pc:sldChg chg="addSp delSp modSp add">
+        <pc:chgData name="Tim Schlottmann" userId="470020b021055e8f" providerId="LiveId" clId="{C000F36B-97BE-443D-8CFF-87B9779942D7}" dt="2018-01-25T08:12:10.680" v="2276"/>
         <pc:sldMkLst>
           <pc:docMk/>
           <pc:sldMk cId="4263602960" sldId="274"/>
@@ -2498,16 +2292,16 @@
             <ac:spMk id="14" creationId="{BBC06CCD-1614-43B7-81DB-DE657B391DC0}"/>
           </ac:spMkLst>
         </pc:spChg>
-        <pc:spChg chg="mod">
-          <ac:chgData name="Tim Schlottmann" userId="470020b021055e8f" providerId="LiveId" clId="{C000F36B-97BE-443D-8CFF-87B9779942D7}" dt="2018-01-21T16:15:30.960" v="827" actId="1076"/>
+        <pc:spChg chg="del mod">
+          <ac:chgData name="Tim Schlottmann" userId="470020b021055e8f" providerId="LiveId" clId="{C000F36B-97BE-443D-8CFF-87B9779942D7}" dt="2018-01-25T08:12:10.481" v="2275" actId="478"/>
           <ac:spMkLst>
             <pc:docMk/>
             <pc:sldMk cId="4263602960" sldId="274"/>
             <ac:spMk id="15" creationId="{028189E5-D953-4246-961D-A3DE4C1DF174}"/>
           </ac:spMkLst>
         </pc:spChg>
-        <pc:spChg chg="mod">
-          <ac:chgData name="Tim Schlottmann" userId="470020b021055e8f" providerId="LiveId" clId="{C000F36B-97BE-443D-8CFF-87B9779942D7}" dt="2018-01-21T16:15:30.960" v="827" actId="1076"/>
+        <pc:spChg chg="del mod">
+          <ac:chgData name="Tim Schlottmann" userId="470020b021055e8f" providerId="LiveId" clId="{C000F36B-97BE-443D-8CFF-87B9779942D7}" dt="2018-01-25T08:12:10.481" v="2275" actId="478"/>
           <ac:spMkLst>
             <pc:docMk/>
             <pc:sldMk cId="4263602960" sldId="274"/>
@@ -2552,6 +2346,22 @@
             <pc:docMk/>
             <pc:sldMk cId="4263602960" sldId="274"/>
             <ac:spMk id="21" creationId="{6C730C8F-ADAF-4766-A6FA-A3D05B274E55}"/>
+          </ac:spMkLst>
+        </pc:spChg>
+        <pc:spChg chg="add">
+          <ac:chgData name="Tim Schlottmann" userId="470020b021055e8f" providerId="LiveId" clId="{C000F36B-97BE-443D-8CFF-87B9779942D7}" dt="2018-01-25T08:12:10.680" v="2276"/>
+          <ac:spMkLst>
+            <pc:docMk/>
+            <pc:sldMk cId="4263602960" sldId="274"/>
+            <ac:spMk id="22" creationId="{7BDE8538-4D59-43F8-AAA8-BA3362A8881A}"/>
+          </ac:spMkLst>
+        </pc:spChg>
+        <pc:spChg chg="add">
+          <ac:chgData name="Tim Schlottmann" userId="470020b021055e8f" providerId="LiveId" clId="{C000F36B-97BE-443D-8CFF-87B9779942D7}" dt="2018-01-25T08:12:10.680" v="2276"/>
+          <ac:spMkLst>
+            <pc:docMk/>
+            <pc:sldMk cId="4263602960" sldId="274"/>
+            <ac:spMk id="23" creationId="{6E081951-A0AC-49F8-874E-4DCB2301186C}"/>
           </ac:spMkLst>
         </pc:spChg>
         <pc:cxnChg chg="mod">
@@ -2571,259 +2381,28 @@
           </ac:cxnSpMkLst>
         </pc:cxnChg>
       </pc:sldChg>
-      <pc:sldChg chg="addSp modSp add del">
-        <pc:chgData name="Tim Schlottmann" userId="470020b021055e8f" providerId="LiveId" clId="{C000F36B-97BE-443D-8CFF-87B9779942D7}" dt="2018-01-21T18:30:26.005" v="1211" actId="2696"/>
-        <pc:sldMkLst>
-          <pc:docMk/>
-          <pc:sldMk cId="1213189583" sldId="275"/>
-        </pc:sldMkLst>
-        <pc:spChg chg="add mod">
-          <ac:chgData name="Tim Schlottmann" userId="470020b021055e8f" providerId="LiveId" clId="{C000F36B-97BE-443D-8CFF-87B9779942D7}" dt="2018-01-21T18:26:59.707" v="1158" actId="1076"/>
-          <ac:spMkLst>
-            <pc:docMk/>
-            <pc:sldMk cId="1213189583" sldId="275"/>
-            <ac:spMk id="4" creationId="{B6D81606-0852-4721-B05B-002B7BFFAD1E}"/>
-          </ac:spMkLst>
-        </pc:spChg>
-        <pc:spChg chg="add mod">
-          <ac:chgData name="Tim Schlottmann" userId="470020b021055e8f" providerId="LiveId" clId="{C000F36B-97BE-443D-8CFF-87B9779942D7}" dt="2018-01-21T18:26:52.651" v="1157" actId="1076"/>
-          <ac:spMkLst>
-            <pc:docMk/>
-            <pc:sldMk cId="1213189583" sldId="275"/>
-            <ac:spMk id="5" creationId="{F0D81ED6-27FD-4964-9F2A-A2A3BB24702D}"/>
-          </ac:spMkLst>
-        </pc:spChg>
-        <pc:spChg chg="add">
-          <ac:chgData name="Tim Schlottmann" userId="470020b021055e8f" providerId="LiveId" clId="{C000F36B-97BE-443D-8CFF-87B9779942D7}" dt="2018-01-21T18:19:09.600" v="899" actId="2696"/>
-          <ac:spMkLst>
-            <pc:docMk/>
-            <pc:sldMk cId="1213189583" sldId="275"/>
-            <ac:spMk id="6" creationId="{20C0C7C2-538F-400C-809F-BF864689438E}"/>
-          </ac:spMkLst>
-        </pc:spChg>
-        <pc:spChg chg="add">
-          <ac:chgData name="Tim Schlottmann" userId="470020b021055e8f" providerId="LiveId" clId="{C000F36B-97BE-443D-8CFF-87B9779942D7}" dt="2018-01-21T18:19:09.600" v="899" actId="2696"/>
-          <ac:spMkLst>
-            <pc:docMk/>
-            <pc:sldMk cId="1213189583" sldId="275"/>
-            <ac:spMk id="7" creationId="{70EB6341-7328-4534-AF19-C3E77A4C7270}"/>
-          </ac:spMkLst>
-        </pc:spChg>
-        <pc:spChg chg="add mod">
-          <ac:chgData name="Tim Schlottmann" userId="470020b021055e8f" providerId="LiveId" clId="{C000F36B-97BE-443D-8CFF-87B9779942D7}" dt="2018-01-21T18:26:30.721" v="1154" actId="1076"/>
-          <ac:spMkLst>
-            <pc:docMk/>
-            <pc:sldMk cId="1213189583" sldId="275"/>
-            <ac:spMk id="8" creationId="{D7B016E6-709E-418E-994D-15D6711DE4BE}"/>
-          </ac:spMkLst>
-        </pc:spChg>
-        <pc:spChg chg="add mod">
-          <ac:chgData name="Tim Schlottmann" userId="470020b021055e8f" providerId="LiveId" clId="{C000F36B-97BE-443D-8CFF-87B9779942D7}" dt="2018-01-21T18:26:38.499" v="1155" actId="1076"/>
-          <ac:spMkLst>
-            <pc:docMk/>
-            <pc:sldMk cId="1213189583" sldId="275"/>
-            <ac:spMk id="9" creationId="{FBEF8B73-8C05-4D04-8CF5-D6DF327EBB11}"/>
-          </ac:spMkLst>
-        </pc:spChg>
-        <pc:spChg chg="add mod">
-          <ac:chgData name="Tim Schlottmann" userId="470020b021055e8f" providerId="LiveId" clId="{C000F36B-97BE-443D-8CFF-87B9779942D7}" dt="2018-01-21T18:26:44.380" v="1156" actId="1076"/>
-          <ac:spMkLst>
-            <pc:docMk/>
-            <pc:sldMk cId="1213189583" sldId="275"/>
-            <ac:spMk id="10" creationId="{F1A8D91E-17D6-4E38-AD8C-4CBC5B422414}"/>
-          </ac:spMkLst>
-        </pc:spChg>
-        <pc:spChg chg="add mod">
-          <ac:chgData name="Tim Schlottmann" userId="470020b021055e8f" providerId="LiveId" clId="{C000F36B-97BE-443D-8CFF-87B9779942D7}" dt="2018-01-21T18:28:32.119" v="1194" actId="403"/>
-          <ac:spMkLst>
-            <pc:docMk/>
-            <pc:sldMk cId="1213189583" sldId="275"/>
-            <ac:spMk id="22" creationId="{F4305521-91BF-4464-A681-4E3847132351}"/>
-          </ac:spMkLst>
-        </pc:spChg>
-        <pc:spChg chg="add mod">
-          <ac:chgData name="Tim Schlottmann" userId="470020b021055e8f" providerId="LiveId" clId="{C000F36B-97BE-443D-8CFF-87B9779942D7}" dt="2018-01-21T18:28:59.471" v="1202" actId="113"/>
-          <ac:spMkLst>
-            <pc:docMk/>
-            <pc:sldMk cId="1213189583" sldId="275"/>
-            <ac:spMk id="23" creationId="{AAC59F46-3532-4686-9C12-15A39D45731A}"/>
-          </ac:spMkLst>
-        </pc:spChg>
-        <pc:spChg chg="add mod">
-          <ac:chgData name="Tim Schlottmann" userId="470020b021055e8f" providerId="LiveId" clId="{C000F36B-97BE-443D-8CFF-87B9779942D7}" dt="2018-01-21T18:28:59.471" v="1202" actId="113"/>
-          <ac:spMkLst>
-            <pc:docMk/>
-            <pc:sldMk cId="1213189583" sldId="275"/>
-            <ac:spMk id="24" creationId="{79936A3A-4AC7-452A-A24B-9F144E0B4348}"/>
-          </ac:spMkLst>
-        </pc:spChg>
-        <pc:spChg chg="add mod">
-          <ac:chgData name="Tim Schlottmann" userId="470020b021055e8f" providerId="LiveId" clId="{C000F36B-97BE-443D-8CFF-87B9779942D7}" dt="2018-01-21T18:28:59.471" v="1202" actId="113"/>
-          <ac:spMkLst>
-            <pc:docMk/>
-            <pc:sldMk cId="1213189583" sldId="275"/>
-            <ac:spMk id="25" creationId="{6BC2C9DD-75CE-4601-8985-73FBB7C700AB}"/>
-          </ac:spMkLst>
-        </pc:spChg>
-        <pc:spChg chg="add mod">
-          <ac:chgData name="Tim Schlottmann" userId="470020b021055e8f" providerId="LiveId" clId="{C000F36B-97BE-443D-8CFF-87B9779942D7}" dt="2018-01-21T18:28:59.471" v="1202" actId="113"/>
-          <ac:spMkLst>
-            <pc:docMk/>
-            <pc:sldMk cId="1213189583" sldId="275"/>
-            <ac:spMk id="26" creationId="{5E22C40A-E56F-4176-A45A-7307260F13E3}"/>
-          </ac:spMkLst>
-        </pc:spChg>
-        <pc:spChg chg="add mod">
-          <ac:chgData name="Tim Schlottmann" userId="470020b021055e8f" providerId="LiveId" clId="{C000F36B-97BE-443D-8CFF-87B9779942D7}" dt="2018-01-21T18:25:35.492" v="1138" actId="1076"/>
-          <ac:spMkLst>
-            <pc:docMk/>
-            <pc:sldMk cId="1213189583" sldId="275"/>
-            <ac:spMk id="27" creationId="{DA5BAB0F-1525-42AA-9246-EA5436B93536}"/>
-          </ac:spMkLst>
-        </pc:spChg>
-        <pc:spChg chg="add mod">
-          <ac:chgData name="Tim Schlottmann" userId="470020b021055e8f" providerId="LiveId" clId="{C000F36B-97BE-443D-8CFF-87B9779942D7}" dt="2018-01-21T18:25:44.034" v="1142" actId="20577"/>
-          <ac:spMkLst>
-            <pc:docMk/>
-            <pc:sldMk cId="1213189583" sldId="275"/>
-            <ac:spMk id="28" creationId="{CDEB55B0-FD73-4EA5-8AAA-0638B4E6F8CC}"/>
-          </ac:spMkLst>
-        </pc:spChg>
-        <pc:spChg chg="add mod">
-          <ac:chgData name="Tim Schlottmann" userId="470020b021055e8f" providerId="LiveId" clId="{C000F36B-97BE-443D-8CFF-87B9779942D7}" dt="2018-01-21T18:25:56.937" v="1148" actId="1038"/>
-          <ac:spMkLst>
-            <pc:docMk/>
-            <pc:sldMk cId="1213189583" sldId="275"/>
-            <ac:spMk id="29" creationId="{92D9594E-C8B7-4952-AD3A-986BB4D372C3}"/>
-          </ac:spMkLst>
-        </pc:spChg>
-        <pc:spChg chg="add mod">
-          <ac:chgData name="Tim Schlottmann" userId="470020b021055e8f" providerId="LiveId" clId="{C000F36B-97BE-443D-8CFF-87B9779942D7}" dt="2018-01-21T18:27:07.263" v="1161" actId="20577"/>
-          <ac:spMkLst>
-            <pc:docMk/>
-            <pc:sldMk cId="1213189583" sldId="275"/>
-            <ac:spMk id="30" creationId="{891B00D9-1001-42E7-838B-74274E3AE8E5}"/>
-          </ac:spMkLst>
-        </pc:spChg>
-        <pc:spChg chg="add mod">
-          <ac:chgData name="Tim Schlottmann" userId="470020b021055e8f" providerId="LiveId" clId="{C000F36B-97BE-443D-8CFF-87B9779942D7}" dt="2018-01-21T18:27:31.027" v="1171" actId="20577"/>
-          <ac:spMkLst>
-            <pc:docMk/>
-            <pc:sldMk cId="1213189583" sldId="275"/>
-            <ac:spMk id="31" creationId="{44852978-95C0-47B4-993E-5F8FFDC39BB5}"/>
-          </ac:spMkLst>
-        </pc:spChg>
-        <pc:spChg chg="add mod">
-          <ac:chgData name="Tim Schlottmann" userId="470020b021055e8f" providerId="LiveId" clId="{C000F36B-97BE-443D-8CFF-87B9779942D7}" dt="2018-01-21T18:27:41.002" v="1172" actId="1076"/>
-          <ac:spMkLst>
-            <pc:docMk/>
-            <pc:sldMk cId="1213189583" sldId="275"/>
-            <ac:spMk id="32" creationId="{DA2A8F76-AAF0-4EC5-AD4D-DB835B504060}"/>
-          </ac:spMkLst>
-        </pc:spChg>
-        <pc:spChg chg="add mod">
-          <ac:chgData name="Tim Schlottmann" userId="470020b021055e8f" providerId="LiveId" clId="{C000F36B-97BE-443D-8CFF-87B9779942D7}" dt="2018-01-21T18:28:01.679" v="1178" actId="20577"/>
-          <ac:spMkLst>
-            <pc:docMk/>
-            <pc:sldMk cId="1213189583" sldId="275"/>
-            <ac:spMk id="33" creationId="{EFED16AE-8458-487D-9E65-E2F06E769C29}"/>
-          </ac:spMkLst>
-        </pc:spChg>
-        <pc:spChg chg="add mod">
-          <ac:chgData name="Tim Schlottmann" userId="470020b021055e8f" providerId="LiveId" clId="{C000F36B-97BE-443D-8CFF-87B9779942D7}" dt="2018-01-21T18:28:12.233" v="1182" actId="20577"/>
-          <ac:spMkLst>
-            <pc:docMk/>
-            <pc:sldMk cId="1213189583" sldId="275"/>
-            <ac:spMk id="34" creationId="{DF17923E-DE8E-41A2-869E-C1D17B03E222}"/>
-          </ac:spMkLst>
-        </pc:spChg>
-        <pc:cxnChg chg="add">
-          <ac:chgData name="Tim Schlottmann" userId="470020b021055e8f" providerId="LiveId" clId="{C000F36B-97BE-443D-8CFF-87B9779942D7}" dt="2018-01-21T18:19:09.600" v="899" actId="2696"/>
-          <ac:cxnSpMkLst>
-            <pc:docMk/>
-            <pc:sldMk cId="1213189583" sldId="275"/>
-            <ac:cxnSpMk id="2" creationId="{0469722E-7981-4874-82F8-D5B9FA42D8DC}"/>
-          </ac:cxnSpMkLst>
-        </pc:cxnChg>
-        <pc:cxnChg chg="add">
-          <ac:chgData name="Tim Schlottmann" userId="470020b021055e8f" providerId="LiveId" clId="{C000F36B-97BE-443D-8CFF-87B9779942D7}" dt="2018-01-21T18:19:09.600" v="899" actId="2696"/>
-          <ac:cxnSpMkLst>
-            <pc:docMk/>
-            <pc:sldMk cId="1213189583" sldId="275"/>
-            <ac:cxnSpMk id="3" creationId="{5E93EC5F-9433-4A5F-9303-5977F05BE010}"/>
-          </ac:cxnSpMkLst>
-        </pc:cxnChg>
-        <pc:cxnChg chg="add mod">
-          <ac:chgData name="Tim Schlottmann" userId="470020b021055e8f" providerId="LiveId" clId="{C000F36B-97BE-443D-8CFF-87B9779942D7}" dt="2018-01-21T18:22:06.489" v="1074" actId="1076"/>
-          <ac:cxnSpMkLst>
-            <pc:docMk/>
-            <pc:sldMk cId="1213189583" sldId="275"/>
-            <ac:cxnSpMk id="12" creationId="{D1E96A45-0FA2-4FB1-8F1F-C219FADBA53D}"/>
-          </ac:cxnSpMkLst>
-        </pc:cxnChg>
-        <pc:cxnChg chg="add mod">
-          <ac:chgData name="Tim Schlottmann" userId="470020b021055e8f" providerId="LiveId" clId="{C000F36B-97BE-443D-8CFF-87B9779942D7}" dt="2018-01-21T18:22:18.769" v="1075" actId="1076"/>
-          <ac:cxnSpMkLst>
-            <pc:docMk/>
-            <pc:sldMk cId="1213189583" sldId="275"/>
-            <ac:cxnSpMk id="13" creationId="{95B4A467-2E64-4E59-8F51-585B5F54B5BB}"/>
-          </ac:cxnSpMkLst>
-        </pc:cxnChg>
-        <pc:cxnChg chg="add mod">
-          <ac:chgData name="Tim Schlottmann" userId="470020b021055e8f" providerId="LiveId" clId="{C000F36B-97BE-443D-8CFF-87B9779942D7}" dt="2018-01-21T18:22:26.519" v="1076" actId="1076"/>
-          <ac:cxnSpMkLst>
-            <pc:docMk/>
-            <pc:sldMk cId="1213189583" sldId="275"/>
-            <ac:cxnSpMk id="14" creationId="{714BB4B2-7800-4470-82B1-DCDAD2D65854}"/>
-          </ac:cxnSpMkLst>
-        </pc:cxnChg>
-        <pc:cxnChg chg="add mod">
-          <ac:chgData name="Tim Schlottmann" userId="470020b021055e8f" providerId="LiveId" clId="{C000F36B-97BE-443D-8CFF-87B9779942D7}" dt="2018-01-21T18:22:31.799" v="1077" actId="1076"/>
-          <ac:cxnSpMkLst>
-            <pc:docMk/>
-            <pc:sldMk cId="1213189583" sldId="275"/>
-            <ac:cxnSpMk id="15" creationId="{7D9E4058-3AAA-4340-960A-41FF315F58B5}"/>
-          </ac:cxnSpMkLst>
-        </pc:cxnChg>
-        <pc:cxnChg chg="add mod">
-          <ac:chgData name="Tim Schlottmann" userId="470020b021055e8f" providerId="LiveId" clId="{C000F36B-97BE-443D-8CFF-87B9779942D7}" dt="2018-01-21T18:23:39.865" v="1086" actId="1076"/>
-          <ac:cxnSpMkLst>
-            <pc:docMk/>
-            <pc:sldMk cId="1213189583" sldId="275"/>
-            <ac:cxnSpMk id="16" creationId="{720D9B0C-6A50-4171-ADDF-C3DE93BB255D}"/>
-          </ac:cxnSpMkLst>
-        </pc:cxnChg>
-        <pc:cxnChg chg="add mod">
-          <ac:chgData name="Tim Schlottmann" userId="470020b021055e8f" providerId="LiveId" clId="{C000F36B-97BE-443D-8CFF-87B9779942D7}" dt="2018-01-21T18:23:39.865" v="1086" actId="1076"/>
-          <ac:cxnSpMkLst>
-            <pc:docMk/>
-            <pc:sldMk cId="1213189583" sldId="275"/>
-            <ac:cxnSpMk id="19" creationId="{A0948B9E-043A-4230-87FC-C8F4CAD3D80D}"/>
-          </ac:cxnSpMkLst>
-        </pc:cxnChg>
-        <pc:cxnChg chg="add mod">
-          <ac:chgData name="Tim Schlottmann" userId="470020b021055e8f" providerId="LiveId" clId="{C000F36B-97BE-443D-8CFF-87B9779942D7}" dt="2018-01-21T18:22:51.147" v="1080" actId="1076"/>
-          <ac:cxnSpMkLst>
-            <pc:docMk/>
-            <pc:sldMk cId="1213189583" sldId="275"/>
-            <ac:cxnSpMk id="20" creationId="{A2A216B5-72DB-4300-92F8-CD2CF88FE266}"/>
-          </ac:cxnSpMkLst>
-        </pc:cxnChg>
-        <pc:cxnChg chg="add mod">
-          <ac:chgData name="Tim Schlottmann" userId="470020b021055e8f" providerId="LiveId" clId="{C000F36B-97BE-443D-8CFF-87B9779942D7}" dt="2018-01-21T18:23:39.865" v="1086" actId="1076"/>
-          <ac:cxnSpMkLst>
-            <pc:docMk/>
-            <pc:sldMk cId="1213189583" sldId="275"/>
-            <ac:cxnSpMk id="21" creationId="{43BEC02B-AB17-4A8D-B73A-9A13C1B4E437}"/>
-          </ac:cxnSpMkLst>
-        </pc:cxnChg>
-      </pc:sldChg>
       <pc:sldChg chg="addSp delSp modSp add">
-        <pc:chgData name="Tim Schlottmann" userId="470020b021055e8f" providerId="LiveId" clId="{C000F36B-97BE-443D-8CFF-87B9779942D7}" dt="2018-01-21T20:45:01.657" v="1455" actId="1076"/>
+        <pc:chgData name="Tim Schlottmann" userId="470020b021055e8f" providerId="LiveId" clId="{C000F36B-97BE-443D-8CFF-87B9779942D7}" dt="2018-01-25T08:13:51.037" v="2389" actId="1038"/>
         <pc:sldMkLst>
           <pc:docMk/>
           <pc:sldMk cId="953524560" sldId="276"/>
         </pc:sldMkLst>
+        <pc:spChg chg="mod">
+          <ac:chgData name="Tim Schlottmann" userId="470020b021055e8f" providerId="LiveId" clId="{C000F36B-97BE-443D-8CFF-87B9779942D7}" dt="2018-01-25T08:13:51.037" v="2389" actId="1038"/>
+          <ac:spMkLst>
+            <pc:docMk/>
+            <pc:sldMk cId="953524560" sldId="276"/>
+            <ac:spMk id="4" creationId="{B6D81606-0852-4721-B05B-002B7BFFAD1E}"/>
+          </ac:spMkLst>
+        </pc:spChg>
+        <pc:spChg chg="mod">
+          <ac:chgData name="Tim Schlottmann" userId="470020b021055e8f" providerId="LiveId" clId="{C000F36B-97BE-443D-8CFF-87B9779942D7}" dt="2018-01-25T08:13:32.538" v="2347" actId="1037"/>
+          <ac:spMkLst>
+            <pc:docMk/>
+            <pc:sldMk cId="953524560" sldId="276"/>
+            <ac:spMk id="5" creationId="{F0D81ED6-27FD-4964-9F2A-A2A3BB24702D}"/>
+          </ac:spMkLst>
+        </pc:spChg>
         <pc:spChg chg="add del">
           <ac:chgData name="Tim Schlottmann" userId="470020b021055e8f" providerId="LiveId" clId="{C000F36B-97BE-443D-8CFF-87B9779942D7}" dt="2018-01-21T20:45:01.540" v="1454" actId="478"/>
           <ac:spMkLst>
@@ -2848,6 +2427,14 @@
             <ac:spMk id="24" creationId="{79936A3A-4AC7-452A-A24B-9F144E0B4348}"/>
           </ac:spMkLst>
         </pc:spChg>
+        <pc:spChg chg="add">
+          <ac:chgData name="Tim Schlottmann" userId="470020b021055e8f" providerId="LiveId" clId="{C000F36B-97BE-443D-8CFF-87B9779942D7}" dt="2018-01-21T20:45:01.657" v="1455" actId="1076"/>
+          <ac:spMkLst>
+            <pc:docMk/>
+            <pc:sldMk cId="953524560" sldId="276"/>
+            <ac:spMk id="35" creationId="{BBB525DC-2285-460D-8F2F-485702EBE131}"/>
+          </ac:spMkLst>
+        </pc:spChg>
         <pc:spChg chg="add del">
           <ac:chgData name="Tim Schlottmann" userId="470020b021055e8f" providerId="LiveId" clId="{C000F36B-97BE-443D-8CFF-87B9779942D7}" dt="2018-01-21T18:34:19.714" v="1222" actId="478"/>
           <ac:spMkLst>
@@ -2856,23 +2443,31 @@
             <ac:spMk id="35" creationId="{96C5D466-6D6F-4AD3-AAAE-F38BEDDD35CD}"/>
           </ac:spMkLst>
         </pc:spChg>
-        <pc:spChg chg="add">
-          <ac:chgData name="Tim Schlottmann" userId="470020b021055e8f" providerId="LiveId" clId="{C000F36B-97BE-443D-8CFF-87B9779942D7}" dt="2018-01-21T20:45:01.657" v="1455" actId="1076"/>
-          <ac:spMkLst>
-            <pc:docMk/>
-            <pc:sldMk cId="953524560" sldId="276"/>
-            <ac:spMk id="35" creationId="{BBB525DC-2285-460D-8F2F-485702EBE131}"/>
-          </ac:spMkLst>
-        </pc:spChg>
       </pc:sldChg>
       <pc:sldChg chg="addSp delSp modSp add">
-        <pc:chgData name="Tim Schlottmann" userId="470020b021055e8f" providerId="LiveId" clId="{C000F36B-97BE-443D-8CFF-87B9779942D7}" dt="2018-01-22T08:45:32.972" v="2077" actId="1076"/>
+        <pc:chgData name="Tim Schlottmann" userId="470020b021055e8f" providerId="LiveId" clId="{C000F36B-97BE-443D-8CFF-87B9779942D7}" dt="2018-01-25T08:15:00.662" v="2405" actId="1037"/>
         <pc:sldMkLst>
           <pc:docMk/>
           <pc:sldMk cId="96405286" sldId="277"/>
         </pc:sldMkLst>
+        <pc:spChg chg="del mod">
+          <ac:chgData name="Tim Schlottmann" userId="470020b021055e8f" providerId="LiveId" clId="{C000F36B-97BE-443D-8CFF-87B9779942D7}" dt="2018-01-25T08:14:01.653" v="2390" actId="478"/>
+          <ac:spMkLst>
+            <pc:docMk/>
+            <pc:sldMk cId="96405286" sldId="277"/>
+            <ac:spMk id="4" creationId="{B6D81606-0852-4721-B05B-002B7BFFAD1E}"/>
+          </ac:spMkLst>
+        </pc:spChg>
+        <pc:spChg chg="del">
+          <ac:chgData name="Tim Schlottmann" userId="470020b021055e8f" providerId="LiveId" clId="{C000F36B-97BE-443D-8CFF-87B9779942D7}" dt="2018-01-25T08:14:01.653" v="2390" actId="478"/>
+          <ac:spMkLst>
+            <pc:docMk/>
+            <pc:sldMk cId="96405286" sldId="277"/>
+            <ac:spMk id="5" creationId="{F0D81ED6-27FD-4964-9F2A-A2A3BB24702D}"/>
+          </ac:spMkLst>
+        </pc:spChg>
         <pc:spChg chg="mod">
-          <ac:chgData name="Tim Schlottmann" userId="470020b021055e8f" providerId="LiveId" clId="{C000F36B-97BE-443D-8CFF-87B9779942D7}" dt="2018-01-21T18:33:42.764" v="1216" actId="1076"/>
+          <ac:chgData name="Tim Schlottmann" userId="470020b021055e8f" providerId="LiveId" clId="{C000F36B-97BE-443D-8CFF-87B9779942D7}" dt="2018-01-25T08:15:00.662" v="2405" actId="1037"/>
           <ac:spMkLst>
             <pc:docMk/>
             <pc:sldMk cId="96405286" sldId="277"/>
@@ -2885,6 +2480,22 @@
             <pc:docMk/>
             <pc:sldMk cId="96405286" sldId="277"/>
             <ac:spMk id="38" creationId="{C57AC17B-C863-41CE-B69D-F2AA4C4BE3F8}"/>
+          </ac:spMkLst>
+        </pc:spChg>
+        <pc:spChg chg="add">
+          <ac:chgData name="Tim Schlottmann" userId="470020b021055e8f" providerId="LiveId" clId="{C000F36B-97BE-443D-8CFF-87B9779942D7}" dt="2018-01-25T08:14:01.889" v="2391"/>
+          <ac:spMkLst>
+            <pc:docMk/>
+            <pc:sldMk cId="96405286" sldId="277"/>
+            <ac:spMk id="39" creationId="{3A1FB5D1-4481-4FEA-8325-1478D18EA14D}"/>
+          </ac:spMkLst>
+        </pc:spChg>
+        <pc:spChg chg="add">
+          <ac:chgData name="Tim Schlottmann" userId="470020b021055e8f" providerId="LiveId" clId="{C000F36B-97BE-443D-8CFF-87B9779942D7}" dt="2018-01-25T08:14:01.889" v="2391"/>
+          <ac:spMkLst>
+            <pc:docMk/>
+            <pc:sldMk cId="96405286" sldId="277"/>
+            <ac:spMk id="40" creationId="{1CF783F5-6407-44C9-B48C-8C39A4B445E6}"/>
           </ac:spMkLst>
         </pc:spChg>
         <pc:spChg chg="add">
@@ -2992,113 +2603,36 @@
           </ac:cxnSpMkLst>
         </pc:cxnChg>
       </pc:sldChg>
-      <pc:sldChg chg="addSp delSp modSp add del">
-        <pc:chgData name="Tim Schlottmann" userId="470020b021055e8f" providerId="LiveId" clId="{C000F36B-97BE-443D-8CFF-87B9779942D7}" dt="2018-01-21T19:36:18.220" v="1343" actId="2696"/>
-        <pc:sldMkLst>
-          <pc:docMk/>
-          <pc:sldMk cId="2056815667" sldId="278"/>
-        </pc:sldMkLst>
-        <pc:spChg chg="mod">
-          <ac:chgData name="Tim Schlottmann" userId="470020b021055e8f" providerId="LiveId" clId="{C000F36B-97BE-443D-8CFF-87B9779942D7}" dt="2018-01-21T19:33:54.377" v="1294" actId="1076"/>
-          <ac:spMkLst>
-            <pc:docMk/>
-            <pc:sldMk cId="2056815667" sldId="278"/>
-            <ac:spMk id="38" creationId="{C57AC17B-C863-41CE-B69D-F2AA4C4BE3F8}"/>
-          </ac:spMkLst>
-        </pc:spChg>
-        <pc:spChg chg="add mod">
-          <ac:chgData name="Tim Schlottmann" userId="470020b021055e8f" providerId="LiveId" clId="{C000F36B-97BE-443D-8CFF-87B9779942D7}" dt="2018-01-21T19:33:49.619" v="1293" actId="571"/>
-          <ac:spMkLst>
-            <pc:docMk/>
-            <pc:sldMk cId="2056815667" sldId="278"/>
-            <ac:spMk id="40" creationId="{831CDAB2-2DD3-4D49-A5CA-1B19842DC83F}"/>
-          </ac:spMkLst>
-        </pc:spChg>
-        <pc:cxnChg chg="mod">
-          <ac:chgData name="Tim Schlottmann" userId="470020b021055e8f" providerId="LiveId" clId="{C000F36B-97BE-443D-8CFF-87B9779942D7}" dt="2018-01-21T19:33:45.997" v="1291" actId="1076"/>
-          <ac:cxnSpMkLst>
-            <pc:docMk/>
-            <pc:sldMk cId="2056815667" sldId="278"/>
-            <ac:cxnSpMk id="15" creationId="{7D9E4058-3AAA-4340-960A-41FF315F58B5}"/>
-          </ac:cxnSpMkLst>
-        </pc:cxnChg>
-        <pc:cxnChg chg="add mod">
-          <ac:chgData name="Tim Schlottmann" userId="470020b021055e8f" providerId="LiveId" clId="{C000F36B-97BE-443D-8CFF-87B9779942D7}" dt="2018-01-21T19:33:41.517" v="1289" actId="1036"/>
-          <ac:cxnSpMkLst>
-            <pc:docMk/>
-            <pc:sldMk cId="2056815667" sldId="278"/>
-            <ac:cxnSpMk id="36" creationId="{F4D368AE-4840-4A06-ACDC-A7271BABFCFA}"/>
-          </ac:cxnSpMkLst>
-        </pc:cxnChg>
-        <pc:cxnChg chg="del">
-          <ac:chgData name="Tim Schlottmann" userId="470020b021055e8f" providerId="LiveId" clId="{C000F36B-97BE-443D-8CFF-87B9779942D7}" dt="2018-01-21T19:33:56.198" v="1295" actId="478"/>
-          <ac:cxnSpMkLst>
-            <pc:docMk/>
-            <pc:sldMk cId="2056815667" sldId="278"/>
-            <ac:cxnSpMk id="37" creationId="{6F328CC7-B62A-477B-A734-C60BFAE72FED}"/>
-          </ac:cxnSpMkLst>
-        </pc:cxnChg>
-        <pc:cxnChg chg="add mod">
-          <ac:chgData name="Tim Schlottmann" userId="470020b021055e8f" providerId="LiveId" clId="{C000F36B-97BE-443D-8CFF-87B9779942D7}" dt="2018-01-21T19:33:49.619" v="1293" actId="571"/>
-          <ac:cxnSpMkLst>
-            <pc:docMk/>
-            <pc:sldMk cId="2056815667" sldId="278"/>
-            <ac:cxnSpMk id="39" creationId="{DC1D56DE-F00D-4249-8492-E24E6A4E7D18}"/>
-          </ac:cxnSpMkLst>
-        </pc:cxnChg>
-      </pc:sldChg>
-      <pc:sldChg chg="modSp add del">
-        <pc:chgData name="Tim Schlottmann" userId="470020b021055e8f" providerId="LiveId" clId="{C000F36B-97BE-443D-8CFF-87B9779942D7}" dt="2018-01-21T18:35:45.348" v="1270" actId="2696"/>
-        <pc:sldMkLst>
-          <pc:docMk/>
-          <pc:sldMk cId="3400814100" sldId="278"/>
-        </pc:sldMkLst>
-        <pc:spChg chg="mod">
-          <ac:chgData name="Tim Schlottmann" userId="470020b021055e8f" providerId="LiveId" clId="{C000F36B-97BE-443D-8CFF-87B9779942D7}" dt="2018-01-21T18:34:33.735" v="1225" actId="1076"/>
-          <ac:spMkLst>
-            <pc:docMk/>
-            <pc:sldMk cId="3400814100" sldId="278"/>
-            <ac:spMk id="22" creationId="{F4305521-91BF-4464-A681-4E3847132351}"/>
-          </ac:spMkLst>
-        </pc:spChg>
-        <pc:spChg chg="mod">
-          <ac:chgData name="Tim Schlottmann" userId="470020b021055e8f" providerId="LiveId" clId="{C000F36B-97BE-443D-8CFF-87B9779942D7}" dt="2018-01-21T18:35:26.817" v="1269" actId="1037"/>
-          <ac:spMkLst>
-            <pc:docMk/>
-            <pc:sldMk cId="3400814100" sldId="278"/>
-            <ac:spMk id="23" creationId="{AAC59F46-3532-4686-9C12-15A39D45731A}"/>
-          </ac:spMkLst>
-        </pc:spChg>
-        <pc:spChg chg="mod">
-          <ac:chgData name="Tim Schlottmann" userId="470020b021055e8f" providerId="LiveId" clId="{C000F36B-97BE-443D-8CFF-87B9779942D7}" dt="2018-01-21T18:34:41.167" v="1234" actId="1035"/>
-          <ac:spMkLst>
-            <pc:docMk/>
-            <pc:sldMk cId="3400814100" sldId="278"/>
-            <ac:spMk id="25" creationId="{6BC2C9DD-75CE-4601-8985-73FBB7C700AB}"/>
-          </ac:spMkLst>
-        </pc:spChg>
-        <pc:cxnChg chg="mod">
-          <ac:chgData name="Tim Schlottmann" userId="470020b021055e8f" providerId="LiveId" clId="{C000F36B-97BE-443D-8CFF-87B9779942D7}" dt="2018-01-21T18:35:21.081" v="1263" actId="14100"/>
-          <ac:cxnSpMkLst>
-            <pc:docMk/>
-            <pc:sldMk cId="3400814100" sldId="278"/>
-            <ac:cxnSpMk id="35" creationId="{32590196-106B-4FE0-81D6-4B23E723E5E5}"/>
-          </ac:cxnSpMkLst>
-        </pc:cxnChg>
-      </pc:sldChg>
-      <pc:sldChg chg="add del">
-        <pc:chgData name="Tim Schlottmann" userId="470020b021055e8f" providerId="LiveId" clId="{C000F36B-97BE-443D-8CFF-87B9779942D7}" dt="2018-01-21T19:36:33.986" v="1345" actId="2696"/>
-        <pc:sldMkLst>
-          <pc:docMk/>
-          <pc:sldMk cId="2461654471" sldId="279"/>
-        </pc:sldMkLst>
-      </pc:sldChg>
       <pc:sldChg chg="addSp delSp modSp add">
-        <pc:chgData name="Tim Schlottmann" userId="470020b021055e8f" providerId="LiveId" clId="{C000F36B-97BE-443D-8CFF-87B9779942D7}" dt="2018-01-21T20:40:05.960" v="1450" actId="167"/>
+        <pc:chgData name="Tim Schlottmann" userId="470020b021055e8f" providerId="LiveId" clId="{C000F36B-97BE-443D-8CFF-87B9779942D7}" dt="2018-01-25T08:14:55.954" v="2403" actId="1037"/>
         <pc:sldMkLst>
           <pc:docMk/>
           <pc:sldMk cId="2613905117" sldId="280"/>
         </pc:sldMkLst>
+        <pc:spChg chg="del mod">
+          <ac:chgData name="Tim Schlottmann" userId="470020b021055e8f" providerId="LiveId" clId="{C000F36B-97BE-443D-8CFF-87B9779942D7}" dt="2018-01-25T08:14:08.854" v="2392" actId="478"/>
+          <ac:spMkLst>
+            <pc:docMk/>
+            <pc:sldMk cId="2613905117" sldId="280"/>
+            <ac:spMk id="4" creationId="{B6D81606-0852-4721-B05B-002B7BFFAD1E}"/>
+          </ac:spMkLst>
+        </pc:spChg>
+        <pc:spChg chg="del">
+          <ac:chgData name="Tim Schlottmann" userId="470020b021055e8f" providerId="LiveId" clId="{C000F36B-97BE-443D-8CFF-87B9779942D7}" dt="2018-01-25T08:14:08.854" v="2392" actId="478"/>
+          <ac:spMkLst>
+            <pc:docMk/>
+            <pc:sldMk cId="2613905117" sldId="280"/>
+            <ac:spMk id="5" creationId="{F0D81ED6-27FD-4964-9F2A-A2A3BB24702D}"/>
+          </ac:spMkLst>
+        </pc:spChg>
+        <pc:spChg chg="mod">
+          <ac:chgData name="Tim Schlottmann" userId="470020b021055e8f" providerId="LiveId" clId="{C000F36B-97BE-443D-8CFF-87B9779942D7}" dt="2018-01-25T08:14:55.954" v="2403" actId="1037"/>
+          <ac:spMkLst>
+            <pc:docMk/>
+            <pc:sldMk cId="2613905117" sldId="280"/>
+            <ac:spMk id="22" creationId="{F4305521-91BF-4464-A681-4E3847132351}"/>
+          </ac:spMkLst>
+        </pc:spChg>
         <pc:spChg chg="del">
           <ac:chgData name="Tim Schlottmann" userId="470020b021055e8f" providerId="LiveId" clId="{C000F36B-97BE-443D-8CFF-87B9779942D7}" dt="2018-01-21T19:36:14.353" v="1342" actId="478"/>
           <ac:spMkLst>
@@ -3108,6 +2642,14 @@
           </ac:spMkLst>
         </pc:spChg>
         <pc:spChg chg="add">
+          <ac:chgData name="Tim Schlottmann" userId="470020b021055e8f" providerId="LiveId" clId="{C000F36B-97BE-443D-8CFF-87B9779942D7}" dt="2018-01-25T08:14:09.135" v="2393"/>
+          <ac:spMkLst>
+            <pc:docMk/>
+            <pc:sldMk cId="2613905117" sldId="280"/>
+            <ac:spMk id="39" creationId="{EE9034C0-DBFF-464A-A882-90EFA8EFAA3F}"/>
+          </ac:spMkLst>
+        </pc:spChg>
+        <pc:spChg chg="add">
           <ac:chgData name="Tim Schlottmann" userId="470020b021055e8f" providerId="LiveId" clId="{C000F36B-97BE-443D-8CFF-87B9779942D7}" dt="2018-01-21T19:36:11.135" v="1341" actId="167"/>
           <ac:spMkLst>
             <pc:docMk/>
@@ -3121,6 +2663,14 @@
             <pc:docMk/>
             <pc:sldMk cId="2613905117" sldId="280"/>
             <ac:spMk id="43" creationId="{0F1E6A1C-CD87-4539-AFA3-543A8C4C89C5}"/>
+          </ac:spMkLst>
+        </pc:spChg>
+        <pc:spChg chg="add">
+          <ac:chgData name="Tim Schlottmann" userId="470020b021055e8f" providerId="LiveId" clId="{C000F36B-97BE-443D-8CFF-87B9779942D7}" dt="2018-01-25T08:14:09.135" v="2393"/>
+          <ac:spMkLst>
+            <pc:docMk/>
+            <pc:sldMk cId="2613905117" sldId="280"/>
+            <ac:spMk id="43" creationId="{96F51E8E-A39D-4D27-B3C9-69A42A8A3B0B}"/>
           </ac:spMkLst>
         </pc:spChg>
         <pc:cxnChg chg="ord">
@@ -3149,11 +2699,35 @@
         </pc:cxnChg>
       </pc:sldChg>
       <pc:sldChg chg="addSp delSp modSp add">
-        <pc:chgData name="Tim Schlottmann" userId="470020b021055e8f" providerId="LiveId" clId="{C000F36B-97BE-443D-8CFF-87B9779942D7}" dt="2018-01-21T20:39:58.295" v="1448" actId="167"/>
+        <pc:chgData name="Tim Schlottmann" userId="470020b021055e8f" providerId="LiveId" clId="{C000F36B-97BE-443D-8CFF-87B9779942D7}" dt="2018-01-25T08:14:50.122" v="2401" actId="1037"/>
         <pc:sldMkLst>
           <pc:docMk/>
           <pc:sldMk cId="1834748246" sldId="281"/>
         </pc:sldMkLst>
+        <pc:spChg chg="del mod">
+          <ac:chgData name="Tim Schlottmann" userId="470020b021055e8f" providerId="LiveId" clId="{C000F36B-97BE-443D-8CFF-87B9779942D7}" dt="2018-01-25T08:14:15.383" v="2394" actId="478"/>
+          <ac:spMkLst>
+            <pc:docMk/>
+            <pc:sldMk cId="1834748246" sldId="281"/>
+            <ac:spMk id="4" creationId="{B6D81606-0852-4721-B05B-002B7BFFAD1E}"/>
+          </ac:spMkLst>
+        </pc:spChg>
+        <pc:spChg chg="del">
+          <ac:chgData name="Tim Schlottmann" userId="470020b021055e8f" providerId="LiveId" clId="{C000F36B-97BE-443D-8CFF-87B9779942D7}" dt="2018-01-25T08:14:15.383" v="2394" actId="478"/>
+          <ac:spMkLst>
+            <pc:docMk/>
+            <pc:sldMk cId="1834748246" sldId="281"/>
+            <ac:spMk id="5" creationId="{F0D81ED6-27FD-4964-9F2A-A2A3BB24702D}"/>
+          </ac:spMkLst>
+        </pc:spChg>
+        <pc:spChg chg="mod">
+          <ac:chgData name="Tim Schlottmann" userId="470020b021055e8f" providerId="LiveId" clId="{C000F36B-97BE-443D-8CFF-87B9779942D7}" dt="2018-01-25T08:14:50.122" v="2401" actId="1037"/>
+          <ac:spMkLst>
+            <pc:docMk/>
+            <pc:sldMk cId="1834748246" sldId="281"/>
+            <ac:spMk id="22" creationId="{F4305521-91BF-4464-A681-4E3847132351}"/>
+          </ac:spMkLst>
+        </pc:spChg>
         <pc:spChg chg="del">
           <ac:chgData name="Tim Schlottmann" userId="470020b021055e8f" providerId="LiveId" clId="{C000F36B-97BE-443D-8CFF-87B9779942D7}" dt="2018-01-21T20:22:33.918" v="1387" actId="478"/>
           <ac:spMkLst>
@@ -3162,6 +2736,14 @@
             <ac:spMk id="43" creationId="{0F1E6A1C-CD87-4539-AFA3-543A8C4C89C5}"/>
           </ac:spMkLst>
         </pc:spChg>
+        <pc:spChg chg="add">
+          <ac:chgData name="Tim Schlottmann" userId="470020b021055e8f" providerId="LiveId" clId="{C000F36B-97BE-443D-8CFF-87B9779942D7}" dt="2018-01-25T08:14:15.600" v="2395"/>
+          <ac:spMkLst>
+            <pc:docMk/>
+            <pc:sldMk cId="1834748246" sldId="281"/>
+            <ac:spMk id="43" creationId="{3AFF1AA0-8E60-4466-97A5-1612D6D85732}"/>
+          </ac:spMkLst>
+        </pc:spChg>
         <pc:spChg chg="add mod">
           <ac:chgData name="Tim Schlottmann" userId="470020b021055e8f" providerId="LiveId" clId="{C000F36B-97BE-443D-8CFF-87B9779942D7}" dt="2018-01-21T19:37:23.071" v="1349" actId="1076"/>
           <ac:spMkLst>
@@ -3184,6 +2766,14 @@
             <pc:docMk/>
             <pc:sldMk cId="1834748246" sldId="281"/>
             <ac:spMk id="49" creationId="{4B3FE549-A1B5-405F-B50B-3ACC98F57967}"/>
+          </ac:spMkLst>
+        </pc:spChg>
+        <pc:spChg chg="add">
+          <ac:chgData name="Tim Schlottmann" userId="470020b021055e8f" providerId="LiveId" clId="{C000F36B-97BE-443D-8CFF-87B9779942D7}" dt="2018-01-25T08:14:15.600" v="2395"/>
+          <ac:spMkLst>
+            <pc:docMk/>
+            <pc:sldMk cId="1834748246" sldId="281"/>
+            <ac:spMk id="50" creationId="{3EBD363F-6C04-48B8-80A6-3A4BD337A8C0}"/>
           </ac:spMkLst>
         </pc:spChg>
         <pc:cxnChg chg="ord">
@@ -3203,18 +2793,58 @@
           </ac:cxnSpMkLst>
         </pc:cxnChg>
       </pc:sldChg>
-      <pc:sldChg chg="modSp add ord">
-        <pc:chgData name="Tim Schlottmann" userId="470020b021055e8f" providerId="LiveId" clId="{C000F36B-97BE-443D-8CFF-87B9779942D7}" dt="2018-01-21T20:39:48.256" v="1446" actId="167"/>
+      <pc:sldChg chg="addSp delSp modSp add ord">
+        <pc:chgData name="Tim Schlottmann" userId="470020b021055e8f" providerId="LiveId" clId="{C000F36B-97BE-443D-8CFF-87B9779942D7}" dt="2018-01-25T08:14:41.510" v="2399" actId="1037"/>
         <pc:sldMkLst>
           <pc:docMk/>
           <pc:sldMk cId="2869102783" sldId="282"/>
         </pc:sldMkLst>
+        <pc:spChg chg="del mod">
+          <ac:chgData name="Tim Schlottmann" userId="470020b021055e8f" providerId="LiveId" clId="{C000F36B-97BE-443D-8CFF-87B9779942D7}" dt="2018-01-25T08:14:21.094" v="2396" actId="478"/>
+          <ac:spMkLst>
+            <pc:docMk/>
+            <pc:sldMk cId="2869102783" sldId="282"/>
+            <ac:spMk id="4" creationId="{B6D81606-0852-4721-B05B-002B7BFFAD1E}"/>
+          </ac:spMkLst>
+        </pc:spChg>
+        <pc:spChg chg="del">
+          <ac:chgData name="Tim Schlottmann" userId="470020b021055e8f" providerId="LiveId" clId="{C000F36B-97BE-443D-8CFF-87B9779942D7}" dt="2018-01-25T08:14:21.094" v="2396" actId="478"/>
+          <ac:spMkLst>
+            <pc:docMk/>
+            <pc:sldMk cId="2869102783" sldId="282"/>
+            <ac:spMk id="5" creationId="{F0D81ED6-27FD-4964-9F2A-A2A3BB24702D}"/>
+          </ac:spMkLst>
+        </pc:spChg>
+        <pc:spChg chg="mod">
+          <ac:chgData name="Tim Schlottmann" userId="470020b021055e8f" providerId="LiveId" clId="{C000F36B-97BE-443D-8CFF-87B9779942D7}" dt="2018-01-25T08:14:41.510" v="2399" actId="1037"/>
+          <ac:spMkLst>
+            <pc:docMk/>
+            <pc:sldMk cId="2869102783" sldId="282"/>
+            <ac:spMk id="22" creationId="{F4305521-91BF-4464-A681-4E3847132351}"/>
+          </ac:spMkLst>
+        </pc:spChg>
         <pc:spChg chg="mod">
           <ac:chgData name="Tim Schlottmann" userId="470020b021055e8f" providerId="LiveId" clId="{C000F36B-97BE-443D-8CFF-87B9779942D7}" dt="2018-01-21T20:38:58.905" v="1443" actId="1036"/>
           <ac:spMkLst>
             <pc:docMk/>
             <pc:sldMk cId="2869102783" sldId="282"/>
             <ac:spMk id="24" creationId="{79936A3A-4AC7-452A-A24B-9F144E0B4348}"/>
+          </ac:spMkLst>
+        </pc:spChg>
+        <pc:spChg chg="add">
+          <ac:chgData name="Tim Schlottmann" userId="470020b021055e8f" providerId="LiveId" clId="{C000F36B-97BE-443D-8CFF-87B9779942D7}" dt="2018-01-25T08:14:21.313" v="2397"/>
+          <ac:spMkLst>
+            <pc:docMk/>
+            <pc:sldMk cId="2869102783" sldId="282"/>
+            <ac:spMk id="39" creationId="{040725BB-C45C-437B-9B93-5A8E214A5814}"/>
+          </ac:spMkLst>
+        </pc:spChg>
+        <pc:spChg chg="add">
+          <ac:chgData name="Tim Schlottmann" userId="470020b021055e8f" providerId="LiveId" clId="{C000F36B-97BE-443D-8CFF-87B9779942D7}" dt="2018-01-25T08:14:21.313" v="2397"/>
+          <ac:spMkLst>
+            <pc:docMk/>
+            <pc:sldMk cId="2869102783" sldId="282"/>
+            <ac:spMk id="43" creationId="{001AAF10-1DCF-4EF4-9D76-7A3B92D204B4}"/>
           </ac:spMkLst>
         </pc:spChg>
         <pc:spChg chg="mod">
@@ -3241,13 +2871,6 @@
             <ac:cxnSpMk id="46" creationId="{C59E4A26-36F7-42FF-8DFF-118C99EA9F0D}"/>
           </ac:cxnSpMkLst>
         </pc:cxnChg>
-      </pc:sldChg>
-      <pc:sldChg chg="add del">
-        <pc:chgData name="Tim Schlottmann" userId="470020b021055e8f" providerId="LiveId" clId="{C000F36B-97BE-443D-8CFF-87B9779942D7}" dt="2018-01-22T08:43:55.144" v="2059" actId="2696"/>
-        <pc:sldMkLst>
-          <pc:docMk/>
-          <pc:sldMk cId="1893261881" sldId="283"/>
-        </pc:sldMkLst>
       </pc:sldChg>
     </pc:docChg>
   </pc:docChgLst>
@@ -3401,7 +3024,7 @@
           <a:p>
             <a:fld id="{866CAFBC-D409-4D57-B437-B1DAFAEE5287}" type="datetimeFigureOut">
               <a:rPr lang="de-DE" smtClean="0"/>
-              <a:t>22.01.2018</a:t>
+              <a:t>25.01.2018</a:t>
             </a:fld>
             <a:endParaRPr lang="de-DE"/>
           </a:p>
@@ -3599,7 +3222,7 @@
           <a:p>
             <a:fld id="{866CAFBC-D409-4D57-B437-B1DAFAEE5287}" type="datetimeFigureOut">
               <a:rPr lang="de-DE" smtClean="0"/>
-              <a:t>22.01.2018</a:t>
+              <a:t>25.01.2018</a:t>
             </a:fld>
             <a:endParaRPr lang="de-DE"/>
           </a:p>
@@ -3807,7 +3430,7 @@
           <a:p>
             <a:fld id="{866CAFBC-D409-4D57-B437-B1DAFAEE5287}" type="datetimeFigureOut">
               <a:rPr lang="de-DE" smtClean="0"/>
-              <a:t>22.01.2018</a:t>
+              <a:t>25.01.2018</a:t>
             </a:fld>
             <a:endParaRPr lang="de-DE"/>
           </a:p>
@@ -4005,7 +3628,7 @@
           <a:p>
             <a:fld id="{866CAFBC-D409-4D57-B437-B1DAFAEE5287}" type="datetimeFigureOut">
               <a:rPr lang="de-DE" smtClean="0"/>
-              <a:t>22.01.2018</a:t>
+              <a:t>25.01.2018</a:t>
             </a:fld>
             <a:endParaRPr lang="de-DE"/>
           </a:p>
@@ -4280,7 +3903,7 @@
           <a:p>
             <a:fld id="{866CAFBC-D409-4D57-B437-B1DAFAEE5287}" type="datetimeFigureOut">
               <a:rPr lang="de-DE" smtClean="0"/>
-              <a:t>22.01.2018</a:t>
+              <a:t>25.01.2018</a:t>
             </a:fld>
             <a:endParaRPr lang="de-DE"/>
           </a:p>
@@ -4545,7 +4168,7 @@
           <a:p>
             <a:fld id="{866CAFBC-D409-4D57-B437-B1DAFAEE5287}" type="datetimeFigureOut">
               <a:rPr lang="de-DE" smtClean="0"/>
-              <a:t>22.01.2018</a:t>
+              <a:t>25.01.2018</a:t>
             </a:fld>
             <a:endParaRPr lang="de-DE"/>
           </a:p>
@@ -4957,7 +4580,7 @@
           <a:p>
             <a:fld id="{866CAFBC-D409-4D57-B437-B1DAFAEE5287}" type="datetimeFigureOut">
               <a:rPr lang="de-DE" smtClean="0"/>
-              <a:t>22.01.2018</a:t>
+              <a:t>25.01.2018</a:t>
             </a:fld>
             <a:endParaRPr lang="de-DE"/>
           </a:p>
@@ -5098,7 +4721,7 @@
           <a:p>
             <a:fld id="{866CAFBC-D409-4D57-B437-B1DAFAEE5287}" type="datetimeFigureOut">
               <a:rPr lang="de-DE" smtClean="0"/>
-              <a:t>22.01.2018</a:t>
+              <a:t>25.01.2018</a:t>
             </a:fld>
             <a:endParaRPr lang="de-DE"/>
           </a:p>
@@ -5211,7 +4834,7 @@
           <a:p>
             <a:fld id="{866CAFBC-D409-4D57-B437-B1DAFAEE5287}" type="datetimeFigureOut">
               <a:rPr lang="de-DE" smtClean="0"/>
-              <a:t>22.01.2018</a:t>
+              <a:t>25.01.2018</a:t>
             </a:fld>
             <a:endParaRPr lang="de-DE"/>
           </a:p>
@@ -5522,7 +5145,7 @@
           <a:p>
             <a:fld id="{866CAFBC-D409-4D57-B437-B1DAFAEE5287}" type="datetimeFigureOut">
               <a:rPr lang="de-DE" smtClean="0"/>
-              <a:t>22.01.2018</a:t>
+              <a:t>25.01.2018</a:t>
             </a:fld>
             <a:endParaRPr lang="de-DE"/>
           </a:p>
@@ -5810,7 +5433,7 @@
           <a:p>
             <a:fld id="{866CAFBC-D409-4D57-B437-B1DAFAEE5287}" type="datetimeFigureOut">
               <a:rPr lang="de-DE" smtClean="0"/>
-              <a:t>22.01.2018</a:t>
+              <a:t>25.01.2018</a:t>
             </a:fld>
             <a:endParaRPr lang="de-DE"/>
           </a:p>
@@ -6051,7 +5674,7 @@
           <a:p>
             <a:fld id="{866CAFBC-D409-4D57-B437-B1DAFAEE5287}" type="datetimeFigureOut">
               <a:rPr lang="de-DE" smtClean="0"/>
-              <a:t>22.01.2018</a:t>
+              <a:t>25.01.2018</a:t>
             </a:fld>
             <a:endParaRPr lang="de-DE"/>
           </a:p>
@@ -6824,8 +6447,8 @@
         </p:nvSpPr>
         <p:spPr>
           <a:xfrm>
-            <a:off x="4665921" y="5853918"/>
-            <a:ext cx="628698" cy="1323439"/>
+            <a:off x="8991048" y="4907304"/>
+            <a:ext cx="974947" cy="1323439"/>
           </a:xfrm>
           <a:prstGeom prst="rect">
             <a:avLst/>
@@ -6842,6 +6465,10 @@
               <a:rPr lang="de-DE" sz="8000" dirty="0"/>
               <a:t>x</a:t>
             </a:r>
+            <a:r>
+              <a:rPr lang="de-DE" sz="8000" baseline="-25000" dirty="0"/>
+              <a:t>1</a:t>
+            </a:r>
           </a:p>
         </p:txBody>
       </p:sp>
@@ -6859,8 +6486,8 @@
         </p:nvSpPr>
         <p:spPr>
           <a:xfrm>
-            <a:off x="0" y="2603635"/>
-            <a:ext cx="649537" cy="1323439"/>
+            <a:off x="996259" y="-405644"/>
+            <a:ext cx="974947" cy="1323439"/>
           </a:xfrm>
           <a:prstGeom prst="rect">
             <a:avLst/>
@@ -6875,7 +6502,11 @@
           <a:p>
             <a:r>
               <a:rPr lang="de-DE" sz="8000" dirty="0"/>
-              <a:t>y</a:t>
+              <a:t>x</a:t>
+            </a:r>
+            <a:r>
+              <a:rPr lang="de-DE" sz="8000" baseline="-25000" dirty="0"/>
+              <a:t>2</a:t>
             </a:r>
           </a:p>
         </p:txBody>
@@ -7853,76 +7484,6 @@
       </p:cxnSp>
       <p:sp>
         <p:nvSpPr>
-          <p:cNvPr id="4" name="Textfeld 3">
-            <a:extLst>
-              <a:ext uri="{FF2B5EF4-FFF2-40B4-BE49-F238E27FC236}">
-                <a16:creationId xmlns:a16="http://schemas.microsoft.com/office/drawing/2014/main" id="{B6D81606-0852-4721-B05B-002B7BFFAD1E}"/>
-              </a:ext>
-            </a:extLst>
-          </p:cNvPr>
-          <p:cNvSpPr txBox="1"/>
-          <p:nvPr/>
-        </p:nvSpPr>
-        <p:spPr>
-          <a:xfrm>
-            <a:off x="8869746" y="6029767"/>
-            <a:ext cx="518091" cy="1015663"/>
-          </a:xfrm>
-          <a:prstGeom prst="rect">
-            <a:avLst/>
-          </a:prstGeom>
-          <a:noFill/>
-        </p:spPr>
-        <p:txBody>
-          <a:bodyPr wrap="none" rtlCol="0">
-            <a:spAutoFit/>
-          </a:bodyPr>
-          <a:lstStyle/>
-          <a:p>
-            <a:r>
-              <a:rPr lang="de-DE" sz="6000" dirty="0"/>
-              <a:t>x</a:t>
-            </a:r>
-          </a:p>
-        </p:txBody>
-      </p:sp>
-      <p:sp>
-        <p:nvSpPr>
-          <p:cNvPr id="5" name="Textfeld 4">
-            <a:extLst>
-              <a:ext uri="{FF2B5EF4-FFF2-40B4-BE49-F238E27FC236}">
-                <a16:creationId xmlns:a16="http://schemas.microsoft.com/office/drawing/2014/main" id="{F0D81ED6-27FD-4964-9F2A-A2A3BB24702D}"/>
-              </a:ext>
-            </a:extLst>
-          </p:cNvPr>
-          <p:cNvSpPr txBox="1"/>
-          <p:nvPr/>
-        </p:nvSpPr>
-        <p:spPr>
-          <a:xfrm>
-            <a:off x="65873" y="-187432"/>
-            <a:ext cx="532518" cy="1015663"/>
-          </a:xfrm>
-          <a:prstGeom prst="rect">
-            <a:avLst/>
-          </a:prstGeom>
-          <a:noFill/>
-        </p:spPr>
-        <p:txBody>
-          <a:bodyPr wrap="none" rtlCol="0">
-            <a:spAutoFit/>
-          </a:bodyPr>
-          <a:lstStyle/>
-          <a:p>
-            <a:r>
-              <a:rPr lang="de-DE" sz="6000" dirty="0"/>
-              <a:t>y</a:t>
-            </a:r>
-          </a:p>
-        </p:txBody>
-      </p:sp>
-      <p:sp>
-        <p:nvSpPr>
           <p:cNvPr id="6" name="Ellipse 5">
             <a:extLst>
               <a:ext uri="{FF2B5EF4-FFF2-40B4-BE49-F238E27FC236}">
@@ -8271,7 +7832,7 @@
         </p:nvSpPr>
         <p:spPr>
           <a:xfrm>
-            <a:off x="3173302" y="4266970"/>
+            <a:off x="3163254" y="4266970"/>
             <a:ext cx="900000" cy="900000"/>
           </a:xfrm>
           <a:prstGeom prst="ellipse">
@@ -9003,6 +8564,84 @@
             <a:r>
               <a:rPr lang="de-DE" sz="6000" dirty="0"/>
               <a:t>SV</a:t>
+            </a:r>
+          </a:p>
+        </p:txBody>
+      </p:sp>
+      <p:sp>
+        <p:nvSpPr>
+          <p:cNvPr id="39" name="Textfeld 38">
+            <a:extLst>
+              <a:ext uri="{FF2B5EF4-FFF2-40B4-BE49-F238E27FC236}">
+                <a16:creationId xmlns:a16="http://schemas.microsoft.com/office/drawing/2014/main" id="{3A1FB5D1-4481-4FEA-8325-1478D18EA14D}"/>
+              </a:ext>
+            </a:extLst>
+          </p:cNvPr>
+          <p:cNvSpPr txBox="1"/>
+          <p:nvPr/>
+        </p:nvSpPr>
+        <p:spPr>
+          <a:xfrm>
+            <a:off x="9146075" y="5818751"/>
+            <a:ext cx="777777" cy="1015663"/>
+          </a:xfrm>
+          <a:prstGeom prst="rect">
+            <a:avLst/>
+          </a:prstGeom>
+          <a:noFill/>
+        </p:spPr>
+        <p:txBody>
+          <a:bodyPr wrap="none" rtlCol="0">
+            <a:spAutoFit/>
+          </a:bodyPr>
+          <a:lstStyle/>
+          <a:p>
+            <a:r>
+              <a:rPr lang="de-DE" sz="6000" dirty="0"/>
+              <a:t>x</a:t>
+            </a:r>
+            <a:r>
+              <a:rPr lang="de-DE" sz="6000" baseline="-25000" dirty="0"/>
+              <a:t>1</a:t>
+            </a:r>
+          </a:p>
+        </p:txBody>
+      </p:sp>
+      <p:sp>
+        <p:nvSpPr>
+          <p:cNvPr id="40" name="Textfeld 39">
+            <a:extLst>
+              <a:ext uri="{FF2B5EF4-FFF2-40B4-BE49-F238E27FC236}">
+                <a16:creationId xmlns:a16="http://schemas.microsoft.com/office/drawing/2014/main" id="{1CF783F5-6407-44C9-B48C-8C39A4B445E6}"/>
+              </a:ext>
+            </a:extLst>
+          </p:cNvPr>
+          <p:cNvSpPr txBox="1"/>
+          <p:nvPr/>
+        </p:nvSpPr>
+        <p:spPr>
+          <a:xfrm>
+            <a:off x="-69779" y="-363276"/>
+            <a:ext cx="777777" cy="1015663"/>
+          </a:xfrm>
+          <a:prstGeom prst="rect">
+            <a:avLst/>
+          </a:prstGeom>
+          <a:noFill/>
+        </p:spPr>
+        <p:txBody>
+          <a:bodyPr wrap="none" rtlCol="0">
+            <a:spAutoFit/>
+          </a:bodyPr>
+          <a:lstStyle/>
+          <a:p>
+            <a:r>
+              <a:rPr lang="de-DE" sz="6000" dirty="0"/>
+              <a:t>x</a:t>
+            </a:r>
+            <a:r>
+              <a:rPr lang="de-DE" sz="6000" baseline="-25000" dirty="0"/>
+              <a:t>2</a:t>
             </a:r>
           </a:p>
         </p:txBody>
@@ -9437,76 +9076,6 @@
       </p:cxnSp>
       <p:sp>
         <p:nvSpPr>
-          <p:cNvPr id="4" name="Textfeld 3">
-            <a:extLst>
-              <a:ext uri="{FF2B5EF4-FFF2-40B4-BE49-F238E27FC236}">
-                <a16:creationId xmlns:a16="http://schemas.microsoft.com/office/drawing/2014/main" id="{B6D81606-0852-4721-B05B-002B7BFFAD1E}"/>
-              </a:ext>
-            </a:extLst>
-          </p:cNvPr>
-          <p:cNvSpPr txBox="1"/>
-          <p:nvPr/>
-        </p:nvSpPr>
-        <p:spPr>
-          <a:xfrm>
-            <a:off x="8869746" y="6029767"/>
-            <a:ext cx="518091" cy="1015663"/>
-          </a:xfrm>
-          <a:prstGeom prst="rect">
-            <a:avLst/>
-          </a:prstGeom>
-          <a:noFill/>
-        </p:spPr>
-        <p:txBody>
-          <a:bodyPr wrap="none" rtlCol="0">
-            <a:spAutoFit/>
-          </a:bodyPr>
-          <a:lstStyle/>
-          <a:p>
-            <a:r>
-              <a:rPr lang="de-DE" sz="6000" dirty="0"/>
-              <a:t>x</a:t>
-            </a:r>
-          </a:p>
-        </p:txBody>
-      </p:sp>
-      <p:sp>
-        <p:nvSpPr>
-          <p:cNvPr id="5" name="Textfeld 4">
-            <a:extLst>
-              <a:ext uri="{FF2B5EF4-FFF2-40B4-BE49-F238E27FC236}">
-                <a16:creationId xmlns:a16="http://schemas.microsoft.com/office/drawing/2014/main" id="{F0D81ED6-27FD-4964-9F2A-A2A3BB24702D}"/>
-              </a:ext>
-            </a:extLst>
-          </p:cNvPr>
-          <p:cNvSpPr txBox="1"/>
-          <p:nvPr/>
-        </p:nvSpPr>
-        <p:spPr>
-          <a:xfrm>
-            <a:off x="65873" y="-187432"/>
-            <a:ext cx="532518" cy="1015663"/>
-          </a:xfrm>
-          <a:prstGeom prst="rect">
-            <a:avLst/>
-          </a:prstGeom>
-          <a:noFill/>
-        </p:spPr>
-        <p:txBody>
-          <a:bodyPr wrap="none" rtlCol="0">
-            <a:spAutoFit/>
-          </a:bodyPr>
-          <a:lstStyle/>
-          <a:p>
-            <a:r>
-              <a:rPr lang="de-DE" sz="6000" dirty="0"/>
-              <a:t>y</a:t>
-            </a:r>
-          </a:p>
-        </p:txBody>
-      </p:sp>
-      <p:sp>
-        <p:nvSpPr>
           <p:cNvPr id="6" name="Ellipse 5">
             <a:extLst>
               <a:ext uri="{FF2B5EF4-FFF2-40B4-BE49-F238E27FC236}">
@@ -9853,7 +9422,7 @@
         </p:nvSpPr>
         <p:spPr>
           <a:xfrm>
-            <a:off x="3173302" y="4266970"/>
+            <a:off x="3163254" y="4266970"/>
             <a:ext cx="900000" cy="900000"/>
           </a:xfrm>
           <a:prstGeom prst="ellipse">
@@ -10585,6 +10154,84 @@
             <a:r>
               <a:rPr lang="de-DE" sz="6000" dirty="0"/>
               <a:t>w</a:t>
+            </a:r>
+          </a:p>
+        </p:txBody>
+      </p:sp>
+      <p:sp>
+        <p:nvSpPr>
+          <p:cNvPr id="39" name="Textfeld 38">
+            <a:extLst>
+              <a:ext uri="{FF2B5EF4-FFF2-40B4-BE49-F238E27FC236}">
+                <a16:creationId xmlns:a16="http://schemas.microsoft.com/office/drawing/2014/main" id="{EE9034C0-DBFF-464A-A882-90EFA8EFAA3F}"/>
+              </a:ext>
+            </a:extLst>
+          </p:cNvPr>
+          <p:cNvSpPr txBox="1"/>
+          <p:nvPr/>
+        </p:nvSpPr>
+        <p:spPr>
+          <a:xfrm>
+            <a:off x="9146075" y="5818751"/>
+            <a:ext cx="777777" cy="1015663"/>
+          </a:xfrm>
+          <a:prstGeom prst="rect">
+            <a:avLst/>
+          </a:prstGeom>
+          <a:noFill/>
+        </p:spPr>
+        <p:txBody>
+          <a:bodyPr wrap="none" rtlCol="0">
+            <a:spAutoFit/>
+          </a:bodyPr>
+          <a:lstStyle/>
+          <a:p>
+            <a:r>
+              <a:rPr lang="de-DE" sz="6000" dirty="0"/>
+              <a:t>x</a:t>
+            </a:r>
+            <a:r>
+              <a:rPr lang="de-DE" sz="6000" baseline="-25000" dirty="0"/>
+              <a:t>1</a:t>
+            </a:r>
+          </a:p>
+        </p:txBody>
+      </p:sp>
+      <p:sp>
+        <p:nvSpPr>
+          <p:cNvPr id="43" name="Textfeld 42">
+            <a:extLst>
+              <a:ext uri="{FF2B5EF4-FFF2-40B4-BE49-F238E27FC236}">
+                <a16:creationId xmlns:a16="http://schemas.microsoft.com/office/drawing/2014/main" id="{96F51E8E-A39D-4D27-B3C9-69A42A8A3B0B}"/>
+              </a:ext>
+            </a:extLst>
+          </p:cNvPr>
+          <p:cNvSpPr txBox="1"/>
+          <p:nvPr/>
+        </p:nvSpPr>
+        <p:spPr>
+          <a:xfrm>
+            <a:off x="-69779" y="-363276"/>
+            <a:ext cx="777777" cy="1015663"/>
+          </a:xfrm>
+          <a:prstGeom prst="rect">
+            <a:avLst/>
+          </a:prstGeom>
+          <a:noFill/>
+        </p:spPr>
+        <p:txBody>
+          <a:bodyPr wrap="none" rtlCol="0">
+            <a:spAutoFit/>
+          </a:bodyPr>
+          <a:lstStyle/>
+          <a:p>
+            <a:r>
+              <a:rPr lang="de-DE" sz="6000" dirty="0"/>
+              <a:t>x</a:t>
+            </a:r>
+            <a:r>
+              <a:rPr lang="de-DE" sz="6000" baseline="-25000" dirty="0"/>
+              <a:t>2</a:t>
             </a:r>
           </a:p>
         </p:txBody>
@@ -11019,76 +10666,6 @@
       </p:cxnSp>
       <p:sp>
         <p:nvSpPr>
-          <p:cNvPr id="4" name="Textfeld 3">
-            <a:extLst>
-              <a:ext uri="{FF2B5EF4-FFF2-40B4-BE49-F238E27FC236}">
-                <a16:creationId xmlns:a16="http://schemas.microsoft.com/office/drawing/2014/main" id="{B6D81606-0852-4721-B05B-002B7BFFAD1E}"/>
-              </a:ext>
-            </a:extLst>
-          </p:cNvPr>
-          <p:cNvSpPr txBox="1"/>
-          <p:nvPr/>
-        </p:nvSpPr>
-        <p:spPr>
-          <a:xfrm>
-            <a:off x="8869746" y="6029767"/>
-            <a:ext cx="518091" cy="1015663"/>
-          </a:xfrm>
-          <a:prstGeom prst="rect">
-            <a:avLst/>
-          </a:prstGeom>
-          <a:noFill/>
-        </p:spPr>
-        <p:txBody>
-          <a:bodyPr wrap="none" rtlCol="0">
-            <a:spAutoFit/>
-          </a:bodyPr>
-          <a:lstStyle/>
-          <a:p>
-            <a:r>
-              <a:rPr lang="de-DE" sz="6000" dirty="0"/>
-              <a:t>x</a:t>
-            </a:r>
-          </a:p>
-        </p:txBody>
-      </p:sp>
-      <p:sp>
-        <p:nvSpPr>
-          <p:cNvPr id="5" name="Textfeld 4">
-            <a:extLst>
-              <a:ext uri="{FF2B5EF4-FFF2-40B4-BE49-F238E27FC236}">
-                <a16:creationId xmlns:a16="http://schemas.microsoft.com/office/drawing/2014/main" id="{F0D81ED6-27FD-4964-9F2A-A2A3BB24702D}"/>
-              </a:ext>
-            </a:extLst>
-          </p:cNvPr>
-          <p:cNvSpPr txBox="1"/>
-          <p:nvPr/>
-        </p:nvSpPr>
-        <p:spPr>
-          <a:xfrm>
-            <a:off x="65873" y="-187432"/>
-            <a:ext cx="532518" cy="1015663"/>
-          </a:xfrm>
-          <a:prstGeom prst="rect">
-            <a:avLst/>
-          </a:prstGeom>
-          <a:noFill/>
-        </p:spPr>
-        <p:txBody>
-          <a:bodyPr wrap="none" rtlCol="0">
-            <a:spAutoFit/>
-          </a:bodyPr>
-          <a:lstStyle/>
-          <a:p>
-            <a:r>
-              <a:rPr lang="de-DE" sz="6000" dirty="0"/>
-              <a:t>y</a:t>
-            </a:r>
-          </a:p>
-        </p:txBody>
-      </p:sp>
-      <p:sp>
-        <p:nvSpPr>
           <p:cNvPr id="6" name="Ellipse 5">
             <a:extLst>
               <a:ext uri="{FF2B5EF4-FFF2-40B4-BE49-F238E27FC236}">
@@ -11435,7 +11012,7 @@
         </p:nvSpPr>
         <p:spPr>
           <a:xfrm>
-            <a:off x="3173302" y="4266970"/>
+            <a:off x="3163254" y="4266970"/>
             <a:ext cx="900000" cy="900000"/>
           </a:xfrm>
           <a:prstGeom prst="ellipse">
@@ -12305,6 +11882,84 @@
             <a:r>
               <a:rPr lang="de-DE" sz="6000" b="1" dirty="0"/>
               <a:t>F</a:t>
+            </a:r>
+          </a:p>
+        </p:txBody>
+      </p:sp>
+      <p:sp>
+        <p:nvSpPr>
+          <p:cNvPr id="43" name="Textfeld 42">
+            <a:extLst>
+              <a:ext uri="{FF2B5EF4-FFF2-40B4-BE49-F238E27FC236}">
+                <a16:creationId xmlns:a16="http://schemas.microsoft.com/office/drawing/2014/main" id="{3AFF1AA0-8E60-4466-97A5-1612D6D85732}"/>
+              </a:ext>
+            </a:extLst>
+          </p:cNvPr>
+          <p:cNvSpPr txBox="1"/>
+          <p:nvPr/>
+        </p:nvSpPr>
+        <p:spPr>
+          <a:xfrm>
+            <a:off x="9146075" y="5818751"/>
+            <a:ext cx="777777" cy="1015663"/>
+          </a:xfrm>
+          <a:prstGeom prst="rect">
+            <a:avLst/>
+          </a:prstGeom>
+          <a:noFill/>
+        </p:spPr>
+        <p:txBody>
+          <a:bodyPr wrap="none" rtlCol="0">
+            <a:spAutoFit/>
+          </a:bodyPr>
+          <a:lstStyle/>
+          <a:p>
+            <a:r>
+              <a:rPr lang="de-DE" sz="6000" dirty="0"/>
+              <a:t>x</a:t>
+            </a:r>
+            <a:r>
+              <a:rPr lang="de-DE" sz="6000" baseline="-25000" dirty="0"/>
+              <a:t>1</a:t>
+            </a:r>
+          </a:p>
+        </p:txBody>
+      </p:sp>
+      <p:sp>
+        <p:nvSpPr>
+          <p:cNvPr id="50" name="Textfeld 49">
+            <a:extLst>
+              <a:ext uri="{FF2B5EF4-FFF2-40B4-BE49-F238E27FC236}">
+                <a16:creationId xmlns:a16="http://schemas.microsoft.com/office/drawing/2014/main" id="{3EBD363F-6C04-48B8-80A6-3A4BD337A8C0}"/>
+              </a:ext>
+            </a:extLst>
+          </p:cNvPr>
+          <p:cNvSpPr txBox="1"/>
+          <p:nvPr/>
+        </p:nvSpPr>
+        <p:spPr>
+          <a:xfrm>
+            <a:off x="-69779" y="-363276"/>
+            <a:ext cx="777777" cy="1015663"/>
+          </a:xfrm>
+          <a:prstGeom prst="rect">
+            <a:avLst/>
+          </a:prstGeom>
+          <a:noFill/>
+        </p:spPr>
+        <p:txBody>
+          <a:bodyPr wrap="none" rtlCol="0">
+            <a:spAutoFit/>
+          </a:bodyPr>
+          <a:lstStyle/>
+          <a:p>
+            <a:r>
+              <a:rPr lang="de-DE" sz="6000" dirty="0"/>
+              <a:t>x</a:t>
+            </a:r>
+            <a:r>
+              <a:rPr lang="de-DE" sz="6000" baseline="-25000" dirty="0"/>
+              <a:t>2</a:t>
             </a:r>
           </a:p>
         </p:txBody>
@@ -12739,76 +12394,6 @@
       </p:cxnSp>
       <p:sp>
         <p:nvSpPr>
-          <p:cNvPr id="4" name="Textfeld 3">
-            <a:extLst>
-              <a:ext uri="{FF2B5EF4-FFF2-40B4-BE49-F238E27FC236}">
-                <a16:creationId xmlns:a16="http://schemas.microsoft.com/office/drawing/2014/main" id="{B6D81606-0852-4721-B05B-002B7BFFAD1E}"/>
-              </a:ext>
-            </a:extLst>
-          </p:cNvPr>
-          <p:cNvSpPr txBox="1"/>
-          <p:nvPr/>
-        </p:nvSpPr>
-        <p:spPr>
-          <a:xfrm>
-            <a:off x="8869746" y="6029767"/>
-            <a:ext cx="518091" cy="1015663"/>
-          </a:xfrm>
-          <a:prstGeom prst="rect">
-            <a:avLst/>
-          </a:prstGeom>
-          <a:noFill/>
-        </p:spPr>
-        <p:txBody>
-          <a:bodyPr wrap="none" rtlCol="0">
-            <a:spAutoFit/>
-          </a:bodyPr>
-          <a:lstStyle/>
-          <a:p>
-            <a:r>
-              <a:rPr lang="de-DE" sz="6000" dirty="0"/>
-              <a:t>x</a:t>
-            </a:r>
-          </a:p>
-        </p:txBody>
-      </p:sp>
-      <p:sp>
-        <p:nvSpPr>
-          <p:cNvPr id="5" name="Textfeld 4">
-            <a:extLst>
-              <a:ext uri="{FF2B5EF4-FFF2-40B4-BE49-F238E27FC236}">
-                <a16:creationId xmlns:a16="http://schemas.microsoft.com/office/drawing/2014/main" id="{F0D81ED6-27FD-4964-9F2A-A2A3BB24702D}"/>
-              </a:ext>
-            </a:extLst>
-          </p:cNvPr>
-          <p:cNvSpPr txBox="1"/>
-          <p:nvPr/>
-        </p:nvSpPr>
-        <p:spPr>
-          <a:xfrm>
-            <a:off x="65873" y="-187432"/>
-            <a:ext cx="532518" cy="1015663"/>
-          </a:xfrm>
-          <a:prstGeom prst="rect">
-            <a:avLst/>
-          </a:prstGeom>
-          <a:noFill/>
-        </p:spPr>
-        <p:txBody>
-          <a:bodyPr wrap="none" rtlCol="0">
-            <a:spAutoFit/>
-          </a:bodyPr>
-          <a:lstStyle/>
-          <a:p>
-            <a:r>
-              <a:rPr lang="de-DE" sz="6000" dirty="0"/>
-              <a:t>y</a:t>
-            </a:r>
-          </a:p>
-        </p:txBody>
-      </p:sp>
-      <p:sp>
-        <p:nvSpPr>
           <p:cNvPr id="6" name="Ellipse 5">
             <a:extLst>
               <a:ext uri="{FF2B5EF4-FFF2-40B4-BE49-F238E27FC236}">
@@ -13155,7 +12740,7 @@
         </p:nvSpPr>
         <p:spPr>
           <a:xfrm>
-            <a:off x="3173302" y="4266970"/>
+            <a:off x="3163254" y="4266970"/>
             <a:ext cx="900000" cy="900000"/>
           </a:xfrm>
           <a:prstGeom prst="ellipse">
@@ -13887,6 +13472,84 @@
             <a:r>
               <a:rPr lang="de-DE" sz="6000" dirty="0"/>
               <a:t>w</a:t>
+            </a:r>
+          </a:p>
+        </p:txBody>
+      </p:sp>
+      <p:sp>
+        <p:nvSpPr>
+          <p:cNvPr id="39" name="Textfeld 38">
+            <a:extLst>
+              <a:ext uri="{FF2B5EF4-FFF2-40B4-BE49-F238E27FC236}">
+                <a16:creationId xmlns:a16="http://schemas.microsoft.com/office/drawing/2014/main" id="{040725BB-C45C-437B-9B93-5A8E214A5814}"/>
+              </a:ext>
+            </a:extLst>
+          </p:cNvPr>
+          <p:cNvSpPr txBox="1"/>
+          <p:nvPr/>
+        </p:nvSpPr>
+        <p:spPr>
+          <a:xfrm>
+            <a:off x="9146075" y="5818751"/>
+            <a:ext cx="777777" cy="1015663"/>
+          </a:xfrm>
+          <a:prstGeom prst="rect">
+            <a:avLst/>
+          </a:prstGeom>
+          <a:noFill/>
+        </p:spPr>
+        <p:txBody>
+          <a:bodyPr wrap="none" rtlCol="0">
+            <a:spAutoFit/>
+          </a:bodyPr>
+          <a:lstStyle/>
+          <a:p>
+            <a:r>
+              <a:rPr lang="de-DE" sz="6000" dirty="0"/>
+              <a:t>x</a:t>
+            </a:r>
+            <a:r>
+              <a:rPr lang="de-DE" sz="6000" baseline="-25000" dirty="0"/>
+              <a:t>1</a:t>
+            </a:r>
+          </a:p>
+        </p:txBody>
+      </p:sp>
+      <p:sp>
+        <p:nvSpPr>
+          <p:cNvPr id="43" name="Textfeld 42">
+            <a:extLst>
+              <a:ext uri="{FF2B5EF4-FFF2-40B4-BE49-F238E27FC236}">
+                <a16:creationId xmlns:a16="http://schemas.microsoft.com/office/drawing/2014/main" id="{001AAF10-1DCF-4EF4-9D76-7A3B92D204B4}"/>
+              </a:ext>
+            </a:extLst>
+          </p:cNvPr>
+          <p:cNvSpPr txBox="1"/>
+          <p:nvPr/>
+        </p:nvSpPr>
+        <p:spPr>
+          <a:xfrm>
+            <a:off x="-69779" y="-363276"/>
+            <a:ext cx="777777" cy="1015663"/>
+          </a:xfrm>
+          <a:prstGeom prst="rect">
+            <a:avLst/>
+          </a:prstGeom>
+          <a:noFill/>
+        </p:spPr>
+        <p:txBody>
+          <a:bodyPr wrap="none" rtlCol="0">
+            <a:spAutoFit/>
+          </a:bodyPr>
+          <a:lstStyle/>
+          <a:p>
+            <a:r>
+              <a:rPr lang="de-DE" sz="6000" dirty="0"/>
+              <a:t>x</a:t>
+            </a:r>
+            <a:r>
+              <a:rPr lang="de-DE" sz="6000" baseline="-25000" dirty="0"/>
+              <a:t>2</a:t>
             </a:r>
           </a:p>
         </p:txBody>
@@ -14265,76 +13928,6 @@
       </p:sp>
       <p:sp>
         <p:nvSpPr>
-          <p:cNvPr id="15" name="Textfeld 14">
-            <a:extLst>
-              <a:ext uri="{FF2B5EF4-FFF2-40B4-BE49-F238E27FC236}">
-                <a16:creationId xmlns:a16="http://schemas.microsoft.com/office/drawing/2014/main" id="{028189E5-D953-4246-961D-A3DE4C1DF174}"/>
-              </a:ext>
-            </a:extLst>
-          </p:cNvPr>
-          <p:cNvSpPr txBox="1"/>
-          <p:nvPr/>
-        </p:nvSpPr>
-        <p:spPr>
-          <a:xfrm>
-            <a:off x="4665921" y="5853918"/>
-            <a:ext cx="628698" cy="1323439"/>
-          </a:xfrm>
-          <a:prstGeom prst="rect">
-            <a:avLst/>
-          </a:prstGeom>
-          <a:noFill/>
-        </p:spPr>
-        <p:txBody>
-          <a:bodyPr wrap="none" rtlCol="0">
-            <a:spAutoFit/>
-          </a:bodyPr>
-          <a:lstStyle/>
-          <a:p>
-            <a:r>
-              <a:rPr lang="de-DE" sz="8000" dirty="0"/>
-              <a:t>x</a:t>
-            </a:r>
-          </a:p>
-        </p:txBody>
-      </p:sp>
-      <p:sp>
-        <p:nvSpPr>
-          <p:cNvPr id="16" name="Textfeld 15">
-            <a:extLst>
-              <a:ext uri="{FF2B5EF4-FFF2-40B4-BE49-F238E27FC236}">
-                <a16:creationId xmlns:a16="http://schemas.microsoft.com/office/drawing/2014/main" id="{274FF507-EB43-41E4-8A36-B914C4956F06}"/>
-              </a:ext>
-            </a:extLst>
-          </p:cNvPr>
-          <p:cNvSpPr txBox="1"/>
-          <p:nvPr/>
-        </p:nvSpPr>
-        <p:spPr>
-          <a:xfrm>
-            <a:off x="0" y="2603635"/>
-            <a:ext cx="649537" cy="1323439"/>
-          </a:xfrm>
-          <a:prstGeom prst="rect">
-            <a:avLst/>
-          </a:prstGeom>
-          <a:noFill/>
-        </p:spPr>
-        <p:txBody>
-          <a:bodyPr wrap="none" rtlCol="0">
-            <a:spAutoFit/>
-          </a:bodyPr>
-          <a:lstStyle/>
-          <a:p>
-            <a:r>
-              <a:rPr lang="de-DE" sz="8000" dirty="0"/>
-              <a:t>y</a:t>
-            </a:r>
-          </a:p>
-        </p:txBody>
-      </p:sp>
-      <p:sp>
-        <p:nvSpPr>
           <p:cNvPr id="17" name="Ellipse 16">
             <a:extLst>
               <a:ext uri="{FF2B5EF4-FFF2-40B4-BE49-F238E27FC236}">
@@ -14534,6 +14127,84 @@
             <a:r>
               <a:rPr lang="de-DE" sz="8000" dirty="0"/>
               <a:t>Leg.</a:t>
+            </a:r>
+          </a:p>
+        </p:txBody>
+      </p:sp>
+      <p:sp>
+        <p:nvSpPr>
+          <p:cNvPr id="22" name="Textfeld 21">
+            <a:extLst>
+              <a:ext uri="{FF2B5EF4-FFF2-40B4-BE49-F238E27FC236}">
+                <a16:creationId xmlns:a16="http://schemas.microsoft.com/office/drawing/2014/main" id="{7BDE8538-4D59-43F8-AAA8-BA3362A8881A}"/>
+              </a:ext>
+            </a:extLst>
+          </p:cNvPr>
+          <p:cNvSpPr txBox="1"/>
+          <p:nvPr/>
+        </p:nvSpPr>
+        <p:spPr>
+          <a:xfrm>
+            <a:off x="8991048" y="4907304"/>
+            <a:ext cx="974947" cy="1323439"/>
+          </a:xfrm>
+          <a:prstGeom prst="rect">
+            <a:avLst/>
+          </a:prstGeom>
+          <a:noFill/>
+        </p:spPr>
+        <p:txBody>
+          <a:bodyPr wrap="none" rtlCol="0">
+            <a:spAutoFit/>
+          </a:bodyPr>
+          <a:lstStyle/>
+          <a:p>
+            <a:r>
+              <a:rPr lang="de-DE" sz="8000" dirty="0"/>
+              <a:t>x</a:t>
+            </a:r>
+            <a:r>
+              <a:rPr lang="de-DE" sz="8000" baseline="-25000" dirty="0"/>
+              <a:t>1</a:t>
+            </a:r>
+          </a:p>
+        </p:txBody>
+      </p:sp>
+      <p:sp>
+        <p:nvSpPr>
+          <p:cNvPr id="23" name="Textfeld 22">
+            <a:extLst>
+              <a:ext uri="{FF2B5EF4-FFF2-40B4-BE49-F238E27FC236}">
+                <a16:creationId xmlns:a16="http://schemas.microsoft.com/office/drawing/2014/main" id="{6E081951-A0AC-49F8-874E-4DCB2301186C}"/>
+              </a:ext>
+            </a:extLst>
+          </p:cNvPr>
+          <p:cNvSpPr txBox="1"/>
+          <p:nvPr/>
+        </p:nvSpPr>
+        <p:spPr>
+          <a:xfrm>
+            <a:off x="996259" y="-405644"/>
+            <a:ext cx="974947" cy="1323439"/>
+          </a:xfrm>
+          <a:prstGeom prst="rect">
+            <a:avLst/>
+          </a:prstGeom>
+          <a:noFill/>
+        </p:spPr>
+        <p:txBody>
+          <a:bodyPr wrap="none" rtlCol="0">
+            <a:spAutoFit/>
+          </a:bodyPr>
+          <a:lstStyle/>
+          <a:p>
+            <a:r>
+              <a:rPr lang="de-DE" sz="8000" dirty="0"/>
+              <a:t>x</a:t>
+            </a:r>
+            <a:r>
+              <a:rPr lang="de-DE" sz="8000" baseline="-25000" dirty="0"/>
+              <a:t>2</a:t>
             </a:r>
           </a:p>
         </p:txBody>
@@ -15042,76 +14713,6 @@
       </p:cxnSp>
       <p:sp>
         <p:nvSpPr>
-          <p:cNvPr id="38" name="Textfeld 37">
-            <a:extLst>
-              <a:ext uri="{FF2B5EF4-FFF2-40B4-BE49-F238E27FC236}">
-                <a16:creationId xmlns:a16="http://schemas.microsoft.com/office/drawing/2014/main" id="{7740FBD9-AA17-45D5-95D5-33EB8A0DFF38}"/>
-              </a:ext>
-            </a:extLst>
-          </p:cNvPr>
-          <p:cNvSpPr txBox="1"/>
-          <p:nvPr/>
-        </p:nvSpPr>
-        <p:spPr>
-          <a:xfrm>
-            <a:off x="4665921" y="5854038"/>
-            <a:ext cx="628698" cy="1323439"/>
-          </a:xfrm>
-          <a:prstGeom prst="rect">
-            <a:avLst/>
-          </a:prstGeom>
-          <a:noFill/>
-        </p:spPr>
-        <p:txBody>
-          <a:bodyPr wrap="none" rtlCol="0">
-            <a:spAutoFit/>
-          </a:bodyPr>
-          <a:lstStyle/>
-          <a:p>
-            <a:r>
-              <a:rPr lang="de-DE" sz="8000" dirty="0"/>
-              <a:t>x</a:t>
-            </a:r>
-          </a:p>
-        </p:txBody>
-      </p:sp>
-      <p:sp>
-        <p:nvSpPr>
-          <p:cNvPr id="39" name="Textfeld 38">
-            <a:extLst>
-              <a:ext uri="{FF2B5EF4-FFF2-40B4-BE49-F238E27FC236}">
-                <a16:creationId xmlns:a16="http://schemas.microsoft.com/office/drawing/2014/main" id="{7E7BCACC-EF10-4EB7-A99A-2673DCD306BA}"/>
-              </a:ext>
-            </a:extLst>
-          </p:cNvPr>
-          <p:cNvSpPr txBox="1"/>
-          <p:nvPr/>
-        </p:nvSpPr>
-        <p:spPr>
-          <a:xfrm>
-            <a:off x="0" y="2603755"/>
-            <a:ext cx="649537" cy="1323439"/>
-          </a:xfrm>
-          <a:prstGeom prst="rect">
-            <a:avLst/>
-          </a:prstGeom>
-          <a:noFill/>
-        </p:spPr>
-        <p:txBody>
-          <a:bodyPr wrap="none" rtlCol="0">
-            <a:spAutoFit/>
-          </a:bodyPr>
-          <a:lstStyle/>
-          <a:p>
-            <a:r>
-              <a:rPr lang="de-DE" sz="8000" dirty="0"/>
-              <a:t>y</a:t>
-            </a:r>
-          </a:p>
-        </p:txBody>
-      </p:sp>
-      <p:sp>
-        <p:nvSpPr>
           <p:cNvPr id="40" name="Ellipse 39">
             <a:extLst>
               <a:ext uri="{FF2B5EF4-FFF2-40B4-BE49-F238E27FC236}">
@@ -15311,6 +14912,84 @@
             <a:r>
               <a:rPr lang="de-DE" sz="8000" dirty="0"/>
               <a:t>Leg.</a:t>
+            </a:r>
+          </a:p>
+        </p:txBody>
+      </p:sp>
+      <p:sp>
+        <p:nvSpPr>
+          <p:cNvPr id="20" name="Textfeld 19">
+            <a:extLst>
+              <a:ext uri="{FF2B5EF4-FFF2-40B4-BE49-F238E27FC236}">
+                <a16:creationId xmlns:a16="http://schemas.microsoft.com/office/drawing/2014/main" id="{B345AF0E-FE28-463B-B02B-B8D5E82CECC4}"/>
+              </a:ext>
+            </a:extLst>
+          </p:cNvPr>
+          <p:cNvSpPr txBox="1"/>
+          <p:nvPr/>
+        </p:nvSpPr>
+        <p:spPr>
+          <a:xfrm>
+            <a:off x="8991048" y="4907304"/>
+            <a:ext cx="974947" cy="1323439"/>
+          </a:xfrm>
+          <a:prstGeom prst="rect">
+            <a:avLst/>
+          </a:prstGeom>
+          <a:noFill/>
+        </p:spPr>
+        <p:txBody>
+          <a:bodyPr wrap="none" rtlCol="0">
+            <a:spAutoFit/>
+          </a:bodyPr>
+          <a:lstStyle/>
+          <a:p>
+            <a:r>
+              <a:rPr lang="de-DE" sz="8000" dirty="0"/>
+              <a:t>x</a:t>
+            </a:r>
+            <a:r>
+              <a:rPr lang="de-DE" sz="8000" baseline="-25000" dirty="0"/>
+              <a:t>1</a:t>
+            </a:r>
+          </a:p>
+        </p:txBody>
+      </p:sp>
+      <p:sp>
+        <p:nvSpPr>
+          <p:cNvPr id="21" name="Textfeld 20">
+            <a:extLst>
+              <a:ext uri="{FF2B5EF4-FFF2-40B4-BE49-F238E27FC236}">
+                <a16:creationId xmlns:a16="http://schemas.microsoft.com/office/drawing/2014/main" id="{A6360DD5-5EC1-4BB5-A977-F8CFF0D8FDD0}"/>
+              </a:ext>
+            </a:extLst>
+          </p:cNvPr>
+          <p:cNvSpPr txBox="1"/>
+          <p:nvPr/>
+        </p:nvSpPr>
+        <p:spPr>
+          <a:xfrm>
+            <a:off x="996259" y="-405644"/>
+            <a:ext cx="974947" cy="1323439"/>
+          </a:xfrm>
+          <a:prstGeom prst="rect">
+            <a:avLst/>
+          </a:prstGeom>
+          <a:noFill/>
+        </p:spPr>
+        <p:txBody>
+          <a:bodyPr wrap="none" rtlCol="0">
+            <a:spAutoFit/>
+          </a:bodyPr>
+          <a:lstStyle/>
+          <a:p>
+            <a:r>
+              <a:rPr lang="de-DE" sz="8000" dirty="0"/>
+              <a:t>x</a:t>
+            </a:r>
+            <a:r>
+              <a:rPr lang="de-DE" sz="8000" baseline="-25000" dirty="0"/>
+              <a:t>2</a:t>
             </a:r>
           </a:p>
         </p:txBody>
@@ -15952,76 +15631,6 @@
       </p:cxnSp>
       <p:sp>
         <p:nvSpPr>
-          <p:cNvPr id="16" name="Textfeld 15">
-            <a:extLst>
-              <a:ext uri="{FF2B5EF4-FFF2-40B4-BE49-F238E27FC236}">
-                <a16:creationId xmlns:a16="http://schemas.microsoft.com/office/drawing/2014/main" id="{BFE505F7-E10A-4C0D-AC13-4F7CE5447A9D}"/>
-              </a:ext>
-            </a:extLst>
-          </p:cNvPr>
-          <p:cNvSpPr txBox="1"/>
-          <p:nvPr/>
-        </p:nvSpPr>
-        <p:spPr>
-          <a:xfrm>
-            <a:off x="4665921" y="5854037"/>
-            <a:ext cx="628698" cy="1323439"/>
-          </a:xfrm>
-          <a:prstGeom prst="rect">
-            <a:avLst/>
-          </a:prstGeom>
-          <a:noFill/>
-        </p:spPr>
-        <p:txBody>
-          <a:bodyPr wrap="none" rtlCol="0">
-            <a:spAutoFit/>
-          </a:bodyPr>
-          <a:lstStyle/>
-          <a:p>
-            <a:r>
-              <a:rPr lang="de-DE" sz="8000" dirty="0"/>
-              <a:t>x</a:t>
-            </a:r>
-          </a:p>
-        </p:txBody>
-      </p:sp>
-      <p:sp>
-        <p:nvSpPr>
-          <p:cNvPr id="17" name="Textfeld 16">
-            <a:extLst>
-              <a:ext uri="{FF2B5EF4-FFF2-40B4-BE49-F238E27FC236}">
-                <a16:creationId xmlns:a16="http://schemas.microsoft.com/office/drawing/2014/main" id="{9E97616B-F638-4976-A84A-1943E56F9FFD}"/>
-              </a:ext>
-            </a:extLst>
-          </p:cNvPr>
-          <p:cNvSpPr txBox="1"/>
-          <p:nvPr/>
-        </p:nvSpPr>
-        <p:spPr>
-          <a:xfrm>
-            <a:off x="0" y="2603754"/>
-            <a:ext cx="649537" cy="1323439"/>
-          </a:xfrm>
-          <a:prstGeom prst="rect">
-            <a:avLst/>
-          </a:prstGeom>
-          <a:noFill/>
-        </p:spPr>
-        <p:txBody>
-          <a:bodyPr wrap="none" rtlCol="0">
-            <a:spAutoFit/>
-          </a:bodyPr>
-          <a:lstStyle/>
-          <a:p>
-            <a:r>
-              <a:rPr lang="de-DE" sz="8000" dirty="0"/>
-              <a:t>y</a:t>
-            </a:r>
-          </a:p>
-        </p:txBody>
-      </p:sp>
-      <p:sp>
-        <p:nvSpPr>
           <p:cNvPr id="20" name="Ellipse 19">
             <a:extLst>
               <a:ext uri="{FF2B5EF4-FFF2-40B4-BE49-F238E27FC236}">
@@ -16221,6 +15830,84 @@
             <a:r>
               <a:rPr lang="de-DE" sz="8000" dirty="0"/>
               <a:t>Leg.</a:t>
+            </a:r>
+          </a:p>
+        </p:txBody>
+      </p:sp>
+      <p:sp>
+        <p:nvSpPr>
+          <p:cNvPr id="25" name="Textfeld 24">
+            <a:extLst>
+              <a:ext uri="{FF2B5EF4-FFF2-40B4-BE49-F238E27FC236}">
+                <a16:creationId xmlns:a16="http://schemas.microsoft.com/office/drawing/2014/main" id="{66F890CD-7371-41C8-AB4D-B351B1EC5E95}"/>
+              </a:ext>
+            </a:extLst>
+          </p:cNvPr>
+          <p:cNvSpPr txBox="1"/>
+          <p:nvPr/>
+        </p:nvSpPr>
+        <p:spPr>
+          <a:xfrm>
+            <a:off x="8991048" y="4907304"/>
+            <a:ext cx="974947" cy="1323439"/>
+          </a:xfrm>
+          <a:prstGeom prst="rect">
+            <a:avLst/>
+          </a:prstGeom>
+          <a:noFill/>
+        </p:spPr>
+        <p:txBody>
+          <a:bodyPr wrap="none" rtlCol="0">
+            <a:spAutoFit/>
+          </a:bodyPr>
+          <a:lstStyle/>
+          <a:p>
+            <a:r>
+              <a:rPr lang="de-DE" sz="8000" dirty="0"/>
+              <a:t>x</a:t>
+            </a:r>
+            <a:r>
+              <a:rPr lang="de-DE" sz="8000" baseline="-25000" dirty="0"/>
+              <a:t>1</a:t>
+            </a:r>
+          </a:p>
+        </p:txBody>
+      </p:sp>
+      <p:sp>
+        <p:nvSpPr>
+          <p:cNvPr id="27" name="Textfeld 26">
+            <a:extLst>
+              <a:ext uri="{FF2B5EF4-FFF2-40B4-BE49-F238E27FC236}">
+                <a16:creationId xmlns:a16="http://schemas.microsoft.com/office/drawing/2014/main" id="{BE272226-C424-43F4-A041-FA275B8ECAD3}"/>
+              </a:ext>
+            </a:extLst>
+          </p:cNvPr>
+          <p:cNvSpPr txBox="1"/>
+          <p:nvPr/>
+        </p:nvSpPr>
+        <p:spPr>
+          <a:xfrm>
+            <a:off x="996259" y="-405644"/>
+            <a:ext cx="974947" cy="1323439"/>
+          </a:xfrm>
+          <a:prstGeom prst="rect">
+            <a:avLst/>
+          </a:prstGeom>
+          <a:noFill/>
+        </p:spPr>
+        <p:txBody>
+          <a:bodyPr wrap="none" rtlCol="0">
+            <a:spAutoFit/>
+          </a:bodyPr>
+          <a:lstStyle/>
+          <a:p>
+            <a:r>
+              <a:rPr lang="de-DE" sz="8000" dirty="0"/>
+              <a:t>x</a:t>
+            </a:r>
+            <a:r>
+              <a:rPr lang="de-DE" sz="8000" baseline="-25000" dirty="0"/>
+              <a:t>2</a:t>
             </a:r>
           </a:p>
         </p:txBody>
@@ -16867,76 +16554,6 @@
       </p:cxnSp>
       <p:sp>
         <p:nvSpPr>
-          <p:cNvPr id="16" name="Textfeld 15">
-            <a:extLst>
-              <a:ext uri="{FF2B5EF4-FFF2-40B4-BE49-F238E27FC236}">
-                <a16:creationId xmlns:a16="http://schemas.microsoft.com/office/drawing/2014/main" id="{4C333446-BF75-438A-B4A4-81D9E74F6813}"/>
-              </a:ext>
-            </a:extLst>
-          </p:cNvPr>
-          <p:cNvSpPr txBox="1"/>
-          <p:nvPr/>
-        </p:nvSpPr>
-        <p:spPr>
-          <a:xfrm>
-            <a:off x="4665921" y="5847981"/>
-            <a:ext cx="628698" cy="1323439"/>
-          </a:xfrm>
-          <a:prstGeom prst="rect">
-            <a:avLst/>
-          </a:prstGeom>
-          <a:noFill/>
-        </p:spPr>
-        <p:txBody>
-          <a:bodyPr wrap="none" rtlCol="0">
-            <a:spAutoFit/>
-          </a:bodyPr>
-          <a:lstStyle/>
-          <a:p>
-            <a:r>
-              <a:rPr lang="de-DE" sz="8000" dirty="0"/>
-              <a:t>x</a:t>
-            </a:r>
-          </a:p>
-        </p:txBody>
-      </p:sp>
-      <p:sp>
-        <p:nvSpPr>
-          <p:cNvPr id="17" name="Textfeld 16">
-            <a:extLst>
-              <a:ext uri="{FF2B5EF4-FFF2-40B4-BE49-F238E27FC236}">
-                <a16:creationId xmlns:a16="http://schemas.microsoft.com/office/drawing/2014/main" id="{5F5C8FCD-2E8D-412E-B9F4-8A0825C45D62}"/>
-              </a:ext>
-            </a:extLst>
-          </p:cNvPr>
-          <p:cNvSpPr txBox="1"/>
-          <p:nvPr/>
-        </p:nvSpPr>
-        <p:spPr>
-          <a:xfrm>
-            <a:off x="0" y="2597698"/>
-            <a:ext cx="649537" cy="1323439"/>
-          </a:xfrm>
-          <a:prstGeom prst="rect">
-            <a:avLst/>
-          </a:prstGeom>
-          <a:noFill/>
-        </p:spPr>
-        <p:txBody>
-          <a:bodyPr wrap="none" rtlCol="0">
-            <a:spAutoFit/>
-          </a:bodyPr>
-          <a:lstStyle/>
-          <a:p>
-            <a:r>
-              <a:rPr lang="de-DE" sz="8000" dirty="0"/>
-              <a:t>y</a:t>
-            </a:r>
-          </a:p>
-        </p:txBody>
-      </p:sp>
-      <p:sp>
-        <p:nvSpPr>
           <p:cNvPr id="22" name="Ellipse 21">
             <a:extLst>
               <a:ext uri="{FF2B5EF4-FFF2-40B4-BE49-F238E27FC236}">
@@ -17216,6 +16833,84 @@
             <a:r>
               <a:rPr lang="de-DE" sz="8000" dirty="0"/>
               <a:t>SV</a:t>
+            </a:r>
+          </a:p>
+        </p:txBody>
+      </p:sp>
+      <p:sp>
+        <p:nvSpPr>
+          <p:cNvPr id="26" name="Textfeld 25">
+            <a:extLst>
+              <a:ext uri="{FF2B5EF4-FFF2-40B4-BE49-F238E27FC236}">
+                <a16:creationId xmlns:a16="http://schemas.microsoft.com/office/drawing/2014/main" id="{7ACD210F-1B97-455F-BAD5-3EF23BEA9DF9}"/>
+              </a:ext>
+            </a:extLst>
+          </p:cNvPr>
+          <p:cNvSpPr txBox="1"/>
+          <p:nvPr/>
+        </p:nvSpPr>
+        <p:spPr>
+          <a:xfrm>
+            <a:off x="8991048" y="4907304"/>
+            <a:ext cx="974947" cy="1323439"/>
+          </a:xfrm>
+          <a:prstGeom prst="rect">
+            <a:avLst/>
+          </a:prstGeom>
+          <a:noFill/>
+        </p:spPr>
+        <p:txBody>
+          <a:bodyPr wrap="none" rtlCol="0">
+            <a:spAutoFit/>
+          </a:bodyPr>
+          <a:lstStyle/>
+          <a:p>
+            <a:r>
+              <a:rPr lang="de-DE" sz="8000" dirty="0"/>
+              <a:t>x</a:t>
+            </a:r>
+            <a:r>
+              <a:rPr lang="de-DE" sz="8000" baseline="-25000" dirty="0"/>
+              <a:t>1</a:t>
+            </a:r>
+          </a:p>
+        </p:txBody>
+      </p:sp>
+      <p:sp>
+        <p:nvSpPr>
+          <p:cNvPr id="32" name="Textfeld 31">
+            <a:extLst>
+              <a:ext uri="{FF2B5EF4-FFF2-40B4-BE49-F238E27FC236}">
+                <a16:creationId xmlns:a16="http://schemas.microsoft.com/office/drawing/2014/main" id="{304D4291-ABB8-432F-A91E-BF13A422BFF6}"/>
+              </a:ext>
+            </a:extLst>
+          </p:cNvPr>
+          <p:cNvSpPr txBox="1"/>
+          <p:nvPr/>
+        </p:nvSpPr>
+        <p:spPr>
+          <a:xfrm>
+            <a:off x="996259" y="-405644"/>
+            <a:ext cx="974947" cy="1323439"/>
+          </a:xfrm>
+          <a:prstGeom prst="rect">
+            <a:avLst/>
+          </a:prstGeom>
+          <a:noFill/>
+        </p:spPr>
+        <p:txBody>
+          <a:bodyPr wrap="none" rtlCol="0">
+            <a:spAutoFit/>
+          </a:bodyPr>
+          <a:lstStyle/>
+          <a:p>
+            <a:r>
+              <a:rPr lang="de-DE" sz="8000" dirty="0"/>
+              <a:t>x</a:t>
+            </a:r>
+            <a:r>
+              <a:rPr lang="de-DE" sz="8000" baseline="-25000" dirty="0"/>
+              <a:t>2</a:t>
             </a:r>
           </a:p>
         </p:txBody>
@@ -17859,76 +17554,6 @@
           </a:fontRef>
         </p:style>
       </p:cxnSp>
-      <p:sp>
-        <p:nvSpPr>
-          <p:cNvPr id="16" name="Textfeld 15">
-            <a:extLst>
-              <a:ext uri="{FF2B5EF4-FFF2-40B4-BE49-F238E27FC236}">
-                <a16:creationId xmlns:a16="http://schemas.microsoft.com/office/drawing/2014/main" id="{4C333446-BF75-438A-B4A4-81D9E74F6813}"/>
-              </a:ext>
-            </a:extLst>
-          </p:cNvPr>
-          <p:cNvSpPr txBox="1"/>
-          <p:nvPr/>
-        </p:nvSpPr>
-        <p:spPr>
-          <a:xfrm>
-            <a:off x="4665921" y="5847982"/>
-            <a:ext cx="628698" cy="1323439"/>
-          </a:xfrm>
-          <a:prstGeom prst="rect">
-            <a:avLst/>
-          </a:prstGeom>
-          <a:noFill/>
-        </p:spPr>
-        <p:txBody>
-          <a:bodyPr wrap="none" rtlCol="0">
-            <a:spAutoFit/>
-          </a:bodyPr>
-          <a:lstStyle/>
-          <a:p>
-            <a:r>
-              <a:rPr lang="de-DE" sz="8000" dirty="0"/>
-              <a:t>x</a:t>
-            </a:r>
-          </a:p>
-        </p:txBody>
-      </p:sp>
-      <p:sp>
-        <p:nvSpPr>
-          <p:cNvPr id="17" name="Textfeld 16">
-            <a:extLst>
-              <a:ext uri="{FF2B5EF4-FFF2-40B4-BE49-F238E27FC236}">
-                <a16:creationId xmlns:a16="http://schemas.microsoft.com/office/drawing/2014/main" id="{5F5C8FCD-2E8D-412E-B9F4-8A0825C45D62}"/>
-              </a:ext>
-            </a:extLst>
-          </p:cNvPr>
-          <p:cNvSpPr txBox="1"/>
-          <p:nvPr/>
-        </p:nvSpPr>
-        <p:spPr>
-          <a:xfrm>
-            <a:off x="0" y="2597699"/>
-            <a:ext cx="649537" cy="1323439"/>
-          </a:xfrm>
-          <a:prstGeom prst="rect">
-            <a:avLst/>
-          </a:prstGeom>
-          <a:noFill/>
-        </p:spPr>
-        <p:txBody>
-          <a:bodyPr wrap="none" rtlCol="0">
-            <a:spAutoFit/>
-          </a:bodyPr>
-          <a:lstStyle/>
-          <a:p>
-            <a:r>
-              <a:rPr lang="de-DE" sz="8000" dirty="0"/>
-              <a:t>y</a:t>
-            </a:r>
-          </a:p>
-        </p:txBody>
-      </p:sp>
       <p:cxnSp>
         <p:nvCxnSpPr>
           <p:cNvPr id="9" name="Gerade Verbindung mit Pfeil 8">
@@ -18415,6 +18040,129 @@
               <a:t>H</a:t>
             </a:r>
             <a:endParaRPr lang="de-DE" sz="8000" baseline="-25000" dirty="0"/>
+          </a:p>
+        </p:txBody>
+      </p:sp>
+      <p:cxnSp>
+        <p:nvCxnSpPr>
+          <p:cNvPr id="30" name="Gerade Verbindung mit Pfeil 29">
+            <a:extLst>
+              <a:ext uri="{FF2B5EF4-FFF2-40B4-BE49-F238E27FC236}">
+                <a16:creationId xmlns:a16="http://schemas.microsoft.com/office/drawing/2014/main" id="{F48553EA-6180-46E2-BF87-B00BA1523545}"/>
+              </a:ext>
+            </a:extLst>
+          </p:cNvPr>
+          <p:cNvCxnSpPr>
+            <a:cxnSpLocks/>
+          </p:cNvCxnSpPr>
+          <p:nvPr/>
+        </p:nvCxnSpPr>
+        <p:spPr>
+          <a:xfrm flipV="1">
+            <a:off x="3269151" y="2041879"/>
+            <a:ext cx="1009534" cy="157447"/>
+          </a:xfrm>
+          <a:prstGeom prst="straightConnector1">
+            <a:avLst/>
+          </a:prstGeom>
+          <a:ln w="76200">
+            <a:solidFill>
+              <a:schemeClr val="tx1"/>
+            </a:solidFill>
+            <a:headEnd type="triangle"/>
+            <a:tailEnd type="triangle"/>
+          </a:ln>
+        </p:spPr>
+        <p:style>
+          <a:lnRef idx="1">
+            <a:schemeClr val="accent1"/>
+          </a:lnRef>
+          <a:fillRef idx="0">
+            <a:schemeClr val="accent1"/>
+          </a:fillRef>
+          <a:effectRef idx="0">
+            <a:schemeClr val="accent1"/>
+          </a:effectRef>
+          <a:fontRef idx="minor">
+            <a:schemeClr val="tx1"/>
+          </a:fontRef>
+        </p:style>
+      </p:cxnSp>
+      <p:sp>
+        <p:nvSpPr>
+          <p:cNvPr id="32" name="Textfeld 31">
+            <a:extLst>
+              <a:ext uri="{FF2B5EF4-FFF2-40B4-BE49-F238E27FC236}">
+                <a16:creationId xmlns:a16="http://schemas.microsoft.com/office/drawing/2014/main" id="{33DED094-8829-4C4C-A0A0-7BBE04371214}"/>
+              </a:ext>
+            </a:extLst>
+          </p:cNvPr>
+          <p:cNvSpPr txBox="1"/>
+          <p:nvPr/>
+        </p:nvSpPr>
+        <p:spPr>
+          <a:xfrm>
+            <a:off x="8991048" y="4907304"/>
+            <a:ext cx="974947" cy="1323439"/>
+          </a:xfrm>
+          <a:prstGeom prst="rect">
+            <a:avLst/>
+          </a:prstGeom>
+          <a:noFill/>
+        </p:spPr>
+        <p:txBody>
+          <a:bodyPr wrap="none" rtlCol="0">
+            <a:spAutoFit/>
+          </a:bodyPr>
+          <a:lstStyle/>
+          <a:p>
+            <a:r>
+              <a:rPr lang="de-DE" sz="8000" dirty="0"/>
+              <a:t>x</a:t>
+            </a:r>
+            <a:r>
+              <a:rPr lang="de-DE" sz="8000" baseline="-25000" dirty="0"/>
+              <a:t>1</a:t>
+            </a:r>
+          </a:p>
+        </p:txBody>
+      </p:sp>
+      <p:sp>
+        <p:nvSpPr>
+          <p:cNvPr id="33" name="Textfeld 32">
+            <a:extLst>
+              <a:ext uri="{FF2B5EF4-FFF2-40B4-BE49-F238E27FC236}">
+                <a16:creationId xmlns:a16="http://schemas.microsoft.com/office/drawing/2014/main" id="{5581BCD7-9B7A-4C8C-9568-1E177C793FE3}"/>
+              </a:ext>
+            </a:extLst>
+          </p:cNvPr>
+          <p:cNvSpPr txBox="1"/>
+          <p:nvPr/>
+        </p:nvSpPr>
+        <p:spPr>
+          <a:xfrm>
+            <a:off x="996259" y="-405644"/>
+            <a:ext cx="974947" cy="1323439"/>
+          </a:xfrm>
+          <a:prstGeom prst="rect">
+            <a:avLst/>
+          </a:prstGeom>
+          <a:noFill/>
+        </p:spPr>
+        <p:txBody>
+          <a:bodyPr wrap="none" rtlCol="0">
+            <a:spAutoFit/>
+          </a:bodyPr>
+          <a:lstStyle/>
+          <a:p>
+            <a:r>
+              <a:rPr lang="de-DE" sz="8000" dirty="0"/>
+              <a:t>x</a:t>
+            </a:r>
+            <a:r>
+              <a:rPr lang="de-DE" sz="8000" baseline="-25000" dirty="0"/>
+              <a:t>2</a:t>
+            </a:r>
           </a:p>
         </p:txBody>
       </p:sp>
@@ -18463,7 +18211,7 @@
         <p:spPr>
           <a:xfrm>
             <a:off x="7274752" y="5183991"/>
-            <a:ext cx="518091" cy="1015663"/>
+            <a:ext cx="777777" cy="1015663"/>
           </a:xfrm>
           <a:prstGeom prst="rect">
             <a:avLst/>
@@ -18480,6 +18228,10 @@
               <a:rPr lang="de-DE" sz="6000" dirty="0"/>
               <a:t>x</a:t>
             </a:r>
+            <a:r>
+              <a:rPr lang="de-DE" sz="6000" baseline="-25000" dirty="0"/>
+              <a:t>1</a:t>
+            </a:r>
           </a:p>
         </p:txBody>
       </p:sp>
@@ -18497,8 +18249,8 @@
         </p:nvSpPr>
         <p:spPr>
           <a:xfrm>
-            <a:off x="401138" y="534265"/>
-            <a:ext cx="532518" cy="1015663"/>
+            <a:off x="194367" y="338322"/>
+            <a:ext cx="777777" cy="1015663"/>
           </a:xfrm>
           <a:prstGeom prst="rect">
             <a:avLst/>
@@ -18513,7 +18265,11 @@
           <a:p>
             <a:r>
               <a:rPr lang="de-DE" sz="6000" dirty="0"/>
-              <a:t>y</a:t>
+              <a:t>x</a:t>
+            </a:r>
+            <a:r>
+              <a:rPr lang="de-DE" sz="6000" baseline="-25000" dirty="0"/>
+              <a:t>2</a:t>
             </a:r>
           </a:p>
         </p:txBody>
@@ -20262,41 +20018,6 @@
       </p:cxnSp>
       <p:sp>
         <p:nvSpPr>
-          <p:cNvPr id="13" name="Textfeld 12">
-            <a:extLst>
-              <a:ext uri="{FF2B5EF4-FFF2-40B4-BE49-F238E27FC236}">
-                <a16:creationId xmlns:a16="http://schemas.microsoft.com/office/drawing/2014/main" id="{5D585B66-671F-4AF0-A51E-B6227ED9C280}"/>
-              </a:ext>
-            </a:extLst>
-          </p:cNvPr>
-          <p:cNvSpPr txBox="1"/>
-          <p:nvPr/>
-        </p:nvSpPr>
-        <p:spPr>
-          <a:xfrm>
-            <a:off x="65873" y="-187432"/>
-            <a:ext cx="532518" cy="1015663"/>
-          </a:xfrm>
-          <a:prstGeom prst="rect">
-            <a:avLst/>
-          </a:prstGeom>
-          <a:noFill/>
-        </p:spPr>
-        <p:txBody>
-          <a:bodyPr wrap="none" rtlCol="0">
-            <a:spAutoFit/>
-          </a:bodyPr>
-          <a:lstStyle/>
-          <a:p>
-            <a:r>
-              <a:rPr lang="de-DE" sz="6000" dirty="0"/>
-              <a:t>y</a:t>
-            </a:r>
-          </a:p>
-        </p:txBody>
-      </p:sp>
-      <p:sp>
-        <p:nvSpPr>
           <p:cNvPr id="14" name="Ellipse 13">
             <a:extLst>
               <a:ext uri="{FF2B5EF4-FFF2-40B4-BE49-F238E27FC236}">
@@ -20690,7 +20411,7 @@
         <p:spPr>
           <a:xfrm>
             <a:off x="923827" y="3603100"/>
-            <a:ext cx="787395" cy="1015663"/>
+            <a:ext cx="1560042" cy="1015663"/>
           </a:xfrm>
           <a:prstGeom prst="rect">
             <a:avLst/>
@@ -20704,14 +20425,13 @@
           <a:lstStyle/>
           <a:p>
             <a:r>
-              <a:rPr lang="de-DE" sz="6000" dirty="0" err="1"/>
-              <a:t>x</a:t>
-            </a:r>
-            <a:r>
-              <a:rPr lang="de-DE" sz="6000" baseline="-25000" dirty="0" err="1"/>
+              <a:rPr lang="de-DE" sz="6000" dirty="0"/>
+              <a:t>x_1</a:t>
+            </a:r>
+            <a:r>
+              <a:rPr lang="de-DE" sz="6000" baseline="-25000" dirty="0"/>
               <a:t>p</a:t>
             </a:r>
-            <a:endParaRPr lang="de-DE" sz="6000" baseline="-25000" dirty="0"/>
           </a:p>
         </p:txBody>
       </p:sp>
@@ -20730,7 +20450,7 @@
         <p:spPr>
           <a:xfrm>
             <a:off x="4626079" y="2896285"/>
-            <a:ext cx="787395" cy="1015663"/>
+            <a:ext cx="1560042" cy="1015663"/>
           </a:xfrm>
           <a:prstGeom prst="rect">
             <a:avLst/>
@@ -20744,14 +20464,13 @@
           <a:lstStyle/>
           <a:p>
             <a:r>
-              <a:rPr lang="de-DE" sz="6000" dirty="0" err="1"/>
-              <a:t>x</a:t>
-            </a:r>
-            <a:r>
-              <a:rPr lang="de-DE" sz="6000" baseline="-25000" dirty="0" err="1"/>
+              <a:rPr lang="de-DE" sz="6000" dirty="0"/>
+              <a:t>x_1</a:t>
+            </a:r>
+            <a:r>
+              <a:rPr lang="de-DE" sz="6000" baseline="-25000" dirty="0"/>
               <a:t>n</a:t>
             </a:r>
-            <a:endParaRPr lang="de-DE" sz="6000" baseline="-25000" dirty="0"/>
           </a:p>
         </p:txBody>
       </p:sp>
@@ -20872,10 +20591,10 @@
       </p:sp>
       <p:sp>
         <p:nvSpPr>
-          <p:cNvPr id="28" name="Textfeld 27">
-            <a:extLst>
-              <a:ext uri="{FF2B5EF4-FFF2-40B4-BE49-F238E27FC236}">
-                <a16:creationId xmlns:a16="http://schemas.microsoft.com/office/drawing/2014/main" id="{2F6B4A67-BC54-4FBA-B950-923D26EA6E06}"/>
+          <p:cNvPr id="29" name="Textfeld 28">
+            <a:extLst>
+              <a:ext uri="{FF2B5EF4-FFF2-40B4-BE49-F238E27FC236}">
+                <a16:creationId xmlns:a16="http://schemas.microsoft.com/office/drawing/2014/main" id="{456AA7FB-2F10-403C-AAB5-D978F4B24149}"/>
               </a:ext>
             </a:extLst>
           </p:cNvPr>
@@ -20884,8 +20603,8 @@
         </p:nvSpPr>
         <p:spPr>
           <a:xfrm>
-            <a:off x="8888609" y="5953294"/>
-            <a:ext cx="518091" cy="1015663"/>
+            <a:off x="8991048" y="4907304"/>
+            <a:ext cx="974947" cy="1323439"/>
           </a:xfrm>
           <a:prstGeom prst="rect">
             <a:avLst/>
@@ -20899,8 +20618,51 @@
           <a:lstStyle/>
           <a:p>
             <a:r>
-              <a:rPr lang="de-DE" sz="6000" dirty="0"/>
+              <a:rPr lang="de-DE" sz="8000" dirty="0"/>
               <a:t>x</a:t>
+            </a:r>
+            <a:r>
+              <a:rPr lang="de-DE" sz="8000" baseline="-25000" dirty="0"/>
+              <a:t>1</a:t>
+            </a:r>
+          </a:p>
+        </p:txBody>
+      </p:sp>
+      <p:sp>
+        <p:nvSpPr>
+          <p:cNvPr id="30" name="Textfeld 29">
+            <a:extLst>
+              <a:ext uri="{FF2B5EF4-FFF2-40B4-BE49-F238E27FC236}">
+                <a16:creationId xmlns:a16="http://schemas.microsoft.com/office/drawing/2014/main" id="{035508A1-6BC0-4F7F-B982-BB62A74E9661}"/>
+              </a:ext>
+            </a:extLst>
+          </p:cNvPr>
+          <p:cNvSpPr txBox="1"/>
+          <p:nvPr/>
+        </p:nvSpPr>
+        <p:spPr>
+          <a:xfrm>
+            <a:off x="996259" y="-405644"/>
+            <a:ext cx="974947" cy="1323439"/>
+          </a:xfrm>
+          <a:prstGeom prst="rect">
+            <a:avLst/>
+          </a:prstGeom>
+          <a:noFill/>
+        </p:spPr>
+        <p:txBody>
+          <a:bodyPr wrap="none" rtlCol="0">
+            <a:spAutoFit/>
+          </a:bodyPr>
+          <a:lstStyle/>
+          <a:p>
+            <a:r>
+              <a:rPr lang="de-DE" sz="8000" dirty="0"/>
+              <a:t>x</a:t>
+            </a:r>
+            <a:r>
+              <a:rPr lang="de-DE" sz="8000" baseline="-25000" dirty="0"/>
+              <a:t>2</a:t>
             </a:r>
           </a:p>
         </p:txBody>
@@ -21041,8 +20803,8 @@
         </p:nvSpPr>
         <p:spPr>
           <a:xfrm>
-            <a:off x="8869746" y="6029767"/>
-            <a:ext cx="518091" cy="1015663"/>
+            <a:off x="9146075" y="5818751"/>
+            <a:ext cx="777777" cy="1015663"/>
           </a:xfrm>
           <a:prstGeom prst="rect">
             <a:avLst/>
@@ -21059,6 +20821,10 @@
               <a:rPr lang="de-DE" sz="6000" dirty="0"/>
               <a:t>x</a:t>
             </a:r>
+            <a:r>
+              <a:rPr lang="de-DE" sz="6000" baseline="-25000" dirty="0"/>
+              <a:t>1</a:t>
+            </a:r>
           </a:p>
         </p:txBody>
       </p:sp>
@@ -21076,8 +20842,8 @@
         </p:nvSpPr>
         <p:spPr>
           <a:xfrm>
-            <a:off x="65873" y="-187432"/>
-            <a:ext cx="532518" cy="1015663"/>
+            <a:off x="-69779" y="-363276"/>
+            <a:ext cx="777777" cy="1015663"/>
           </a:xfrm>
           <a:prstGeom prst="rect">
             <a:avLst/>
@@ -21092,7 +20858,11 @@
           <a:p>
             <a:r>
               <a:rPr lang="de-DE" sz="6000" dirty="0"/>
-              <a:t>y</a:t>
+              <a:t>x</a:t>
+            </a:r>
+            <a:r>
+              <a:rPr lang="de-DE" sz="6000" baseline="-25000" dirty="0"/>
+              <a:t>2</a:t>
             </a:r>
           </a:p>
         </p:txBody>

</xml_diff>